<commit_message>
new analyses, including C4 model also created presentation
</commit_message>
<xml_diff>
--- a/presentations/nutnet_narea.pptx
+++ b/presentations/nutnet_narea.pptx
@@ -7,15 +7,22 @@
   <p:sldIdLst>
     <p:sldId id="256" r:id="rId2"/>
     <p:sldId id="257" r:id="rId3"/>
-    <p:sldId id="258" r:id="rId4"/>
-    <p:sldId id="259" r:id="rId5"/>
-    <p:sldId id="260" r:id="rId6"/>
-    <p:sldId id="263" r:id="rId7"/>
-    <p:sldId id="261" r:id="rId8"/>
-    <p:sldId id="262" r:id="rId9"/>
-    <p:sldId id="264" r:id="rId10"/>
-    <p:sldId id="265" r:id="rId11"/>
-    <p:sldId id="266" r:id="rId12"/>
+    <p:sldId id="272" r:id="rId4"/>
+    <p:sldId id="273" r:id="rId5"/>
+    <p:sldId id="258" r:id="rId6"/>
+    <p:sldId id="274" r:id="rId7"/>
+    <p:sldId id="259" r:id="rId8"/>
+    <p:sldId id="260" r:id="rId9"/>
+    <p:sldId id="263" r:id="rId10"/>
+    <p:sldId id="261" r:id="rId11"/>
+    <p:sldId id="262" r:id="rId12"/>
+    <p:sldId id="264" r:id="rId13"/>
+    <p:sldId id="265" r:id="rId14"/>
+    <p:sldId id="266" r:id="rId15"/>
+    <p:sldId id="268" r:id="rId16"/>
+    <p:sldId id="269" r:id="rId17"/>
+    <p:sldId id="270" r:id="rId18"/>
+    <p:sldId id="271" r:id="rId19"/>
   </p:sldIdLst>
   <p:sldSz cx="12192000" cy="6858000"/>
   <p:notesSz cx="6858000" cy="9144000"/>
@@ -114,6 +121,11 @@
       </a:defRPr>
     </a:lvl9pPr>
   </p:defaultTextStyle>
+  <p:extLst>
+    <p:ext uri="{EFAFB233-063F-42B5-8137-9DF3F51BA10A}">
+      <p15:sldGuideLst xmlns:p15="http://schemas.microsoft.com/office/powerpoint/2012/main"/>
+    </p:ext>
+  </p:extLst>
 </p:presentation>
 </file>
 
@@ -264,7 +276,7 @@
           <a:p>
             <a:fld id="{F94908AF-C271-DA4B-A6E0-87D34B71DD19}" type="datetimeFigureOut">
               <a:rPr lang="en-US" smtClean="0"/>
-              <a:t>6/9/20</a:t>
+              <a:t>6/12/20</a:t>
             </a:fld>
             <a:endParaRPr lang="en-US"/>
           </a:p>
@@ -462,7 +474,7 @@
           <a:p>
             <a:fld id="{F94908AF-C271-DA4B-A6E0-87D34B71DD19}" type="datetimeFigureOut">
               <a:rPr lang="en-US" smtClean="0"/>
-              <a:t>6/9/20</a:t>
+              <a:t>6/12/20</a:t>
             </a:fld>
             <a:endParaRPr lang="en-US"/>
           </a:p>
@@ -670,7 +682,7 @@
           <a:p>
             <a:fld id="{F94908AF-C271-DA4B-A6E0-87D34B71DD19}" type="datetimeFigureOut">
               <a:rPr lang="en-US" smtClean="0"/>
-              <a:t>6/9/20</a:t>
+              <a:t>6/12/20</a:t>
             </a:fld>
             <a:endParaRPr lang="en-US"/>
           </a:p>
@@ -868,7 +880,7 @@
           <a:p>
             <a:fld id="{F94908AF-C271-DA4B-A6E0-87D34B71DD19}" type="datetimeFigureOut">
               <a:rPr lang="en-US" smtClean="0"/>
-              <a:t>6/9/20</a:t>
+              <a:t>6/12/20</a:t>
             </a:fld>
             <a:endParaRPr lang="en-US"/>
           </a:p>
@@ -1143,7 +1155,7 @@
           <a:p>
             <a:fld id="{F94908AF-C271-DA4B-A6E0-87D34B71DD19}" type="datetimeFigureOut">
               <a:rPr lang="en-US" smtClean="0"/>
-              <a:t>6/9/20</a:t>
+              <a:t>6/12/20</a:t>
             </a:fld>
             <a:endParaRPr lang="en-US"/>
           </a:p>
@@ -1408,7 +1420,7 @@
           <a:p>
             <a:fld id="{F94908AF-C271-DA4B-A6E0-87D34B71DD19}" type="datetimeFigureOut">
               <a:rPr lang="en-US" smtClean="0"/>
-              <a:t>6/9/20</a:t>
+              <a:t>6/12/20</a:t>
             </a:fld>
             <a:endParaRPr lang="en-US"/>
           </a:p>
@@ -1820,7 +1832,7 @@
           <a:p>
             <a:fld id="{F94908AF-C271-DA4B-A6E0-87D34B71DD19}" type="datetimeFigureOut">
               <a:rPr lang="en-US" smtClean="0"/>
-              <a:t>6/9/20</a:t>
+              <a:t>6/12/20</a:t>
             </a:fld>
             <a:endParaRPr lang="en-US"/>
           </a:p>
@@ -1961,7 +1973,7 @@
           <a:p>
             <a:fld id="{F94908AF-C271-DA4B-A6E0-87D34B71DD19}" type="datetimeFigureOut">
               <a:rPr lang="en-US" smtClean="0"/>
-              <a:t>6/9/20</a:t>
+              <a:t>6/12/20</a:t>
             </a:fld>
             <a:endParaRPr lang="en-US"/>
           </a:p>
@@ -2074,7 +2086,7 @@
           <a:p>
             <a:fld id="{F94908AF-C271-DA4B-A6E0-87D34B71DD19}" type="datetimeFigureOut">
               <a:rPr lang="en-US" smtClean="0"/>
-              <a:t>6/9/20</a:t>
+              <a:t>6/12/20</a:t>
             </a:fld>
             <a:endParaRPr lang="en-US"/>
           </a:p>
@@ -2385,7 +2397,7 @@
           <a:p>
             <a:fld id="{F94908AF-C271-DA4B-A6E0-87D34B71DD19}" type="datetimeFigureOut">
               <a:rPr lang="en-US" smtClean="0"/>
-              <a:t>6/9/20</a:t>
+              <a:t>6/12/20</a:t>
             </a:fld>
             <a:endParaRPr lang="en-US"/>
           </a:p>
@@ -2673,7 +2685,7 @@
           <a:p>
             <a:fld id="{F94908AF-C271-DA4B-A6E0-87D34B71DD19}" type="datetimeFigureOut">
               <a:rPr lang="en-US" smtClean="0"/>
-              <a:t>6/9/20</a:t>
+              <a:t>6/12/20</a:t>
             </a:fld>
             <a:endParaRPr lang="en-US"/>
           </a:p>
@@ -2914,7 +2926,7 @@
           <a:p>
             <a:fld id="{F94908AF-C271-DA4B-A6E0-87D34B71DD19}" type="datetimeFigureOut">
               <a:rPr lang="en-US" smtClean="0"/>
-              <a:t>6/9/20</a:t>
+              <a:t>6/12/20</a:t>
             </a:fld>
             <a:endParaRPr lang="en-US"/>
           </a:p>
@@ -3358,7 +3370,11 @@
             </a:r>
             <a:r>
               <a:rPr lang="en-US" dirty="0" err="1"/>
-              <a:t>Narea</a:t>
+              <a:t>N</a:t>
+            </a:r>
+            <a:r>
+              <a:rPr lang="en-US" baseline="-25000" dirty="0" err="1"/>
+              <a:t>area</a:t>
             </a:r>
             <a:r>
               <a:rPr lang="en-US" dirty="0"/>
@@ -3385,12 +3401,18 @@
         </p:nvSpPr>
         <p:spPr/>
         <p:txBody>
-          <a:bodyPr/>
-          <a:lstStyle/>
-          <a:p>
-            <a:r>
-              <a:rPr lang="en-US" dirty="0"/>
-              <a:t>Nick Smith</a:t>
+          <a:bodyPr>
+            <a:normAutofit/>
+          </a:bodyPr>
+          <a:lstStyle/>
+          <a:p>
+            <a:r>
+              <a:rPr lang="en-US" sz="3200" dirty="0">
+                <a:solidFill>
+                  <a:srgbClr val="7030A0"/>
+                </a:solidFill>
+              </a:rPr>
+              <a:t>Nick Smith et multi alia</a:t>
             </a:r>
           </a:p>
         </p:txBody>
@@ -3430,7 +3452,7 @@
           <p:cNvPr id="2" name="Title 1">
             <a:extLst>
               <a:ext uri="{FF2B5EF4-FFF2-40B4-BE49-F238E27FC236}">
-                <a16:creationId xmlns:a16="http://schemas.microsoft.com/office/drawing/2014/main" id="{235D3C26-E1ED-D447-AB61-86E2E918D345}"/>
+                <a16:creationId xmlns:a16="http://schemas.microsoft.com/office/drawing/2014/main" id="{70ADCC1C-B460-9B49-B5E2-FE9B2F8D2437}"/>
               </a:ext>
             </a:extLst>
           </p:cNvPr>
@@ -3448,95 +3470,119 @@
           <a:p>
             <a:r>
               <a:rPr lang="en-US" dirty="0"/>
-              <a:t>Results: Does soil N impact leaf </a:t>
-            </a:r>
+              <a:t>Datasets</a:t>
+            </a:r>
+          </a:p>
+        </p:txBody>
+      </p:sp>
+      <p:sp>
+        <p:nvSpPr>
+          <p:cNvPr id="3" name="Content Placeholder 2">
+            <a:extLst>
+              <a:ext uri="{FF2B5EF4-FFF2-40B4-BE49-F238E27FC236}">
+                <a16:creationId xmlns:a16="http://schemas.microsoft.com/office/drawing/2014/main" id="{424F1937-1280-7B46-8871-496841F53251}"/>
+              </a:ext>
+            </a:extLst>
+          </p:cNvPr>
+          <p:cNvSpPr>
+            <a:spLocks noGrp="1"/>
+          </p:cNvSpPr>
+          <p:nvPr>
+            <p:ph idx="1"/>
+          </p:nvPr>
+        </p:nvSpPr>
+        <p:spPr/>
+        <p:txBody>
+          <a:bodyPr/>
+          <a:lstStyle/>
+          <a:p>
             <a:r>
               <a:rPr lang="en-US" dirty="0" err="1"/>
-              <a:t>Narea</a:t>
-            </a:r>
-            <a:r>
-              <a:rPr lang="en-US" dirty="0"/>
-              <a:t>?</a:t>
-            </a:r>
-          </a:p>
-        </p:txBody>
-      </p:sp>
-      <p:sp>
-        <p:nvSpPr>
-          <p:cNvPr id="3" name="Content Placeholder 2">
-            <a:extLst>
-              <a:ext uri="{FF2B5EF4-FFF2-40B4-BE49-F238E27FC236}">
-                <a16:creationId xmlns:a16="http://schemas.microsoft.com/office/drawing/2014/main" id="{A80FC0BD-1D5A-F949-BA4E-8FF9C08883E3}"/>
-              </a:ext>
-            </a:extLst>
-          </p:cNvPr>
-          <p:cNvSpPr>
-            <a:spLocks noGrp="1"/>
-          </p:cNvSpPr>
-          <p:nvPr>
-            <p:ph idx="1"/>
-          </p:nvPr>
-        </p:nvSpPr>
-        <p:spPr>
-          <a:xfrm>
-            <a:off x="838200" y="1825625"/>
-            <a:ext cx="5761383" cy="4351338"/>
-          </a:xfrm>
-        </p:spPr>
-        <p:txBody>
-          <a:bodyPr>
-            <a:normAutofit/>
-          </a:bodyPr>
-          <a:lstStyle/>
-          <a:p>
-            <a:r>
-              <a:rPr lang="en-US" sz="4800" dirty="0"/>
-              <a:t>18% increase in leaf </a:t>
-            </a:r>
-            <a:r>
-              <a:rPr lang="en-US" sz="4800" dirty="0" err="1"/>
-              <a:t>Narea</a:t>
-            </a:r>
-            <a:r>
-              <a:rPr lang="en-US" sz="4800" dirty="0"/>
-              <a:t> with soil N (p &lt; 0.01)</a:t>
-            </a:r>
-          </a:p>
-        </p:txBody>
-      </p:sp>
-      <p:pic>
-        <p:nvPicPr>
-          <p:cNvPr id="11" name="Picture 10">
-            <a:extLst>
-              <a:ext uri="{FF2B5EF4-FFF2-40B4-BE49-F238E27FC236}">
-                <a16:creationId xmlns:a16="http://schemas.microsoft.com/office/drawing/2014/main" id="{06958F7B-19AD-6E43-83FA-3E68312FCF4D}"/>
-              </a:ext>
-            </a:extLst>
-          </p:cNvPr>
-          <p:cNvPicPr>
-            <a:picLocks noChangeAspect="1"/>
-          </p:cNvPicPr>
-          <p:nvPr/>
-        </p:nvPicPr>
-        <p:blipFill rotWithShape="1">
-          <a:blip r:embed="rId2"/>
-          <a:srcRect r="49684"/>
-          <a:stretch/>
-        </p:blipFill>
-        <p:spPr>
-          <a:xfrm>
-            <a:off x="6725479" y="1690688"/>
-            <a:ext cx="4628321" cy="4869802"/>
-          </a:xfrm>
-          <a:prstGeom prst="rect">
-            <a:avLst/>
-          </a:prstGeom>
-        </p:spPr>
-      </p:pic>
+              <a:t>NutNet</a:t>
+            </a:r>
+            <a:r>
+              <a:rPr lang="en-US" dirty="0"/>
+              <a:t> leaf trait data</a:t>
+            </a:r>
+          </a:p>
+          <a:p>
+            <a:pPr lvl="1"/>
+            <a:r>
+              <a:rPr lang="en-US" dirty="0"/>
+              <a:t>n = 2096, 206 species, 26 sites</a:t>
+            </a:r>
+          </a:p>
+          <a:p>
+            <a:pPr lvl="1"/>
+            <a:r>
+              <a:rPr lang="en-US" dirty="0" err="1"/>
+              <a:t>N</a:t>
+            </a:r>
+            <a:r>
+              <a:rPr lang="en-US" baseline="-25000" dirty="0" err="1"/>
+              <a:t>area</a:t>
+            </a:r>
+            <a:endParaRPr lang="en-US" baseline="-25000" dirty="0"/>
+          </a:p>
+          <a:p>
+            <a:pPr lvl="1"/>
+            <a:r>
+              <a:rPr lang="en-US" dirty="0"/>
+              <a:t>LMA</a:t>
+            </a:r>
+          </a:p>
+          <a:p>
+            <a:pPr lvl="1"/>
+            <a:r>
+              <a:rPr lang="en-US" dirty="0"/>
+              <a:t>d13C (converted to </a:t>
+            </a:r>
+            <a:r>
+              <a:rPr lang="el-GR" dirty="0"/>
+              <a:t>χ</a:t>
+            </a:r>
+            <a:r>
+              <a:rPr lang="en-US" dirty="0"/>
+              <a:t>)</a:t>
+            </a:r>
+          </a:p>
+          <a:p>
+            <a:pPr lvl="1"/>
+            <a:r>
+              <a:rPr lang="en-US" dirty="0"/>
+              <a:t>Growing season climate conditions (CRU)</a:t>
+            </a:r>
+          </a:p>
+          <a:p>
+            <a:r>
+              <a:rPr lang="en-US" dirty="0" err="1"/>
+              <a:t>NutNet</a:t>
+            </a:r>
+            <a:r>
+              <a:rPr lang="en-US" dirty="0"/>
+              <a:t> plot data</a:t>
+            </a:r>
+          </a:p>
+          <a:p>
+            <a:pPr lvl="1"/>
+            <a:r>
+              <a:rPr lang="en-US" dirty="0"/>
+              <a:t>n = 673, 26 sites</a:t>
+            </a:r>
+          </a:p>
+          <a:p>
+            <a:pPr lvl="1"/>
+            <a:r>
+              <a:rPr lang="en-US" dirty="0"/>
+              <a:t>LAI</a:t>
+            </a:r>
+          </a:p>
+        </p:txBody>
+      </p:sp>
     </p:spTree>
     <p:extLst>
       <p:ext uri="{BB962C8B-B14F-4D97-AF65-F5344CB8AC3E}">
-        <p14:creationId xmlns:p14="http://schemas.microsoft.com/office/powerpoint/2010/main" val="2050478363"/>
+        <p14:creationId xmlns:p14="http://schemas.microsoft.com/office/powerpoint/2010/main" val="1351686725"/>
       </p:ext>
     </p:extLst>
   </p:cSld>
@@ -3568,6 +3614,415 @@
           <p:cNvPr id="2" name="Title 1">
             <a:extLst>
               <a:ext uri="{FF2B5EF4-FFF2-40B4-BE49-F238E27FC236}">
+                <a16:creationId xmlns:a16="http://schemas.microsoft.com/office/drawing/2014/main" id="{E4387BE1-9310-C44D-869D-F635AC6DC4CD}"/>
+              </a:ext>
+            </a:extLst>
+          </p:cNvPr>
+          <p:cNvSpPr>
+            <a:spLocks noGrp="1"/>
+          </p:cNvSpPr>
+          <p:nvPr>
+            <p:ph type="title"/>
+          </p:nvPr>
+        </p:nvSpPr>
+        <p:spPr/>
+        <p:txBody>
+          <a:bodyPr/>
+          <a:lstStyle/>
+          <a:p>
+            <a:r>
+              <a:rPr lang="en-US" dirty="0"/>
+              <a:t>Analyses</a:t>
+            </a:r>
+          </a:p>
+        </p:txBody>
+      </p:sp>
+      <p:sp>
+        <p:nvSpPr>
+          <p:cNvPr id="3" name="Content Placeholder 2">
+            <a:extLst>
+              <a:ext uri="{FF2B5EF4-FFF2-40B4-BE49-F238E27FC236}">
+                <a16:creationId xmlns:a16="http://schemas.microsoft.com/office/drawing/2014/main" id="{B7AD2C18-251F-7E41-AAA0-631F2901F61B}"/>
+              </a:ext>
+            </a:extLst>
+          </p:cNvPr>
+          <p:cNvSpPr>
+            <a:spLocks noGrp="1"/>
+          </p:cNvSpPr>
+          <p:nvPr>
+            <p:ph idx="1"/>
+          </p:nvPr>
+        </p:nvSpPr>
+        <p:spPr/>
+        <p:txBody>
+          <a:bodyPr/>
+          <a:lstStyle/>
+          <a:p>
+            <a:pPr marL="0" indent="0">
+              <a:buNone/>
+            </a:pPr>
+            <a:r>
+              <a:rPr lang="en-US" dirty="0"/>
+              <a:t>**Analyses generally follow Dong et al. (2017)**</a:t>
+            </a:r>
+          </a:p>
+          <a:p>
+            <a:r>
+              <a:rPr lang="en-US" dirty="0"/>
+              <a:t>Predictors of leaf </a:t>
+            </a:r>
+            <a:r>
+              <a:rPr lang="en-US" dirty="0" err="1"/>
+              <a:t>N</a:t>
+            </a:r>
+            <a:r>
+              <a:rPr lang="en-US" baseline="-25000" dirty="0" err="1"/>
+              <a:t>area</a:t>
+            </a:r>
+            <a:r>
+              <a:rPr lang="en-US" dirty="0"/>
+              <a:t> (mixed model)</a:t>
+            </a:r>
+          </a:p>
+          <a:p>
+            <a:pPr lvl="1"/>
+            <a:r>
+              <a:rPr lang="en-US" dirty="0"/>
+              <a:t>Dependent variable: leaf </a:t>
+            </a:r>
+            <a:r>
+              <a:rPr lang="en-US" dirty="0" err="1"/>
+              <a:t>Narea</a:t>
+            </a:r>
+            <a:endParaRPr lang="en-US" dirty="0"/>
+          </a:p>
+          <a:p>
+            <a:pPr lvl="1"/>
+            <a:r>
+              <a:rPr lang="en-US" dirty="0"/>
+              <a:t>Fixed effects: soil N * soil P * soil K + </a:t>
+            </a:r>
+            <a:r>
+              <a:rPr lang="el-GR" dirty="0"/>
+              <a:t>χ</a:t>
+            </a:r>
+            <a:r>
+              <a:rPr lang="en-US" dirty="0"/>
+              <a:t> + temperature + PAR + LMA +</a:t>
+            </a:r>
+            <a:r>
+              <a:rPr lang="en-US" dirty="0" err="1"/>
+              <a:t>Nfixer</a:t>
+            </a:r>
+            <a:endParaRPr lang="en-US" dirty="0"/>
+          </a:p>
+          <a:p>
+            <a:pPr lvl="1"/>
+            <a:r>
+              <a:rPr lang="en-US" dirty="0"/>
+              <a:t>Random terms: site + </a:t>
+            </a:r>
+            <a:r>
+              <a:rPr lang="en-US" dirty="0" err="1"/>
+              <a:t>site:block</a:t>
+            </a:r>
+            <a:r>
+              <a:rPr lang="en-US" dirty="0"/>
+              <a:t> + species</a:t>
+            </a:r>
+          </a:p>
+          <a:p>
+            <a:r>
+              <a:rPr lang="en-US" dirty="0"/>
+              <a:t>Model predictors of leaf </a:t>
+            </a:r>
+            <a:r>
+              <a:rPr lang="en-US" dirty="0" err="1"/>
+              <a:t>N</a:t>
+            </a:r>
+            <a:r>
+              <a:rPr lang="en-US" baseline="-25000" dirty="0" err="1"/>
+              <a:t>area</a:t>
+            </a:r>
+            <a:r>
+              <a:rPr lang="en-US" dirty="0"/>
+              <a:t> (mixed model)</a:t>
+            </a:r>
+          </a:p>
+          <a:p>
+            <a:pPr lvl="1"/>
+            <a:r>
+              <a:rPr lang="en-US" dirty="0"/>
+              <a:t>Dependent variable: leaf </a:t>
+            </a:r>
+            <a:r>
+              <a:rPr lang="en-US" dirty="0" err="1"/>
+              <a:t>N</a:t>
+            </a:r>
+            <a:r>
+              <a:rPr lang="en-US" baseline="-25000" dirty="0" err="1"/>
+              <a:t>area</a:t>
+            </a:r>
+            <a:endParaRPr lang="en-US" baseline="-25000" dirty="0"/>
+          </a:p>
+          <a:p>
+            <a:pPr lvl="1"/>
+            <a:r>
+              <a:rPr lang="en-US" dirty="0"/>
+              <a:t>Fixed effects: soil N * soil P * soil K + predicted </a:t>
+            </a:r>
+            <a:r>
+              <a:rPr lang="en-US" dirty="0" err="1"/>
+              <a:t>Nphoto</a:t>
+            </a:r>
+            <a:r>
+              <a:rPr lang="en-US" dirty="0"/>
+              <a:t> + predicted </a:t>
+            </a:r>
+            <a:r>
+              <a:rPr lang="en-US" dirty="0" err="1"/>
+              <a:t>Nstructure</a:t>
+            </a:r>
+            <a:r>
+              <a:rPr lang="en-US" dirty="0"/>
+              <a:t> + </a:t>
+            </a:r>
+            <a:r>
+              <a:rPr lang="en-US" dirty="0" err="1"/>
+              <a:t>Nfixer</a:t>
+            </a:r>
+            <a:r>
+              <a:rPr lang="en-US" dirty="0"/>
+              <a:t> + photosynthetic pathway</a:t>
+            </a:r>
+          </a:p>
+          <a:p>
+            <a:pPr lvl="1"/>
+            <a:r>
+              <a:rPr lang="en-US" dirty="0"/>
+              <a:t>Random terms: site + </a:t>
+            </a:r>
+            <a:r>
+              <a:rPr lang="en-US" dirty="0" err="1"/>
+              <a:t>site:block</a:t>
+            </a:r>
+            <a:r>
+              <a:rPr lang="en-US" dirty="0"/>
+              <a:t> + species</a:t>
+            </a:r>
+          </a:p>
+        </p:txBody>
+      </p:sp>
+    </p:spTree>
+    <p:extLst>
+      <p:ext uri="{BB962C8B-B14F-4D97-AF65-F5344CB8AC3E}">
+        <p14:creationId xmlns:p14="http://schemas.microsoft.com/office/powerpoint/2010/main" val="3618313253"/>
+      </p:ext>
+    </p:extLst>
+  </p:cSld>
+  <p:clrMapOvr>
+    <a:masterClrMapping/>
+  </p:clrMapOvr>
+</p:sld>
+</file>
+
+<file path=ppt/slides/slide12.xml><?xml version="1.0" encoding="utf-8"?>
+<p:sld xmlns:a="http://schemas.openxmlformats.org/drawingml/2006/main" xmlns:r="http://schemas.openxmlformats.org/officeDocument/2006/relationships" xmlns:p="http://schemas.openxmlformats.org/presentationml/2006/main">
+  <p:cSld>
+    <p:spTree>
+      <p:nvGrpSpPr>
+        <p:cNvPr id="1" name=""/>
+        <p:cNvGrpSpPr/>
+        <p:nvPr/>
+      </p:nvGrpSpPr>
+      <p:grpSpPr>
+        <a:xfrm>
+          <a:off x="0" y="0"/>
+          <a:ext cx="0" cy="0"/>
+          <a:chOff x="0" y="0"/>
+          <a:chExt cx="0" cy="0"/>
+        </a:xfrm>
+      </p:grpSpPr>
+      <p:sp>
+        <p:nvSpPr>
+          <p:cNvPr id="2" name="Title 1">
+            <a:extLst>
+              <a:ext uri="{FF2B5EF4-FFF2-40B4-BE49-F238E27FC236}">
+                <a16:creationId xmlns:a16="http://schemas.microsoft.com/office/drawing/2014/main" id="{E4387BE1-9310-C44D-869D-F635AC6DC4CD}"/>
+              </a:ext>
+            </a:extLst>
+          </p:cNvPr>
+          <p:cNvSpPr>
+            <a:spLocks noGrp="1"/>
+          </p:cNvSpPr>
+          <p:nvPr>
+            <p:ph type="title"/>
+          </p:nvPr>
+        </p:nvSpPr>
+        <p:spPr/>
+        <p:txBody>
+          <a:bodyPr/>
+          <a:lstStyle/>
+          <a:p>
+            <a:r>
+              <a:rPr lang="en-US" dirty="0"/>
+              <a:t>Analyses CTD</a:t>
+            </a:r>
+          </a:p>
+        </p:txBody>
+      </p:sp>
+      <p:sp>
+        <p:nvSpPr>
+          <p:cNvPr id="3" name="Content Placeholder 2">
+            <a:extLst>
+              <a:ext uri="{FF2B5EF4-FFF2-40B4-BE49-F238E27FC236}">
+                <a16:creationId xmlns:a16="http://schemas.microsoft.com/office/drawing/2014/main" id="{B7AD2C18-251F-7E41-AAA0-631F2901F61B}"/>
+              </a:ext>
+            </a:extLst>
+          </p:cNvPr>
+          <p:cNvSpPr>
+            <a:spLocks noGrp="1"/>
+          </p:cNvSpPr>
+          <p:nvPr>
+            <p:ph idx="1"/>
+          </p:nvPr>
+        </p:nvSpPr>
+        <p:spPr/>
+        <p:txBody>
+          <a:bodyPr/>
+          <a:lstStyle/>
+          <a:p>
+            <a:r>
+              <a:rPr lang="en-US" dirty="0"/>
+              <a:t>LAI response to soil N</a:t>
+            </a:r>
+          </a:p>
+          <a:p>
+            <a:pPr lvl="1"/>
+            <a:r>
+              <a:rPr lang="en-US" dirty="0"/>
+              <a:t>Dependent variable: plot LAI</a:t>
+            </a:r>
+          </a:p>
+          <a:p>
+            <a:pPr lvl="1"/>
+            <a:r>
+              <a:rPr lang="en-US" dirty="0"/>
+              <a:t>Fixed effects: soil N * soil P * soil K + </a:t>
+            </a:r>
+            <a:r>
+              <a:rPr lang="el-GR" dirty="0"/>
+              <a:t>χ</a:t>
+            </a:r>
+            <a:r>
+              <a:rPr lang="en-US" dirty="0"/>
+              <a:t> + temperature + PAR + LMA +</a:t>
+            </a:r>
+            <a:r>
+              <a:rPr lang="en-US" dirty="0" err="1"/>
+              <a:t>Nfixer</a:t>
+            </a:r>
+            <a:r>
+              <a:rPr lang="en-US" dirty="0"/>
+              <a:t> + photosynthetic pathway</a:t>
+            </a:r>
+          </a:p>
+          <a:p>
+            <a:pPr lvl="1"/>
+            <a:r>
+              <a:rPr lang="en-US" dirty="0"/>
+              <a:t>Random terms: site + </a:t>
+            </a:r>
+            <a:r>
+              <a:rPr lang="en-US" dirty="0" err="1"/>
+              <a:t>site:block</a:t>
+            </a:r>
+            <a:r>
+              <a:rPr lang="en-US" dirty="0"/>
+              <a:t> + species</a:t>
+            </a:r>
+          </a:p>
+          <a:p>
+            <a:r>
+              <a:rPr lang="en-US" dirty="0"/>
+              <a:t>Supply/demand effects on leaf </a:t>
+            </a:r>
+            <a:r>
+              <a:rPr lang="en-US" dirty="0" err="1"/>
+              <a:t>N</a:t>
+            </a:r>
+            <a:r>
+              <a:rPr lang="en-US" baseline="-25000" dirty="0" err="1"/>
+              <a:t>area</a:t>
+            </a:r>
+            <a:r>
+              <a:rPr lang="en-US" dirty="0"/>
+              <a:t> (linear model)</a:t>
+            </a:r>
+          </a:p>
+          <a:p>
+            <a:pPr lvl="1"/>
+            <a:r>
+              <a:rPr lang="en-US" dirty="0"/>
+              <a:t>Dependent variable: change in plot averaged leaf </a:t>
+            </a:r>
+            <a:r>
+              <a:rPr lang="en-US" dirty="0" err="1"/>
+              <a:t>N</a:t>
+            </a:r>
+            <a:r>
+              <a:rPr lang="en-US" baseline="-25000" dirty="0" err="1"/>
+              <a:t>area</a:t>
+            </a:r>
+            <a:r>
+              <a:rPr lang="en-US" dirty="0"/>
+              <a:t> in N addition plots</a:t>
+            </a:r>
+          </a:p>
+          <a:p>
+            <a:pPr lvl="1"/>
+            <a:r>
+              <a:rPr lang="en-US" dirty="0"/>
+              <a:t>Fixed effects: change in plot LAI in N addition plots</a:t>
+            </a:r>
+          </a:p>
+        </p:txBody>
+      </p:sp>
+    </p:spTree>
+    <p:extLst>
+      <p:ext uri="{BB962C8B-B14F-4D97-AF65-F5344CB8AC3E}">
+        <p14:creationId xmlns:p14="http://schemas.microsoft.com/office/powerpoint/2010/main" val="2188283881"/>
+      </p:ext>
+    </p:extLst>
+  </p:cSld>
+  <p:clrMapOvr>
+    <a:masterClrMapping/>
+  </p:clrMapOvr>
+</p:sld>
+</file>
+
+<file path=ppt/slides/slide13.xml><?xml version="1.0" encoding="utf-8"?>
+<p:sld xmlns:a="http://schemas.openxmlformats.org/drawingml/2006/main" xmlns:r="http://schemas.openxmlformats.org/officeDocument/2006/relationships" xmlns:p="http://schemas.openxmlformats.org/presentationml/2006/main">
+  <p:cSld>
+    <p:spTree>
+      <p:nvGrpSpPr>
+        <p:cNvPr id="1" name=""/>
+        <p:cNvGrpSpPr/>
+        <p:nvPr/>
+      </p:nvGrpSpPr>
+      <p:grpSpPr>
+        <a:xfrm>
+          <a:off x="0" y="0"/>
+          <a:ext cx="0" cy="0"/>
+          <a:chOff x="0" y="0"/>
+          <a:chExt cx="0" cy="0"/>
+        </a:xfrm>
+      </p:grpSpPr>
+      <p:sp>
+        <p:nvSpPr>
+          <p:cNvPr id="2" name="Title 1">
+            <a:extLst>
+              <a:ext uri="{FF2B5EF4-FFF2-40B4-BE49-F238E27FC236}">
                 <a16:creationId xmlns:a16="http://schemas.microsoft.com/office/drawing/2014/main" id="{235D3C26-E1ED-D447-AB61-86E2E918D345}"/>
               </a:ext>
             </a:extLst>
@@ -3586,17 +4041,194 @@
           <a:p>
             <a:r>
               <a:rPr lang="en-US" dirty="0"/>
-              <a:t>Results: What about other variables?</a:t>
+              <a:t>Results: Does soil N impact leaf </a:t>
+            </a:r>
+            <a:r>
+              <a:rPr lang="en-US" dirty="0" err="1"/>
+              <a:t>N</a:t>
+            </a:r>
+            <a:r>
+              <a:rPr lang="en-US" baseline="-25000" dirty="0" err="1"/>
+              <a:t>area</a:t>
+            </a:r>
+            <a:r>
+              <a:rPr lang="en-US" dirty="0"/>
+              <a:t>?</a:t>
+            </a:r>
+          </a:p>
+        </p:txBody>
+      </p:sp>
+      <p:sp>
+        <p:nvSpPr>
+          <p:cNvPr id="3" name="Content Placeholder 2">
+            <a:extLst>
+              <a:ext uri="{FF2B5EF4-FFF2-40B4-BE49-F238E27FC236}">
+                <a16:creationId xmlns:a16="http://schemas.microsoft.com/office/drawing/2014/main" id="{A80FC0BD-1D5A-F949-BA4E-8FF9C08883E3}"/>
+              </a:ext>
+            </a:extLst>
+          </p:cNvPr>
+          <p:cNvSpPr>
+            <a:spLocks noGrp="1"/>
+          </p:cNvSpPr>
+          <p:nvPr>
+            <p:ph idx="1"/>
+          </p:nvPr>
+        </p:nvSpPr>
+        <p:spPr>
+          <a:xfrm>
+            <a:off x="838200" y="1825625"/>
+            <a:ext cx="5761383" cy="4351338"/>
+          </a:xfrm>
+        </p:spPr>
+        <p:txBody>
+          <a:bodyPr>
+            <a:normAutofit/>
+          </a:bodyPr>
+          <a:lstStyle/>
+          <a:p>
+            <a:r>
+              <a:rPr lang="en-US" sz="4800" dirty="0"/>
+              <a:t>18% increase in leaf </a:t>
+            </a:r>
+            <a:r>
+              <a:rPr lang="en-US" sz="4800" dirty="0" err="1"/>
+              <a:t>Narea</a:t>
+            </a:r>
+            <a:r>
+              <a:rPr lang="en-US" sz="4800" dirty="0"/>
+              <a:t> with soil N (p &lt; 0.01)</a:t>
             </a:r>
           </a:p>
         </p:txBody>
       </p:sp>
       <p:pic>
         <p:nvPicPr>
-          <p:cNvPr id="11" name="Picture 10">
-            <a:extLst>
-              <a:ext uri="{FF2B5EF4-FFF2-40B4-BE49-F238E27FC236}">
-                <a16:creationId xmlns:a16="http://schemas.microsoft.com/office/drawing/2014/main" id="{06958F7B-19AD-6E43-83FA-3E68312FCF4D}"/>
+          <p:cNvPr id="7" name="Picture 6">
+            <a:extLst>
+              <a:ext uri="{FF2B5EF4-FFF2-40B4-BE49-F238E27FC236}">
+                <a16:creationId xmlns:a16="http://schemas.microsoft.com/office/drawing/2014/main" id="{24B77338-97EE-9342-BA1B-F229B6696001}"/>
+              </a:ext>
+            </a:extLst>
+          </p:cNvPr>
+          <p:cNvPicPr>
+            <a:picLocks noChangeAspect="1"/>
+          </p:cNvPicPr>
+          <p:nvPr/>
+        </p:nvPicPr>
+        <p:blipFill rotWithShape="1">
+          <a:blip r:embed="rId2"/>
+          <a:srcRect r="50000"/>
+          <a:stretch/>
+        </p:blipFill>
+        <p:spPr>
+          <a:xfrm>
+            <a:off x="6851373" y="1516010"/>
+            <a:ext cx="4929809" cy="5219797"/>
+          </a:xfrm>
+          <a:prstGeom prst="rect">
+            <a:avLst/>
+          </a:prstGeom>
+        </p:spPr>
+      </p:pic>
+    </p:spTree>
+    <p:extLst>
+      <p:ext uri="{BB962C8B-B14F-4D97-AF65-F5344CB8AC3E}">
+        <p14:creationId xmlns:p14="http://schemas.microsoft.com/office/powerpoint/2010/main" val="2050478363"/>
+      </p:ext>
+    </p:extLst>
+  </p:cSld>
+  <p:clrMapOvr>
+    <a:masterClrMapping/>
+  </p:clrMapOvr>
+</p:sld>
+</file>
+
+<file path=ppt/slides/slide14.xml><?xml version="1.0" encoding="utf-8"?>
+<p:sld xmlns:a="http://schemas.openxmlformats.org/drawingml/2006/main" xmlns:r="http://schemas.openxmlformats.org/officeDocument/2006/relationships" xmlns:p="http://schemas.openxmlformats.org/presentationml/2006/main">
+  <p:cSld>
+    <p:spTree>
+      <p:nvGrpSpPr>
+        <p:cNvPr id="1" name=""/>
+        <p:cNvGrpSpPr/>
+        <p:nvPr/>
+      </p:nvGrpSpPr>
+      <p:grpSpPr>
+        <a:xfrm>
+          <a:off x="0" y="0"/>
+          <a:ext cx="0" cy="0"/>
+          <a:chOff x="0" y="0"/>
+          <a:chExt cx="0" cy="0"/>
+        </a:xfrm>
+      </p:grpSpPr>
+      <p:sp>
+        <p:nvSpPr>
+          <p:cNvPr id="2" name="Title 1">
+            <a:extLst>
+              <a:ext uri="{FF2B5EF4-FFF2-40B4-BE49-F238E27FC236}">
+                <a16:creationId xmlns:a16="http://schemas.microsoft.com/office/drawing/2014/main" id="{235D3C26-E1ED-D447-AB61-86E2E918D345}"/>
+              </a:ext>
+            </a:extLst>
+          </p:cNvPr>
+          <p:cNvSpPr>
+            <a:spLocks noGrp="1"/>
+          </p:cNvSpPr>
+          <p:nvPr>
+            <p:ph type="title"/>
+          </p:nvPr>
+        </p:nvSpPr>
+        <p:spPr/>
+        <p:txBody>
+          <a:bodyPr/>
+          <a:lstStyle/>
+          <a:p>
+            <a:r>
+              <a:rPr lang="en-US" dirty="0"/>
+              <a:t>Results: What about other variables?</a:t>
+            </a:r>
+          </a:p>
+        </p:txBody>
+      </p:sp>
+      <p:sp>
+        <p:nvSpPr>
+          <p:cNvPr id="6" name="TextBox 5">
+            <a:extLst>
+              <a:ext uri="{FF2B5EF4-FFF2-40B4-BE49-F238E27FC236}">
+                <a16:creationId xmlns:a16="http://schemas.microsoft.com/office/drawing/2014/main" id="{B58D2A56-92D9-0D44-B58B-0940C39821C9}"/>
+              </a:ext>
+            </a:extLst>
+          </p:cNvPr>
+          <p:cNvSpPr txBox="1"/>
+          <p:nvPr/>
+        </p:nvSpPr>
+        <p:spPr>
+          <a:xfrm>
+            <a:off x="10270435" y="3544407"/>
+            <a:ext cx="1921566" cy="2677656"/>
+          </a:xfrm>
+          <a:prstGeom prst="rect">
+            <a:avLst/>
+          </a:prstGeom>
+          <a:noFill/>
+        </p:spPr>
+        <p:txBody>
+          <a:bodyPr wrap="square" rtlCol="0">
+            <a:spAutoFit/>
+          </a:bodyPr>
+          <a:lstStyle/>
+          <a:p>
+            <a:r>
+              <a:rPr lang="en-US" sz="2800" dirty="0"/>
+              <a:t>Soil (brown) is not that important (&lt;2% combined)</a:t>
+            </a:r>
+          </a:p>
+        </p:txBody>
+      </p:sp>
+      <p:pic>
+        <p:nvPicPr>
+          <p:cNvPr id="4" name="Picture 3">
+            <a:extLst>
+              <a:ext uri="{FF2B5EF4-FFF2-40B4-BE49-F238E27FC236}">
+                <a16:creationId xmlns:a16="http://schemas.microsoft.com/office/drawing/2014/main" id="{D1BB47D3-5A09-5541-B90A-1EA6683D3E7B}"/>
               </a:ext>
             </a:extLst>
           </p:cNvPr>
@@ -3613,20 +4245,78 @@
         </p:blipFill>
         <p:spPr>
           <a:xfrm>
-            <a:off x="275099" y="1399141"/>
-            <a:ext cx="9995336" cy="5291648"/>
+            <a:off x="0" y="1436496"/>
+            <a:ext cx="9859617" cy="5219797"/>
           </a:xfrm>
           <a:prstGeom prst="rect">
             <a:avLst/>
           </a:prstGeom>
         </p:spPr>
       </p:pic>
-      <p:sp>
-        <p:nvSpPr>
-          <p:cNvPr id="6" name="TextBox 5">
-            <a:extLst>
-              <a:ext uri="{FF2B5EF4-FFF2-40B4-BE49-F238E27FC236}">
-                <a16:creationId xmlns:a16="http://schemas.microsoft.com/office/drawing/2014/main" id="{B58D2A56-92D9-0D44-B58B-0940C39821C9}"/>
+    </p:spTree>
+    <p:extLst>
+      <p:ext uri="{BB962C8B-B14F-4D97-AF65-F5344CB8AC3E}">
+        <p14:creationId xmlns:p14="http://schemas.microsoft.com/office/powerpoint/2010/main" val="4194682511"/>
+      </p:ext>
+    </p:extLst>
+  </p:cSld>
+  <p:clrMapOvr>
+    <a:masterClrMapping/>
+  </p:clrMapOvr>
+</p:sld>
+</file>
+
+<file path=ppt/slides/slide15.xml><?xml version="1.0" encoding="utf-8"?>
+<p:sld xmlns:a="http://schemas.openxmlformats.org/drawingml/2006/main" xmlns:r="http://schemas.openxmlformats.org/officeDocument/2006/relationships" xmlns:p="http://schemas.openxmlformats.org/presentationml/2006/main">
+  <p:cSld>
+    <p:spTree>
+      <p:nvGrpSpPr>
+        <p:cNvPr id="1" name=""/>
+        <p:cNvGrpSpPr/>
+        <p:nvPr/>
+      </p:nvGrpSpPr>
+      <p:grpSpPr>
+        <a:xfrm>
+          <a:off x="0" y="0"/>
+          <a:ext cx="0" cy="0"/>
+          <a:chOff x="0" y="0"/>
+          <a:chExt cx="0" cy="0"/>
+        </a:xfrm>
+      </p:grpSpPr>
+      <p:sp>
+        <p:nvSpPr>
+          <p:cNvPr id="2" name="Title 1">
+            <a:extLst>
+              <a:ext uri="{FF2B5EF4-FFF2-40B4-BE49-F238E27FC236}">
+                <a16:creationId xmlns:a16="http://schemas.microsoft.com/office/drawing/2014/main" id="{11237649-0706-2643-B14E-55654013FF2F}"/>
+              </a:ext>
+            </a:extLst>
+          </p:cNvPr>
+          <p:cNvSpPr>
+            <a:spLocks noGrp="1"/>
+          </p:cNvSpPr>
+          <p:nvPr>
+            <p:ph type="title"/>
+          </p:nvPr>
+        </p:nvSpPr>
+        <p:spPr/>
+        <p:txBody>
+          <a:bodyPr/>
+          <a:lstStyle/>
+          <a:p>
+            <a:r>
+              <a:rPr lang="en-US" dirty="0"/>
+              <a:t>Results: What about other variables?</a:t>
+            </a:r>
+          </a:p>
+        </p:txBody>
+      </p:sp>
+      <p:sp>
+        <p:nvSpPr>
+          <p:cNvPr id="5" name="TextBox 4">
+            <a:extLst>
+              <a:ext uri="{FF2B5EF4-FFF2-40B4-BE49-F238E27FC236}">
+                <a16:creationId xmlns:a16="http://schemas.microsoft.com/office/drawing/2014/main" id="{0BCB4DDA-FC8E-8F4E-97DC-D65690E1EF41}"/>
               </a:ext>
             </a:extLst>
           </p:cNvPr>
@@ -3635,8 +4325,8 @@
         </p:nvSpPr>
         <p:spPr>
           <a:xfrm>
-            <a:off x="10270435" y="3544407"/>
-            <a:ext cx="1921566" cy="1815882"/>
+            <a:off x="9064487" y="2676939"/>
+            <a:ext cx="3127513" cy="1815882"/>
           </a:xfrm>
           <a:prstGeom prst="rect">
             <a:avLst/>
@@ -3651,15 +4341,524 @@
           <a:p>
             <a:r>
               <a:rPr lang="en-US" sz="2800" dirty="0"/>
-              <a:t>Soil (brown) is not that important</a:t>
-            </a:r>
-          </a:p>
-        </p:txBody>
-      </p:sp>
+              <a:t>Structural and photosynthetic N combined explain 69% of leaf </a:t>
+            </a:r>
+            <a:r>
+              <a:rPr lang="en-US" sz="2800" dirty="0" err="1"/>
+              <a:t>N</a:t>
+            </a:r>
+            <a:r>
+              <a:rPr lang="en-US" sz="2800" baseline="-25000" dirty="0" err="1"/>
+              <a:t>area</a:t>
+            </a:r>
+            <a:endParaRPr lang="en-US" sz="2800" baseline="-25000" dirty="0"/>
+          </a:p>
+        </p:txBody>
+      </p:sp>
+      <p:pic>
+        <p:nvPicPr>
+          <p:cNvPr id="7" name="Picture 6">
+            <a:extLst>
+              <a:ext uri="{FF2B5EF4-FFF2-40B4-BE49-F238E27FC236}">
+                <a16:creationId xmlns:a16="http://schemas.microsoft.com/office/drawing/2014/main" id="{5F332E40-D7F3-E648-A8BA-B6C5A7026EAA}"/>
+              </a:ext>
+            </a:extLst>
+          </p:cNvPr>
+          <p:cNvPicPr>
+            <a:picLocks noChangeAspect="1"/>
+          </p:cNvPicPr>
+          <p:nvPr/>
+        </p:nvPicPr>
+        <p:blipFill>
+          <a:blip r:embed="rId2"/>
+          <a:stretch>
+            <a:fillRect/>
+          </a:stretch>
+        </p:blipFill>
+        <p:spPr>
+          <a:xfrm>
+            <a:off x="838200" y="1690688"/>
+            <a:ext cx="7770191" cy="4856369"/>
+          </a:xfrm>
+          <a:prstGeom prst="rect">
+            <a:avLst/>
+          </a:prstGeom>
+        </p:spPr>
+      </p:pic>
     </p:spTree>
     <p:extLst>
       <p:ext uri="{BB962C8B-B14F-4D97-AF65-F5344CB8AC3E}">
-        <p14:creationId xmlns:p14="http://schemas.microsoft.com/office/powerpoint/2010/main" val="4194682511"/>
+        <p14:creationId xmlns:p14="http://schemas.microsoft.com/office/powerpoint/2010/main" val="1998700469"/>
+      </p:ext>
+    </p:extLst>
+  </p:cSld>
+  <p:clrMapOvr>
+    <a:masterClrMapping/>
+  </p:clrMapOvr>
+</p:sld>
+</file>
+
+<file path=ppt/slides/slide16.xml><?xml version="1.0" encoding="utf-8"?>
+<p:sld xmlns:a="http://schemas.openxmlformats.org/drawingml/2006/main" xmlns:r="http://schemas.openxmlformats.org/officeDocument/2006/relationships" xmlns:p="http://schemas.openxmlformats.org/presentationml/2006/main">
+  <p:cSld>
+    <p:spTree>
+      <p:nvGrpSpPr>
+        <p:cNvPr id="1" name=""/>
+        <p:cNvGrpSpPr/>
+        <p:nvPr/>
+      </p:nvGrpSpPr>
+      <p:grpSpPr>
+        <a:xfrm>
+          <a:off x="0" y="0"/>
+          <a:ext cx="0" cy="0"/>
+          <a:chOff x="0" y="0"/>
+          <a:chExt cx="0" cy="0"/>
+        </a:xfrm>
+      </p:grpSpPr>
+      <p:sp>
+        <p:nvSpPr>
+          <p:cNvPr id="2" name="Title 1">
+            <a:extLst>
+              <a:ext uri="{FF2B5EF4-FFF2-40B4-BE49-F238E27FC236}">
+                <a16:creationId xmlns:a16="http://schemas.microsoft.com/office/drawing/2014/main" id="{1E4F0A87-20B3-7E47-B010-7A871D578E44}"/>
+              </a:ext>
+            </a:extLst>
+          </p:cNvPr>
+          <p:cNvSpPr>
+            <a:spLocks noGrp="1"/>
+          </p:cNvSpPr>
+          <p:nvPr>
+            <p:ph type="title"/>
+          </p:nvPr>
+        </p:nvSpPr>
+        <p:spPr/>
+        <p:txBody>
+          <a:bodyPr/>
+          <a:lstStyle/>
+          <a:p>
+            <a:r>
+              <a:rPr lang="en-US" dirty="0"/>
+              <a:t>Results: What is the LAI response to soil N?</a:t>
+            </a:r>
+          </a:p>
+        </p:txBody>
+      </p:sp>
+      <p:sp>
+        <p:nvSpPr>
+          <p:cNvPr id="8" name="TextBox 7">
+            <a:extLst>
+              <a:ext uri="{FF2B5EF4-FFF2-40B4-BE49-F238E27FC236}">
+                <a16:creationId xmlns:a16="http://schemas.microsoft.com/office/drawing/2014/main" id="{A96BE0C8-3669-C642-8520-F583FEBC9A72}"/>
+              </a:ext>
+            </a:extLst>
+          </p:cNvPr>
+          <p:cNvSpPr txBox="1"/>
+          <p:nvPr/>
+        </p:nvSpPr>
+        <p:spPr>
+          <a:xfrm>
+            <a:off x="7033328" y="2703444"/>
+            <a:ext cx="5158672" cy="1200329"/>
+          </a:xfrm>
+          <a:prstGeom prst="rect">
+            <a:avLst/>
+          </a:prstGeom>
+          <a:noFill/>
+        </p:spPr>
+        <p:txBody>
+          <a:bodyPr wrap="square" rtlCol="0">
+            <a:spAutoFit/>
+          </a:bodyPr>
+          <a:lstStyle/>
+          <a:p>
+            <a:r>
+              <a:rPr lang="en-US" sz="3600" dirty="0"/>
+              <a:t>38% increase in LAI (p &lt; 0.001)</a:t>
+            </a:r>
+          </a:p>
+        </p:txBody>
+      </p:sp>
+      <p:sp>
+        <p:nvSpPr>
+          <p:cNvPr id="3" name="TextBox 2">
+            <a:extLst>
+              <a:ext uri="{FF2B5EF4-FFF2-40B4-BE49-F238E27FC236}">
+                <a16:creationId xmlns:a16="http://schemas.microsoft.com/office/drawing/2014/main" id="{FD6884CC-0A81-2748-BEC9-B4A8A76F0A51}"/>
+              </a:ext>
+            </a:extLst>
+          </p:cNvPr>
+          <p:cNvSpPr txBox="1"/>
+          <p:nvPr/>
+        </p:nvSpPr>
+        <p:spPr>
+          <a:xfrm>
+            <a:off x="7315200" y="4141822"/>
+            <a:ext cx="4492488" cy="954107"/>
+          </a:xfrm>
+          <a:prstGeom prst="rect">
+            <a:avLst/>
+          </a:prstGeom>
+          <a:noFill/>
+        </p:spPr>
+        <p:txBody>
+          <a:bodyPr wrap="square" rtlCol="0">
+            <a:spAutoFit/>
+          </a:bodyPr>
+          <a:lstStyle/>
+          <a:p>
+            <a:r>
+              <a:rPr lang="en-US" sz="2800" dirty="0">
+                <a:solidFill>
+                  <a:srgbClr val="FF0000"/>
+                </a:solidFill>
+              </a:rPr>
+              <a:t>More N going to leaf quantity than quality</a:t>
+            </a:r>
+          </a:p>
+        </p:txBody>
+      </p:sp>
+      <p:pic>
+        <p:nvPicPr>
+          <p:cNvPr id="5" name="Picture 4">
+            <a:extLst>
+              <a:ext uri="{FF2B5EF4-FFF2-40B4-BE49-F238E27FC236}">
+                <a16:creationId xmlns:a16="http://schemas.microsoft.com/office/drawing/2014/main" id="{321D2C9C-DA7C-884A-8255-7DB257EAE9A9}"/>
+              </a:ext>
+            </a:extLst>
+          </p:cNvPr>
+          <p:cNvPicPr>
+            <a:picLocks noChangeAspect="1"/>
+          </p:cNvPicPr>
+          <p:nvPr/>
+        </p:nvPicPr>
+        <p:blipFill>
+          <a:blip r:embed="rId2"/>
+          <a:stretch>
+            <a:fillRect/>
+          </a:stretch>
+        </p:blipFill>
+        <p:spPr>
+          <a:xfrm>
+            <a:off x="1706255" y="1428625"/>
+            <a:ext cx="4933084" cy="5426393"/>
+          </a:xfrm>
+          <a:prstGeom prst="rect">
+            <a:avLst/>
+          </a:prstGeom>
+        </p:spPr>
+      </p:pic>
+    </p:spTree>
+    <p:extLst>
+      <p:ext uri="{BB962C8B-B14F-4D97-AF65-F5344CB8AC3E}">
+        <p14:creationId xmlns:p14="http://schemas.microsoft.com/office/powerpoint/2010/main" val="1796116623"/>
+      </p:ext>
+    </p:extLst>
+  </p:cSld>
+  <p:clrMapOvr>
+    <a:masterClrMapping/>
+  </p:clrMapOvr>
+</p:sld>
+</file>
+
+<file path=ppt/slides/slide17.xml><?xml version="1.0" encoding="utf-8"?>
+<p:sld xmlns:a="http://schemas.openxmlformats.org/drawingml/2006/main" xmlns:r="http://schemas.openxmlformats.org/officeDocument/2006/relationships" xmlns:p="http://schemas.openxmlformats.org/presentationml/2006/main">
+  <p:cSld>
+    <p:spTree>
+      <p:nvGrpSpPr>
+        <p:cNvPr id="1" name=""/>
+        <p:cNvGrpSpPr/>
+        <p:nvPr/>
+      </p:nvGrpSpPr>
+      <p:grpSpPr>
+        <a:xfrm>
+          <a:off x="0" y="0"/>
+          <a:ext cx="0" cy="0"/>
+          <a:chOff x="0" y="0"/>
+          <a:chExt cx="0" cy="0"/>
+        </a:xfrm>
+      </p:grpSpPr>
+      <p:sp>
+        <p:nvSpPr>
+          <p:cNvPr id="2" name="Title 1">
+            <a:extLst>
+              <a:ext uri="{FF2B5EF4-FFF2-40B4-BE49-F238E27FC236}">
+                <a16:creationId xmlns:a16="http://schemas.microsoft.com/office/drawing/2014/main" id="{76EFAC51-0A4F-D64F-90F2-DABC34E0269E}"/>
+              </a:ext>
+            </a:extLst>
+          </p:cNvPr>
+          <p:cNvSpPr>
+            <a:spLocks noGrp="1"/>
+          </p:cNvSpPr>
+          <p:nvPr>
+            <p:ph type="title"/>
+          </p:nvPr>
+        </p:nvSpPr>
+        <p:spPr/>
+        <p:txBody>
+          <a:bodyPr/>
+          <a:lstStyle/>
+          <a:p>
+            <a:r>
+              <a:rPr lang="en-US" dirty="0"/>
+              <a:t>Results: Does the impact of soil N on leaf </a:t>
+            </a:r>
+            <a:r>
+              <a:rPr lang="en-US" dirty="0" err="1"/>
+              <a:t>Narea</a:t>
+            </a:r>
+            <a:r>
+              <a:rPr lang="en-US" dirty="0"/>
+              <a:t> vary with leaf N demand?</a:t>
+            </a:r>
+          </a:p>
+        </p:txBody>
+      </p:sp>
+      <p:pic>
+        <p:nvPicPr>
+          <p:cNvPr id="3" name="Picture 2">
+            <a:extLst>
+              <a:ext uri="{FF2B5EF4-FFF2-40B4-BE49-F238E27FC236}">
+                <a16:creationId xmlns:a16="http://schemas.microsoft.com/office/drawing/2014/main" id="{C1C38879-7208-5D48-82D5-543072CEAA2B}"/>
+              </a:ext>
+            </a:extLst>
+          </p:cNvPr>
+          <p:cNvPicPr>
+            <a:picLocks noChangeAspect="1"/>
+          </p:cNvPicPr>
+          <p:nvPr/>
+        </p:nvPicPr>
+        <p:blipFill>
+          <a:blip r:embed="rId2"/>
+          <a:stretch>
+            <a:fillRect/>
+          </a:stretch>
+        </p:blipFill>
+        <p:spPr>
+          <a:xfrm>
+            <a:off x="1834481" y="1690688"/>
+            <a:ext cx="4261519" cy="4971772"/>
+          </a:xfrm>
+          <a:prstGeom prst="rect">
+            <a:avLst/>
+          </a:prstGeom>
+        </p:spPr>
+      </p:pic>
+      <p:sp>
+        <p:nvSpPr>
+          <p:cNvPr id="4" name="TextBox 3">
+            <a:extLst>
+              <a:ext uri="{FF2B5EF4-FFF2-40B4-BE49-F238E27FC236}">
+                <a16:creationId xmlns:a16="http://schemas.microsoft.com/office/drawing/2014/main" id="{BE554A7E-DC9E-EE41-8FE8-E5C35222F645}"/>
+              </a:ext>
+            </a:extLst>
+          </p:cNvPr>
+          <p:cNvSpPr txBox="1"/>
+          <p:nvPr/>
+        </p:nvSpPr>
+        <p:spPr>
+          <a:xfrm>
+            <a:off x="6480313" y="3246783"/>
+            <a:ext cx="5711687" cy="1815882"/>
+          </a:xfrm>
+          <a:prstGeom prst="rect">
+            <a:avLst/>
+          </a:prstGeom>
+          <a:noFill/>
+        </p:spPr>
+        <p:txBody>
+          <a:bodyPr wrap="square" rtlCol="0">
+            <a:spAutoFit/>
+          </a:bodyPr>
+          <a:lstStyle/>
+          <a:p>
+            <a:r>
+              <a:rPr lang="en-US" sz="2800" dirty="0"/>
+              <a:t>The change in leaf </a:t>
+            </a:r>
+            <a:r>
+              <a:rPr lang="en-US" sz="2800" dirty="0" err="1"/>
+              <a:t>Narea</a:t>
+            </a:r>
+            <a:r>
+              <a:rPr lang="en-US" sz="2800" dirty="0"/>
+              <a:t> should be greater in places where the LAI (or plant N demand) doesn’t change much</a:t>
+            </a:r>
+          </a:p>
+        </p:txBody>
+      </p:sp>
+    </p:spTree>
+    <p:extLst>
+      <p:ext uri="{BB962C8B-B14F-4D97-AF65-F5344CB8AC3E}">
+        <p14:creationId xmlns:p14="http://schemas.microsoft.com/office/powerpoint/2010/main" val="2227413631"/>
+      </p:ext>
+    </p:extLst>
+  </p:cSld>
+  <p:clrMapOvr>
+    <a:masterClrMapping/>
+  </p:clrMapOvr>
+</p:sld>
+</file>
+
+<file path=ppt/slides/slide18.xml><?xml version="1.0" encoding="utf-8"?>
+<p:sld xmlns:a="http://schemas.openxmlformats.org/drawingml/2006/main" xmlns:r="http://schemas.openxmlformats.org/officeDocument/2006/relationships" xmlns:p="http://schemas.openxmlformats.org/presentationml/2006/main">
+  <p:cSld>
+    <p:spTree>
+      <p:nvGrpSpPr>
+        <p:cNvPr id="1" name=""/>
+        <p:cNvGrpSpPr/>
+        <p:nvPr/>
+      </p:nvGrpSpPr>
+      <p:grpSpPr>
+        <a:xfrm>
+          <a:off x="0" y="0"/>
+          <a:ext cx="0" cy="0"/>
+          <a:chOff x="0" y="0"/>
+          <a:chExt cx="0" cy="0"/>
+        </a:xfrm>
+      </p:grpSpPr>
+      <p:sp>
+        <p:nvSpPr>
+          <p:cNvPr id="2" name="Title 1">
+            <a:extLst>
+              <a:ext uri="{FF2B5EF4-FFF2-40B4-BE49-F238E27FC236}">
+                <a16:creationId xmlns:a16="http://schemas.microsoft.com/office/drawing/2014/main" id="{76EFAC51-0A4F-D64F-90F2-DABC34E0269E}"/>
+              </a:ext>
+            </a:extLst>
+          </p:cNvPr>
+          <p:cNvSpPr>
+            <a:spLocks noGrp="1"/>
+          </p:cNvSpPr>
+          <p:nvPr>
+            <p:ph type="title"/>
+          </p:nvPr>
+        </p:nvSpPr>
+        <p:spPr/>
+        <p:txBody>
+          <a:bodyPr/>
+          <a:lstStyle/>
+          <a:p>
+            <a:r>
+              <a:rPr lang="en-US" dirty="0"/>
+              <a:t>Results: Does the impact of soil N on leaf </a:t>
+            </a:r>
+            <a:r>
+              <a:rPr lang="en-US" dirty="0" err="1"/>
+              <a:t>N</a:t>
+            </a:r>
+            <a:r>
+              <a:rPr lang="en-US" baseline="-25000" dirty="0" err="1"/>
+              <a:t>area</a:t>
+            </a:r>
+            <a:r>
+              <a:rPr lang="en-US" dirty="0"/>
+              <a:t> vary with leaf N demand?</a:t>
+            </a:r>
+          </a:p>
+        </p:txBody>
+      </p:sp>
+      <p:sp>
+        <p:nvSpPr>
+          <p:cNvPr id="7" name="TextBox 6">
+            <a:extLst>
+              <a:ext uri="{FF2B5EF4-FFF2-40B4-BE49-F238E27FC236}">
+                <a16:creationId xmlns:a16="http://schemas.microsoft.com/office/drawing/2014/main" id="{F26C02DA-77F8-AA48-9E86-7C55E4612A19}"/>
+              </a:ext>
+            </a:extLst>
+          </p:cNvPr>
+          <p:cNvSpPr txBox="1"/>
+          <p:nvPr/>
+        </p:nvSpPr>
+        <p:spPr>
+          <a:xfrm>
+            <a:off x="7487478" y="3180522"/>
+            <a:ext cx="1914307" cy="646331"/>
+          </a:xfrm>
+          <a:prstGeom prst="rect">
+            <a:avLst/>
+          </a:prstGeom>
+          <a:noFill/>
+        </p:spPr>
+        <p:txBody>
+          <a:bodyPr wrap="none" rtlCol="0">
+            <a:spAutoFit/>
+          </a:bodyPr>
+          <a:lstStyle/>
+          <a:p>
+            <a:r>
+              <a:rPr lang="en-US" sz="3600" dirty="0">
+                <a:solidFill>
+                  <a:srgbClr val="FF0000"/>
+                </a:solidFill>
+              </a:rPr>
+              <a:t>P = 0.059</a:t>
+            </a:r>
+          </a:p>
+        </p:txBody>
+      </p:sp>
+      <p:pic>
+        <p:nvPicPr>
+          <p:cNvPr id="8" name="Picture 7">
+            <a:extLst>
+              <a:ext uri="{FF2B5EF4-FFF2-40B4-BE49-F238E27FC236}">
+                <a16:creationId xmlns:a16="http://schemas.microsoft.com/office/drawing/2014/main" id="{14CCF82C-93EA-F945-90BF-8537B8598C7B}"/>
+              </a:ext>
+            </a:extLst>
+          </p:cNvPr>
+          <p:cNvPicPr>
+            <a:picLocks noChangeAspect="1"/>
+          </p:cNvPicPr>
+          <p:nvPr/>
+        </p:nvPicPr>
+        <p:blipFill>
+          <a:blip r:embed="rId2"/>
+          <a:stretch>
+            <a:fillRect/>
+          </a:stretch>
+        </p:blipFill>
+        <p:spPr>
+          <a:xfrm>
+            <a:off x="7487478" y="3869991"/>
+            <a:ext cx="4340087" cy="2893391"/>
+          </a:xfrm>
+          <a:prstGeom prst="rect">
+            <a:avLst/>
+          </a:prstGeom>
+        </p:spPr>
+      </p:pic>
+      <p:pic>
+        <p:nvPicPr>
+          <p:cNvPr id="10" name="Picture 9">
+            <a:extLst>
+              <a:ext uri="{FF2B5EF4-FFF2-40B4-BE49-F238E27FC236}">
+                <a16:creationId xmlns:a16="http://schemas.microsoft.com/office/drawing/2014/main" id="{8A3C2BD8-5066-5D44-937B-C5EEF321EEA4}"/>
+              </a:ext>
+            </a:extLst>
+          </p:cNvPr>
+          <p:cNvPicPr>
+            <a:picLocks noChangeAspect="1"/>
+          </p:cNvPicPr>
+          <p:nvPr/>
+        </p:nvPicPr>
+        <p:blipFill>
+          <a:blip r:embed="rId3"/>
+          <a:stretch>
+            <a:fillRect/>
+          </a:stretch>
+        </p:blipFill>
+        <p:spPr>
+          <a:xfrm>
+            <a:off x="1895767" y="1828800"/>
+            <a:ext cx="4368094" cy="4914106"/>
+          </a:xfrm>
+          <a:prstGeom prst="rect">
+            <a:avLst/>
+          </a:prstGeom>
+        </p:spPr>
+      </p:pic>
+    </p:spTree>
+    <p:extLst>
+      <p:ext uri="{BB962C8B-B14F-4D97-AF65-F5344CB8AC3E}">
+        <p14:creationId xmlns:p14="http://schemas.microsoft.com/office/powerpoint/2010/main" val="3335065008"/>
       </p:ext>
     </p:extLst>
   </p:cSld>
@@ -3732,73 +4931,52 @@
         </p:nvSpPr>
         <p:spPr/>
         <p:txBody>
-          <a:bodyPr/>
-          <a:lstStyle/>
-          <a:p>
-            <a:r>
-              <a:rPr lang="en-US" dirty="0"/>
+          <a:bodyPr>
+            <a:normAutofit/>
+          </a:bodyPr>
+          <a:lstStyle/>
+          <a:p>
+            <a:r>
+              <a:rPr lang="en-US" sz="3600" dirty="0"/>
               <a:t>Leaf </a:t>
             </a:r>
             <a:r>
-              <a:rPr lang="en-US" dirty="0" err="1"/>
-              <a:t>Narea</a:t>
-            </a:r>
-            <a:r>
-              <a:rPr lang="en-US" dirty="0"/>
+              <a:rPr lang="en-US" sz="3600" dirty="0" err="1"/>
+              <a:t>N</a:t>
+            </a:r>
+            <a:r>
+              <a:rPr lang="en-US" sz="3600" baseline="-25000" dirty="0" err="1"/>
+              <a:t>area</a:t>
+            </a:r>
+            <a:r>
+              <a:rPr lang="en-US" sz="3600" dirty="0"/>
               <a:t> is an important variable for ecosystem carbon and N fluxes</a:t>
             </a:r>
           </a:p>
           <a:p>
             <a:pPr lvl="1"/>
             <a:r>
-              <a:rPr lang="en-US" dirty="0"/>
+              <a:rPr lang="en-US" sz="3200" dirty="0"/>
               <a:t>Used to predict photosynthesis in ESMs, including downregulation from N limitation</a:t>
             </a:r>
           </a:p>
           <a:p>
             <a:r>
-              <a:rPr lang="en-US" dirty="0"/>
+              <a:rPr lang="en-US" sz="3600" dirty="0"/>
               <a:t>Not clear how or why leaf </a:t>
             </a:r>
             <a:r>
-              <a:rPr lang="en-US" dirty="0" err="1"/>
-              <a:t>Narea</a:t>
-            </a:r>
-            <a:r>
-              <a:rPr lang="en-US" dirty="0"/>
+              <a:rPr lang="en-US" sz="3600" dirty="0" err="1"/>
+              <a:t>N</a:t>
+            </a:r>
+            <a:r>
+              <a:rPr lang="en-US" sz="3600" baseline="-25000" dirty="0" err="1"/>
+              <a:t>area</a:t>
+            </a:r>
+            <a:r>
+              <a:rPr lang="en-US" sz="3600" dirty="0"/>
               <a:t> responds to soil N availability</a:t>
             </a:r>
-          </a:p>
-          <a:p>
-            <a:r>
-              <a:rPr lang="en-US" dirty="0"/>
-              <a:t>Recent analyses suggest strong positive linkages (</a:t>
-            </a:r>
-            <a:r>
-              <a:rPr lang="en-US" dirty="0" err="1"/>
-              <a:t>Firn</a:t>
-            </a:r>
-            <a:r>
-              <a:rPr lang="en-US" dirty="0"/>
-              <a:t> et al., 2019), while others suggest limited response (Smith et al., 2019)</a:t>
-            </a:r>
-          </a:p>
-          <a:p>
-            <a:r>
-              <a:rPr lang="en-US" dirty="0"/>
-              <a:t>Other studies indicate that LMA and climate are primary predictors of leaf </a:t>
-            </a:r>
-            <a:r>
-              <a:rPr lang="en-US" dirty="0" err="1"/>
-              <a:t>Narea</a:t>
-            </a:r>
-            <a:r>
-              <a:rPr lang="en-US" dirty="0"/>
-              <a:t> (Dong et al., 2017)</a:t>
-            </a:r>
-          </a:p>
-          <a:p>
-            <a:endParaRPr lang="en-US" dirty="0"/>
           </a:p>
         </p:txBody>
       </p:sp>
@@ -3816,6 +4994,264 @@
 </file>
 
 <file path=ppt/slides/slide3.xml><?xml version="1.0" encoding="utf-8"?>
+<p:sld xmlns:a="http://schemas.openxmlformats.org/drawingml/2006/main" xmlns:r="http://schemas.openxmlformats.org/officeDocument/2006/relationships" xmlns:p="http://schemas.openxmlformats.org/presentationml/2006/main">
+  <p:cSld>
+    <p:spTree>
+      <p:nvGrpSpPr>
+        <p:cNvPr id="1" name=""/>
+        <p:cNvGrpSpPr/>
+        <p:nvPr/>
+      </p:nvGrpSpPr>
+      <p:grpSpPr>
+        <a:xfrm>
+          <a:off x="0" y="0"/>
+          <a:ext cx="0" cy="0"/>
+          <a:chOff x="0" y="0"/>
+          <a:chExt cx="0" cy="0"/>
+        </a:xfrm>
+      </p:grpSpPr>
+      <p:sp>
+        <p:nvSpPr>
+          <p:cNvPr id="2" name="Title 1">
+            <a:extLst>
+              <a:ext uri="{FF2B5EF4-FFF2-40B4-BE49-F238E27FC236}">
+                <a16:creationId xmlns:a16="http://schemas.microsoft.com/office/drawing/2014/main" id="{69BBCF26-AB7E-7E4A-9555-3A6B54058A1F}"/>
+              </a:ext>
+            </a:extLst>
+          </p:cNvPr>
+          <p:cNvSpPr>
+            <a:spLocks noGrp="1"/>
+          </p:cNvSpPr>
+          <p:nvPr>
+            <p:ph type="title"/>
+          </p:nvPr>
+        </p:nvSpPr>
+        <p:spPr/>
+        <p:txBody>
+          <a:bodyPr/>
+          <a:lstStyle/>
+          <a:p>
+            <a:r>
+              <a:rPr lang="en-US" dirty="0"/>
+              <a:t>Rationale CTD</a:t>
+            </a:r>
+          </a:p>
+        </p:txBody>
+      </p:sp>
+      <p:sp>
+        <p:nvSpPr>
+          <p:cNvPr id="3" name="Content Placeholder 2">
+            <a:extLst>
+              <a:ext uri="{FF2B5EF4-FFF2-40B4-BE49-F238E27FC236}">
+                <a16:creationId xmlns:a16="http://schemas.microsoft.com/office/drawing/2014/main" id="{F4772B5A-E177-9F45-BF12-FD3085F921B0}"/>
+              </a:ext>
+            </a:extLst>
+          </p:cNvPr>
+          <p:cNvSpPr>
+            <a:spLocks noGrp="1"/>
+          </p:cNvSpPr>
+          <p:nvPr>
+            <p:ph idx="1"/>
+          </p:nvPr>
+        </p:nvSpPr>
+        <p:spPr>
+          <a:xfrm>
+            <a:off x="838200" y="1825625"/>
+            <a:ext cx="5536096" cy="4351338"/>
+          </a:xfrm>
+        </p:spPr>
+        <p:txBody>
+          <a:bodyPr>
+            <a:normAutofit/>
+          </a:bodyPr>
+          <a:lstStyle/>
+          <a:p>
+            <a:r>
+              <a:rPr lang="en-US" sz="3600" dirty="0" err="1"/>
+              <a:t>Firn</a:t>
+            </a:r>
+            <a:r>
+              <a:rPr lang="en-US" sz="3600" dirty="0"/>
+              <a:t> et al. (2019): strong link b/w soil N and leaf N%</a:t>
+            </a:r>
+          </a:p>
+        </p:txBody>
+      </p:sp>
+      <p:pic>
+        <p:nvPicPr>
+          <p:cNvPr id="4" name="Picture 3">
+            <a:extLst>
+              <a:ext uri="{FF2B5EF4-FFF2-40B4-BE49-F238E27FC236}">
+                <a16:creationId xmlns:a16="http://schemas.microsoft.com/office/drawing/2014/main" id="{82326F85-5565-634E-AC42-E273FA0B5B0A}"/>
+              </a:ext>
+            </a:extLst>
+          </p:cNvPr>
+          <p:cNvPicPr>
+            <a:picLocks noChangeAspect="1"/>
+          </p:cNvPicPr>
+          <p:nvPr/>
+        </p:nvPicPr>
+        <p:blipFill>
+          <a:blip r:embed="rId2"/>
+          <a:stretch>
+            <a:fillRect/>
+          </a:stretch>
+        </p:blipFill>
+        <p:spPr>
+          <a:xfrm>
+            <a:off x="6235700" y="1327944"/>
+            <a:ext cx="5118100" cy="5346700"/>
+          </a:xfrm>
+          <a:prstGeom prst="rect">
+            <a:avLst/>
+          </a:prstGeom>
+        </p:spPr>
+      </p:pic>
+    </p:spTree>
+    <p:extLst>
+      <p:ext uri="{BB962C8B-B14F-4D97-AF65-F5344CB8AC3E}">
+        <p14:creationId xmlns:p14="http://schemas.microsoft.com/office/powerpoint/2010/main" val="70229743"/>
+      </p:ext>
+    </p:extLst>
+  </p:cSld>
+  <p:clrMapOvr>
+    <a:masterClrMapping/>
+  </p:clrMapOvr>
+</p:sld>
+</file>
+
+<file path=ppt/slides/slide4.xml><?xml version="1.0" encoding="utf-8"?>
+<p:sld xmlns:a="http://schemas.openxmlformats.org/drawingml/2006/main" xmlns:r="http://schemas.openxmlformats.org/officeDocument/2006/relationships" xmlns:p="http://schemas.openxmlformats.org/presentationml/2006/main">
+  <p:cSld>
+    <p:spTree>
+      <p:nvGrpSpPr>
+        <p:cNvPr id="1" name=""/>
+        <p:cNvGrpSpPr/>
+        <p:nvPr/>
+      </p:nvGrpSpPr>
+      <p:grpSpPr>
+        <a:xfrm>
+          <a:off x="0" y="0"/>
+          <a:ext cx="0" cy="0"/>
+          <a:chOff x="0" y="0"/>
+          <a:chExt cx="0" cy="0"/>
+        </a:xfrm>
+      </p:grpSpPr>
+      <p:sp>
+        <p:nvSpPr>
+          <p:cNvPr id="2" name="Title 1">
+            <a:extLst>
+              <a:ext uri="{FF2B5EF4-FFF2-40B4-BE49-F238E27FC236}">
+                <a16:creationId xmlns:a16="http://schemas.microsoft.com/office/drawing/2014/main" id="{69BBCF26-AB7E-7E4A-9555-3A6B54058A1F}"/>
+              </a:ext>
+            </a:extLst>
+          </p:cNvPr>
+          <p:cNvSpPr>
+            <a:spLocks noGrp="1"/>
+          </p:cNvSpPr>
+          <p:nvPr>
+            <p:ph type="title"/>
+          </p:nvPr>
+        </p:nvSpPr>
+        <p:spPr/>
+        <p:txBody>
+          <a:bodyPr/>
+          <a:lstStyle/>
+          <a:p>
+            <a:r>
+              <a:rPr lang="en-US" dirty="0"/>
+              <a:t>Rationale CTD</a:t>
+            </a:r>
+          </a:p>
+        </p:txBody>
+      </p:sp>
+      <p:sp>
+        <p:nvSpPr>
+          <p:cNvPr id="3" name="Content Placeholder 2">
+            <a:extLst>
+              <a:ext uri="{FF2B5EF4-FFF2-40B4-BE49-F238E27FC236}">
+                <a16:creationId xmlns:a16="http://schemas.microsoft.com/office/drawing/2014/main" id="{F4772B5A-E177-9F45-BF12-FD3085F921B0}"/>
+              </a:ext>
+            </a:extLst>
+          </p:cNvPr>
+          <p:cNvSpPr>
+            <a:spLocks noGrp="1"/>
+          </p:cNvSpPr>
+          <p:nvPr>
+            <p:ph idx="1"/>
+          </p:nvPr>
+        </p:nvSpPr>
+        <p:spPr>
+          <a:xfrm>
+            <a:off x="838200" y="1825625"/>
+            <a:ext cx="4793974" cy="4351338"/>
+          </a:xfrm>
+        </p:spPr>
+        <p:txBody>
+          <a:bodyPr>
+            <a:normAutofit/>
+          </a:bodyPr>
+          <a:lstStyle/>
+          <a:p>
+            <a:r>
+              <a:rPr lang="en-US" sz="3600" dirty="0"/>
+              <a:t>Dong et al. (2017): it’s mainly climate and evolution (LMA, </a:t>
+            </a:r>
+            <a:r>
+              <a:rPr lang="en-US" sz="3600" dirty="0" err="1"/>
+              <a:t>Nfixer</a:t>
+            </a:r>
+            <a:r>
+              <a:rPr lang="en-US" sz="3600" dirty="0"/>
+              <a:t>)</a:t>
+            </a:r>
+          </a:p>
+        </p:txBody>
+      </p:sp>
+      <p:pic>
+        <p:nvPicPr>
+          <p:cNvPr id="5" name="Picture 4">
+            <a:extLst>
+              <a:ext uri="{FF2B5EF4-FFF2-40B4-BE49-F238E27FC236}">
+                <a16:creationId xmlns:a16="http://schemas.microsoft.com/office/drawing/2014/main" id="{980DD477-6DD2-D44D-91D8-34428B28D455}"/>
+              </a:ext>
+            </a:extLst>
+          </p:cNvPr>
+          <p:cNvPicPr>
+            <a:picLocks noChangeAspect="1"/>
+          </p:cNvPicPr>
+          <p:nvPr/>
+        </p:nvPicPr>
+        <p:blipFill>
+          <a:blip r:embed="rId2"/>
+          <a:stretch>
+            <a:fillRect/>
+          </a:stretch>
+        </p:blipFill>
+        <p:spPr>
+          <a:xfrm>
+            <a:off x="5506800" y="1690688"/>
+            <a:ext cx="6685200" cy="4214192"/>
+          </a:xfrm>
+          <a:prstGeom prst="rect">
+            <a:avLst/>
+          </a:prstGeom>
+        </p:spPr>
+      </p:pic>
+    </p:spTree>
+    <p:extLst>
+      <p:ext uri="{BB962C8B-B14F-4D97-AF65-F5344CB8AC3E}">
+        <p14:creationId xmlns:p14="http://schemas.microsoft.com/office/powerpoint/2010/main" val="2783880447"/>
+      </p:ext>
+    </p:extLst>
+  </p:cSld>
+  <p:clrMapOvr>
+    <a:masterClrMapping/>
+  </p:clrMapOvr>
+</p:sld>
+</file>
+
+<file path=ppt/slides/slide5.xml><?xml version="1.0" encoding="utf-8"?>
 <p:sld xmlns:a="http://schemas.openxmlformats.org/drawingml/2006/main" xmlns:r="http://schemas.openxmlformats.org/officeDocument/2006/relationships" xmlns:p="http://schemas.openxmlformats.org/presentationml/2006/main">
   <p:cSld>
     <p:spTree>
@@ -3954,257 +5390,6 @@
 </p:sld>
 </file>
 
-<file path=ppt/slides/slide4.xml><?xml version="1.0" encoding="utf-8"?>
-<p:sld xmlns:a="http://schemas.openxmlformats.org/drawingml/2006/main" xmlns:r="http://schemas.openxmlformats.org/officeDocument/2006/relationships" xmlns:p="http://schemas.openxmlformats.org/presentationml/2006/main">
-  <p:cSld>
-    <p:spTree>
-      <p:nvGrpSpPr>
-        <p:cNvPr id="1" name=""/>
-        <p:cNvGrpSpPr/>
-        <p:nvPr/>
-      </p:nvGrpSpPr>
-      <p:grpSpPr>
-        <a:xfrm>
-          <a:off x="0" y="0"/>
-          <a:ext cx="0" cy="0"/>
-          <a:chOff x="0" y="0"/>
-          <a:chExt cx="0" cy="0"/>
-        </a:xfrm>
-      </p:grpSpPr>
-      <p:sp>
-        <p:nvSpPr>
-          <p:cNvPr id="2" name="Title 1">
-            <a:extLst>
-              <a:ext uri="{FF2B5EF4-FFF2-40B4-BE49-F238E27FC236}">
-                <a16:creationId xmlns:a16="http://schemas.microsoft.com/office/drawing/2014/main" id="{3EB5E329-C0E7-6747-BEC2-F01042090E12}"/>
-              </a:ext>
-            </a:extLst>
-          </p:cNvPr>
-          <p:cNvSpPr>
-            <a:spLocks noGrp="1"/>
-          </p:cNvSpPr>
-          <p:nvPr>
-            <p:ph type="title"/>
-          </p:nvPr>
-        </p:nvSpPr>
-        <p:spPr/>
-        <p:txBody>
-          <a:bodyPr/>
-          <a:lstStyle/>
-          <a:p>
-            <a:r>
-              <a:rPr lang="en-US" dirty="0"/>
-              <a:t>Specific aims</a:t>
-            </a:r>
-          </a:p>
-        </p:txBody>
-      </p:sp>
-      <p:sp>
-        <p:nvSpPr>
-          <p:cNvPr id="3" name="Content Placeholder 2">
-            <a:extLst>
-              <a:ext uri="{FF2B5EF4-FFF2-40B4-BE49-F238E27FC236}">
-                <a16:creationId xmlns:a16="http://schemas.microsoft.com/office/drawing/2014/main" id="{3A5EC47D-4600-724A-B34F-FFB1252EEEF3}"/>
-              </a:ext>
-            </a:extLst>
-          </p:cNvPr>
-          <p:cNvSpPr>
-            <a:spLocks noGrp="1"/>
-          </p:cNvSpPr>
-          <p:nvPr>
-            <p:ph idx="1"/>
-          </p:nvPr>
-        </p:nvSpPr>
-        <p:spPr/>
-        <p:txBody>
-          <a:bodyPr/>
-          <a:lstStyle/>
-          <a:p>
-            <a:r>
-              <a:rPr lang="en-US" dirty="0"/>
-              <a:t>Quantify the impact of soil N on leaf </a:t>
-            </a:r>
-            <a:r>
-              <a:rPr lang="en-US" dirty="0" err="1"/>
-              <a:t>Narea</a:t>
-            </a:r>
-            <a:endParaRPr lang="en-US" dirty="0"/>
-          </a:p>
-          <a:p>
-            <a:r>
-              <a:rPr lang="en-US" dirty="0"/>
-              <a:t>Separate soil N drivers from climate drivers</a:t>
-            </a:r>
-          </a:p>
-          <a:p>
-            <a:r>
-              <a:rPr lang="en-US" dirty="0"/>
-              <a:t>Separate the impacts of N demand and N availability on leaf </a:t>
-            </a:r>
-            <a:r>
-              <a:rPr lang="en-US" dirty="0" err="1"/>
-              <a:t>Narea</a:t>
-            </a:r>
-            <a:endParaRPr lang="en-US" dirty="0"/>
-          </a:p>
-        </p:txBody>
-      </p:sp>
-    </p:spTree>
-    <p:extLst>
-      <p:ext uri="{BB962C8B-B14F-4D97-AF65-F5344CB8AC3E}">
-        <p14:creationId xmlns:p14="http://schemas.microsoft.com/office/powerpoint/2010/main" val="3849155709"/>
-      </p:ext>
-    </p:extLst>
-  </p:cSld>
-  <p:clrMapOvr>
-    <a:masterClrMapping/>
-  </p:clrMapOvr>
-</p:sld>
-</file>
-
-<file path=ppt/slides/slide5.xml><?xml version="1.0" encoding="utf-8"?>
-<p:sld xmlns:a="http://schemas.openxmlformats.org/drawingml/2006/main" xmlns:r="http://schemas.openxmlformats.org/officeDocument/2006/relationships" xmlns:p="http://schemas.openxmlformats.org/presentationml/2006/main">
-  <p:cSld>
-    <p:spTree>
-      <p:nvGrpSpPr>
-        <p:cNvPr id="1" name=""/>
-        <p:cNvGrpSpPr/>
-        <p:nvPr/>
-      </p:nvGrpSpPr>
-      <p:grpSpPr>
-        <a:xfrm>
-          <a:off x="0" y="0"/>
-          <a:ext cx="0" cy="0"/>
-          <a:chOff x="0" y="0"/>
-          <a:chExt cx="0" cy="0"/>
-        </a:xfrm>
-      </p:grpSpPr>
-      <p:sp>
-        <p:nvSpPr>
-          <p:cNvPr id="2" name="Title 1">
-            <a:extLst>
-              <a:ext uri="{FF2B5EF4-FFF2-40B4-BE49-F238E27FC236}">
-                <a16:creationId xmlns:a16="http://schemas.microsoft.com/office/drawing/2014/main" id="{A8490E94-815F-4145-A6D0-23D88597D1DD}"/>
-              </a:ext>
-            </a:extLst>
-          </p:cNvPr>
-          <p:cNvSpPr>
-            <a:spLocks noGrp="1"/>
-          </p:cNvSpPr>
-          <p:nvPr>
-            <p:ph type="title"/>
-          </p:nvPr>
-        </p:nvSpPr>
-        <p:spPr/>
-        <p:txBody>
-          <a:bodyPr/>
-          <a:lstStyle/>
-          <a:p>
-            <a:r>
-              <a:rPr lang="en-US" dirty="0"/>
-              <a:t>Primary questions</a:t>
-            </a:r>
-          </a:p>
-        </p:txBody>
-      </p:sp>
-      <p:sp>
-        <p:nvSpPr>
-          <p:cNvPr id="3" name="Content Placeholder 2">
-            <a:extLst>
-              <a:ext uri="{FF2B5EF4-FFF2-40B4-BE49-F238E27FC236}">
-                <a16:creationId xmlns:a16="http://schemas.microsoft.com/office/drawing/2014/main" id="{0CCEA704-D202-0A4B-AFB3-EC87600E32BA}"/>
-              </a:ext>
-            </a:extLst>
-          </p:cNvPr>
-          <p:cNvSpPr>
-            <a:spLocks noGrp="1"/>
-          </p:cNvSpPr>
-          <p:nvPr>
-            <p:ph idx="1"/>
-          </p:nvPr>
-        </p:nvSpPr>
-        <p:spPr/>
-        <p:txBody>
-          <a:bodyPr/>
-          <a:lstStyle/>
-          <a:p>
-            <a:r>
-              <a:rPr lang="en-US" dirty="0"/>
-              <a:t>Does soil N impact leaf </a:t>
-            </a:r>
-            <a:r>
-              <a:rPr lang="en-US" dirty="0" err="1"/>
-              <a:t>Narea</a:t>
-            </a:r>
-            <a:r>
-              <a:rPr lang="en-US" dirty="0"/>
-              <a:t>?</a:t>
-            </a:r>
-          </a:p>
-          <a:p>
-            <a:pPr lvl="1"/>
-            <a:r>
-              <a:rPr lang="en-US" dirty="0"/>
-              <a:t>If so, does this coincide with a change in stomatal conductance?</a:t>
-            </a:r>
-          </a:p>
-          <a:p>
-            <a:r>
-              <a:rPr lang="en-US" dirty="0"/>
-              <a:t>How does the impact of soil N on leaf </a:t>
-            </a:r>
-            <a:r>
-              <a:rPr lang="en-US" dirty="0" err="1"/>
-              <a:t>Narea</a:t>
-            </a:r>
-            <a:r>
-              <a:rPr lang="en-US" dirty="0"/>
-              <a:t> compare to other drivers, such as climate and LMA?</a:t>
-            </a:r>
-          </a:p>
-          <a:p>
-            <a:r>
-              <a:rPr lang="en-US" dirty="0"/>
-              <a:t>How does the leaf </a:t>
-            </a:r>
-            <a:r>
-              <a:rPr lang="en-US" dirty="0" err="1"/>
-              <a:t>Narea</a:t>
-            </a:r>
-            <a:r>
-              <a:rPr lang="en-US" dirty="0"/>
-              <a:t> response to soil N compare to the LAI response to soil N?</a:t>
-            </a:r>
-          </a:p>
-          <a:p>
-            <a:r>
-              <a:rPr lang="en-US" dirty="0"/>
-              <a:t>Does the impact of soil N on leaf </a:t>
-            </a:r>
-            <a:r>
-              <a:rPr lang="en-US" dirty="0" err="1"/>
-              <a:t>Narea</a:t>
-            </a:r>
-            <a:r>
-              <a:rPr lang="en-US" dirty="0"/>
-              <a:t> vary with leaf N demand, as indexed through the LAI response?</a:t>
-            </a:r>
-          </a:p>
-        </p:txBody>
-      </p:sp>
-    </p:spTree>
-    <p:extLst>
-      <p:ext uri="{BB962C8B-B14F-4D97-AF65-F5344CB8AC3E}">
-        <p14:creationId xmlns:p14="http://schemas.microsoft.com/office/powerpoint/2010/main" val="3612388396"/>
-      </p:ext>
-    </p:extLst>
-  </p:cSld>
-  <p:clrMapOvr>
-    <a:masterClrMapping/>
-  </p:clrMapOvr>
-</p:sld>
-</file>
-
 <file path=ppt/slides/slide6.xml><?xml version="1.0" encoding="utf-8"?>
 <p:sld xmlns:a="http://schemas.openxmlformats.org/drawingml/2006/main" xmlns:r="http://schemas.openxmlformats.org/officeDocument/2006/relationships" xmlns:p="http://schemas.openxmlformats.org/presentationml/2006/main">
   <p:cSld>
@@ -4227,7 +5412,7 @@
           <p:cNvPr id="2" name="Title 1">
             <a:extLst>
               <a:ext uri="{FF2B5EF4-FFF2-40B4-BE49-F238E27FC236}">
-                <a16:creationId xmlns:a16="http://schemas.microsoft.com/office/drawing/2014/main" id="{58F9A0B4-07D0-1040-86BB-F7CF5AF8F579}"/>
+                <a16:creationId xmlns:a16="http://schemas.microsoft.com/office/drawing/2014/main" id="{893E47EA-1331-F34C-A5E8-7674289862CA}"/>
               </a:ext>
             </a:extLst>
           </p:cNvPr>
@@ -4245,70 +5430,96 @@
           <a:p>
             <a:r>
               <a:rPr lang="en-US" dirty="0"/>
-              <a:t>Nutrient Network (</a:t>
+              <a:t>Rationale CTD</a:t>
+            </a:r>
+          </a:p>
+        </p:txBody>
+      </p:sp>
+      <p:sp>
+        <p:nvSpPr>
+          <p:cNvPr id="3" name="Content Placeholder 2">
+            <a:extLst>
+              <a:ext uri="{FF2B5EF4-FFF2-40B4-BE49-F238E27FC236}">
+                <a16:creationId xmlns:a16="http://schemas.microsoft.com/office/drawing/2014/main" id="{868318D0-7153-7745-9ABB-A8F9E7B9999D}"/>
+              </a:ext>
+            </a:extLst>
+          </p:cNvPr>
+          <p:cNvSpPr>
+            <a:spLocks noGrp="1"/>
+          </p:cNvSpPr>
+          <p:nvPr>
+            <p:ph idx="1"/>
+          </p:nvPr>
+        </p:nvSpPr>
+        <p:spPr>
+          <a:xfrm>
+            <a:off x="838200" y="1825625"/>
+            <a:ext cx="5125278" cy="4351338"/>
+          </a:xfrm>
+        </p:spPr>
+        <p:txBody>
+          <a:bodyPr/>
+          <a:lstStyle/>
+          <a:p>
+            <a:r>
+              <a:rPr lang="en-US" dirty="0"/>
+              <a:t>Recent analyses suggest that soil N may modify the nutrient economy of leaves following predicts from photosynthetic least cost theory (</a:t>
             </a:r>
             <a:r>
               <a:rPr lang="en-US" dirty="0" err="1"/>
-              <a:t>NutNet</a:t>
-            </a:r>
-            <a:r>
-              <a:rPr lang="en-US" dirty="0"/>
-              <a:t>)</a:t>
-            </a:r>
-          </a:p>
-        </p:txBody>
-      </p:sp>
-      <p:sp>
-        <p:nvSpPr>
-          <p:cNvPr id="3" name="Content Placeholder 2">
-            <a:extLst>
-              <a:ext uri="{FF2B5EF4-FFF2-40B4-BE49-F238E27FC236}">
-                <a16:creationId xmlns:a16="http://schemas.microsoft.com/office/drawing/2014/main" id="{3BB0E2D5-4110-DE45-9704-66371057784D}"/>
-              </a:ext>
-            </a:extLst>
-          </p:cNvPr>
-          <p:cNvSpPr>
-            <a:spLocks noGrp="1"/>
-          </p:cNvSpPr>
-          <p:nvPr>
-            <p:ph idx="1"/>
-          </p:nvPr>
-        </p:nvSpPr>
-        <p:spPr/>
-        <p:txBody>
-          <a:bodyPr/>
-          <a:lstStyle/>
-          <a:p>
-            <a:r>
-              <a:rPr lang="en-US" dirty="0"/>
-              <a:t>Globally distributed soil nutrient manipulation experiment</a:t>
-            </a:r>
-          </a:p>
-          <a:p>
-            <a:r>
-              <a:rPr lang="en-US" dirty="0"/>
-              <a:t>Fully factorial soil N x P x K addition experiment (10 g m-2 yr-1)</a:t>
+              <a:t>Paillassa</a:t>
+            </a:r>
+            <a:r>
+              <a:rPr lang="en-US" dirty="0"/>
+              <a:t> et al., 2020)</a:t>
             </a:r>
           </a:p>
           <a:p>
             <a:pPr lvl="1"/>
             <a:r>
               <a:rPr lang="en-US" dirty="0"/>
-              <a:t>At least 3 blocks per site</a:t>
-            </a:r>
-          </a:p>
-          <a:p>
-            <a:pPr marL="0" indent="0">
-              <a:buNone/>
-            </a:pPr>
+              <a:t>This depends on the ratio of soil N demand and soil N availability</a:t>
+            </a:r>
+          </a:p>
+          <a:p>
             <a:endParaRPr lang="en-US" dirty="0"/>
           </a:p>
         </p:txBody>
       </p:sp>
+      <p:pic>
+        <p:nvPicPr>
+          <p:cNvPr id="4" name="Picture 3">
+            <a:extLst>
+              <a:ext uri="{FF2B5EF4-FFF2-40B4-BE49-F238E27FC236}">
+                <a16:creationId xmlns:a16="http://schemas.microsoft.com/office/drawing/2014/main" id="{D6262FC4-9950-B046-8A6B-37400EF71F77}"/>
+              </a:ext>
+            </a:extLst>
+          </p:cNvPr>
+          <p:cNvPicPr>
+            <a:picLocks noChangeAspect="1"/>
+          </p:cNvPicPr>
+          <p:nvPr/>
+        </p:nvPicPr>
+        <p:blipFill>
+          <a:blip r:embed="rId2"/>
+          <a:stretch>
+            <a:fillRect/>
+          </a:stretch>
+        </p:blipFill>
+        <p:spPr>
+          <a:xfrm>
+            <a:off x="6347861" y="649356"/>
+            <a:ext cx="5738121" cy="5903843"/>
+          </a:xfrm>
+          <a:prstGeom prst="rect">
+            <a:avLst/>
+          </a:prstGeom>
+        </p:spPr>
+      </p:pic>
     </p:spTree>
     <p:extLst>
       <p:ext uri="{BB962C8B-B14F-4D97-AF65-F5344CB8AC3E}">
-        <p14:creationId xmlns:p14="http://schemas.microsoft.com/office/powerpoint/2010/main" val="2952722968"/>
+        <p14:creationId xmlns:p14="http://schemas.microsoft.com/office/powerpoint/2010/main" val="477204570"/>
       </p:ext>
     </p:extLst>
   </p:cSld>
@@ -4340,7 +5551,7 @@
           <p:cNvPr id="2" name="Title 1">
             <a:extLst>
               <a:ext uri="{FF2B5EF4-FFF2-40B4-BE49-F238E27FC236}">
-                <a16:creationId xmlns:a16="http://schemas.microsoft.com/office/drawing/2014/main" id="{70ADCC1C-B460-9B49-B5E2-FE9B2F8D2437}"/>
+                <a16:creationId xmlns:a16="http://schemas.microsoft.com/office/drawing/2014/main" id="{3EB5E329-C0E7-6747-BEC2-F01042090E12}"/>
               </a:ext>
             </a:extLst>
           </p:cNvPr>
@@ -4358,7 +5569,7 @@
           <a:p>
             <a:r>
               <a:rPr lang="en-US" dirty="0"/>
-              <a:t>Datasets</a:t>
+              <a:t>Specific aims</a:t>
             </a:r>
           </a:p>
         </p:txBody>
@@ -4368,7 +5579,7 @@
           <p:cNvPr id="3" name="Content Placeholder 2">
             <a:extLst>
               <a:ext uri="{FF2B5EF4-FFF2-40B4-BE49-F238E27FC236}">
-                <a16:creationId xmlns:a16="http://schemas.microsoft.com/office/drawing/2014/main" id="{424F1937-1280-7B46-8871-496841F53251}"/>
+                <a16:creationId xmlns:a16="http://schemas.microsoft.com/office/drawing/2014/main" id="{3A5EC47D-4600-724A-B34F-FFB1252EEEF3}"/>
               </a:ext>
             </a:extLst>
           </p:cNvPr>
@@ -4381,92 +5592,60 @@
         </p:nvSpPr>
         <p:spPr/>
         <p:txBody>
-          <a:bodyPr/>
-          <a:lstStyle/>
-          <a:p>
-            <a:r>
-              <a:rPr lang="en-US" dirty="0" err="1"/>
-              <a:t>NutNet</a:t>
-            </a:r>
-            <a:r>
-              <a:rPr lang="en-US" dirty="0"/>
-              <a:t> leaf trait data</a:t>
-            </a:r>
-          </a:p>
-          <a:p>
-            <a:pPr lvl="1"/>
-            <a:r>
-              <a:rPr lang="en-US" dirty="0"/>
-              <a:t>n = 1946, 191 species, 25 sites</a:t>
-            </a:r>
-          </a:p>
-          <a:p>
-            <a:pPr lvl="1"/>
-            <a:r>
-              <a:rPr lang="en-US" dirty="0" err="1"/>
+          <a:bodyPr>
+            <a:normAutofit/>
+          </a:bodyPr>
+          <a:lstStyle/>
+          <a:p>
+            <a:pPr marL="514350" indent="-514350">
+              <a:buFont typeface="+mj-lt"/>
+              <a:buAutoNum type="arabicPeriod"/>
+            </a:pPr>
+            <a:r>
+              <a:rPr lang="en-US" sz="4000" dirty="0"/>
+              <a:t>Quantify the impact of soil N on leaf </a:t>
+            </a:r>
+            <a:r>
+              <a:rPr lang="en-US" sz="4000" dirty="0" err="1"/>
+              <a:t>N</a:t>
+            </a:r>
+            <a:r>
+              <a:rPr lang="en-US" sz="4000" baseline="-25000" dirty="0" err="1"/>
+              <a:t>area</a:t>
+            </a:r>
+            <a:endParaRPr lang="en-US" sz="4000" baseline="-25000" dirty="0"/>
+          </a:p>
+          <a:p>
+            <a:pPr marL="514350" indent="-514350">
+              <a:buFont typeface="+mj-lt"/>
+              <a:buAutoNum type="arabicPeriod"/>
+            </a:pPr>
+            <a:r>
+              <a:rPr lang="en-US" sz="4000" dirty="0"/>
+              <a:t>Separate soil N drivers from climate drivers</a:t>
+            </a:r>
+          </a:p>
+          <a:p>
+            <a:pPr marL="514350" indent="-514350">
+              <a:buFont typeface="+mj-lt"/>
+              <a:buAutoNum type="arabicPeriod"/>
+            </a:pPr>
+            <a:r>
+              <a:rPr lang="en-US" sz="4000" dirty="0"/>
+              <a:t>Separate the impacts of N demand and N availability on leaf </a:t>
+            </a:r>
+            <a:r>
+              <a:rPr lang="en-US" sz="4000" dirty="0" err="1"/>
               <a:t>Narea</a:t>
             </a:r>
-            <a:endParaRPr lang="en-US" dirty="0"/>
-          </a:p>
-          <a:p>
-            <a:pPr lvl="1"/>
-            <a:r>
-              <a:rPr lang="en-US" dirty="0"/>
-              <a:t>LMA</a:t>
-            </a:r>
-          </a:p>
-          <a:p>
-            <a:pPr lvl="1"/>
-            <a:r>
-              <a:rPr lang="en-US" dirty="0"/>
-              <a:t>d13C (converted to </a:t>
-            </a:r>
-            <a:r>
-              <a:rPr lang="el-GR" dirty="0"/>
-              <a:t>χ</a:t>
-            </a:r>
-            <a:r>
-              <a:rPr lang="en-US" dirty="0"/>
-              <a:t>)</a:t>
-            </a:r>
-          </a:p>
-          <a:p>
-            <a:pPr lvl="1"/>
-            <a:r>
-              <a:rPr lang="en-US" dirty="0"/>
-              <a:t>Growing season climate conditions (CRU)</a:t>
-            </a:r>
-          </a:p>
-          <a:p>
-            <a:r>
-              <a:rPr lang="en-US" dirty="0" err="1"/>
-              <a:t>NutNet</a:t>
-            </a:r>
-            <a:r>
-              <a:rPr lang="en-US" dirty="0"/>
-              <a:t> plot data</a:t>
-            </a:r>
-          </a:p>
-          <a:p>
-            <a:pPr lvl="1"/>
-            <a:r>
-              <a:rPr lang="en-US" dirty="0"/>
-              <a:t>n = 381, 25 sites</a:t>
-            </a:r>
-          </a:p>
-          <a:p>
-            <a:pPr lvl="1"/>
-            <a:r>
-              <a:rPr lang="en-US" dirty="0"/>
-              <a:t>LAI</a:t>
-            </a:r>
+            <a:endParaRPr lang="en-US" sz="4000" dirty="0"/>
           </a:p>
         </p:txBody>
       </p:sp>
     </p:spTree>
     <p:extLst>
       <p:ext uri="{BB962C8B-B14F-4D97-AF65-F5344CB8AC3E}">
-        <p14:creationId xmlns:p14="http://schemas.microsoft.com/office/powerpoint/2010/main" val="1351686725"/>
+        <p14:creationId xmlns:p14="http://schemas.microsoft.com/office/powerpoint/2010/main" val="3849155709"/>
       </p:ext>
     </p:extLst>
   </p:cSld>
@@ -4498,7 +5677,7 @@
           <p:cNvPr id="2" name="Title 1">
             <a:extLst>
               <a:ext uri="{FF2B5EF4-FFF2-40B4-BE49-F238E27FC236}">
-                <a16:creationId xmlns:a16="http://schemas.microsoft.com/office/drawing/2014/main" id="{E4387BE1-9310-C44D-869D-F635AC6DC4CD}"/>
+                <a16:creationId xmlns:a16="http://schemas.microsoft.com/office/drawing/2014/main" id="{A8490E94-815F-4145-A6D0-23D88597D1DD}"/>
               </a:ext>
             </a:extLst>
           </p:cNvPr>
@@ -4516,7 +5695,7 @@
           <a:p>
             <a:r>
               <a:rPr lang="en-US" dirty="0"/>
-              <a:t>Analyses</a:t>
+              <a:t>Primary questions</a:t>
             </a:r>
           </a:p>
         </p:txBody>
@@ -4526,7 +5705,7 @@
           <p:cNvPr id="3" name="Content Placeholder 2">
             <a:extLst>
               <a:ext uri="{FF2B5EF4-FFF2-40B4-BE49-F238E27FC236}">
-                <a16:creationId xmlns:a16="http://schemas.microsoft.com/office/drawing/2014/main" id="{B7AD2C18-251F-7E41-AAA0-631F2901F61B}"/>
+                <a16:creationId xmlns:a16="http://schemas.microsoft.com/office/drawing/2014/main" id="{0CCEA704-D202-0A4B-AFB3-EC87600E32BA}"/>
               </a:ext>
             </a:extLst>
           </p:cNvPr>
@@ -4542,18 +5721,9 @@
           <a:bodyPr/>
           <a:lstStyle/>
           <a:p>
-            <a:pPr marL="0" indent="0">
-              <a:buNone/>
-            </a:pPr>
-            <a:r>
-              <a:rPr lang="en-US" dirty="0"/>
-              <a:t>**Analyses generally follow Dong et al. (2017)**</a:t>
-            </a:r>
-          </a:p>
-          <a:p>
-            <a:r>
-              <a:rPr lang="en-US" dirty="0"/>
-              <a:t>Predictors of leaf </a:t>
+            <a:r>
+              <a:rPr lang="en-US" dirty="0"/>
+              <a:t>Does soil N impact leaf </a:t>
             </a:r>
             <a:r>
               <a:rPr lang="en-US" dirty="0" err="1"/>
@@ -4561,60 +5731,27 @@
             </a:r>
             <a:r>
               <a:rPr lang="en-US" dirty="0"/>
-              <a:t> (mixed model)</a:t>
-            </a:r>
-          </a:p>
-          <a:p>
-            <a:pPr lvl="1"/>
-            <a:r>
-              <a:rPr lang="en-US" dirty="0"/>
-              <a:t>Dependent variable: leaf </a:t>
+              <a:t>?</a:t>
+            </a:r>
+          </a:p>
+          <a:p>
+            <a:r>
+              <a:rPr lang="en-US" dirty="0"/>
+              <a:t>How does the impact of soil N on leaf </a:t>
             </a:r>
             <a:r>
               <a:rPr lang="en-US" dirty="0" err="1"/>
               <a:t>Narea</a:t>
             </a:r>
-            <a:endParaRPr lang="en-US" dirty="0"/>
-          </a:p>
-          <a:p>
-            <a:pPr lvl="1"/>
-            <a:r>
-              <a:rPr lang="en-US" dirty="0"/>
-              <a:t>Fixed effects: soil N * soil P * soil K + </a:t>
-            </a:r>
-            <a:r>
-              <a:rPr lang="el-GR" dirty="0"/>
-              <a:t>χ</a:t>
-            </a:r>
-            <a:r>
-              <a:rPr lang="en-US" dirty="0"/>
-              <a:t> + temperature + PAR + LMA +</a:t>
-            </a:r>
-            <a:r>
-              <a:rPr lang="en-US" dirty="0" err="1"/>
-              <a:t>Nfixer</a:t>
-            </a:r>
-            <a:endParaRPr lang="en-US" dirty="0"/>
-          </a:p>
-          <a:p>
-            <a:pPr lvl="1"/>
-            <a:r>
-              <a:rPr lang="en-US" dirty="0"/>
-              <a:t>Random terms: site + </a:t>
-            </a:r>
-            <a:r>
-              <a:rPr lang="en-US" dirty="0" err="1"/>
-              <a:t>site:block</a:t>
-            </a:r>
-            <a:r>
-              <a:rPr lang="en-US" dirty="0"/>
-              <a:t> + species</a:t>
-            </a:r>
-          </a:p>
-          <a:p>
-            <a:r>
-              <a:rPr lang="en-US" dirty="0"/>
-              <a:t>Model predictors of leaf </a:t>
+            <a:r>
+              <a:rPr lang="en-US" dirty="0"/>
+              <a:t> compare to other drivers, such as climate and LMA?</a:t>
+            </a:r>
+          </a:p>
+          <a:p>
+            <a:r>
+              <a:rPr lang="en-US" dirty="0"/>
+              <a:t>How does the leaf </a:t>
             </a:r>
             <a:r>
               <a:rPr lang="en-US" dirty="0" err="1"/>
@@ -4622,62 +5759,21 @@
             </a:r>
             <a:r>
               <a:rPr lang="en-US" dirty="0"/>
-              <a:t> (mixed model)</a:t>
-            </a:r>
-          </a:p>
-          <a:p>
-            <a:pPr lvl="1"/>
-            <a:r>
-              <a:rPr lang="en-US" dirty="0"/>
-              <a:t>Dependent variable: leaf </a:t>
+              <a:t> response to soil N compare to the LAI response to soil N?</a:t>
+            </a:r>
+          </a:p>
+          <a:p>
+            <a:r>
+              <a:rPr lang="en-US" dirty="0"/>
+              <a:t>Does the impact of soil N on leaf </a:t>
             </a:r>
             <a:r>
               <a:rPr lang="en-US" dirty="0" err="1"/>
               <a:t>Narea</a:t>
             </a:r>
-            <a:endParaRPr lang="en-US" dirty="0"/>
-          </a:p>
-          <a:p>
-            <a:pPr lvl="1"/>
-            <a:r>
-              <a:rPr lang="en-US" dirty="0"/>
-              <a:t>Fixed effects: soil N * soil P * soil K + predicted </a:t>
-            </a:r>
-            <a:r>
-              <a:rPr lang="en-US" dirty="0" err="1"/>
-              <a:t>Nphoto</a:t>
-            </a:r>
-            <a:r>
-              <a:rPr lang="en-US" dirty="0"/>
-              <a:t> + predicted </a:t>
-            </a:r>
-            <a:r>
-              <a:rPr lang="en-US" dirty="0" err="1"/>
-              <a:t>Nstructure</a:t>
-            </a:r>
-            <a:r>
-              <a:rPr lang="en-US" dirty="0"/>
-              <a:t> + </a:t>
-            </a:r>
-            <a:r>
-              <a:rPr lang="en-US" dirty="0" err="1"/>
-              <a:t>Nfixer</a:t>
-            </a:r>
-            <a:endParaRPr lang="en-US" dirty="0"/>
-          </a:p>
-          <a:p>
-            <a:pPr lvl="1"/>
-            <a:r>
-              <a:rPr lang="en-US" dirty="0"/>
-              <a:t>Random terms: site + </a:t>
-            </a:r>
-            <a:r>
-              <a:rPr lang="en-US" dirty="0" err="1"/>
-              <a:t>site:block</a:t>
-            </a:r>
-            <a:r>
-              <a:rPr lang="en-US" dirty="0"/>
-              <a:t> + species</a:t>
+            <a:r>
+              <a:rPr lang="en-US" dirty="0"/>
+              <a:t> vary with leaf N demand, as indexed through the LAI response?</a:t>
             </a:r>
           </a:p>
         </p:txBody>
@@ -4685,7 +5781,7 @@
     </p:spTree>
     <p:extLst>
       <p:ext uri="{BB962C8B-B14F-4D97-AF65-F5344CB8AC3E}">
-        <p14:creationId xmlns:p14="http://schemas.microsoft.com/office/powerpoint/2010/main" val="3618313253"/>
+        <p14:creationId xmlns:p14="http://schemas.microsoft.com/office/powerpoint/2010/main" val="3612388396"/>
       </p:ext>
     </p:extLst>
   </p:cSld>
@@ -4717,7 +5813,7 @@
           <p:cNvPr id="2" name="Title 1">
             <a:extLst>
               <a:ext uri="{FF2B5EF4-FFF2-40B4-BE49-F238E27FC236}">
-                <a16:creationId xmlns:a16="http://schemas.microsoft.com/office/drawing/2014/main" id="{E4387BE1-9310-C44D-869D-F635AC6DC4CD}"/>
+                <a16:creationId xmlns:a16="http://schemas.microsoft.com/office/drawing/2014/main" id="{58F9A0B4-07D0-1040-86BB-F7CF5AF8F579}"/>
               </a:ext>
             </a:extLst>
           </p:cNvPr>
@@ -4735,7 +5831,15 @@
           <a:p>
             <a:r>
               <a:rPr lang="en-US" dirty="0"/>
-              <a:t>Analyses CTD</a:t>
+              <a:t>Nutrient Network (</a:t>
+            </a:r>
+            <a:r>
+              <a:rPr lang="en-US" dirty="0" err="1"/>
+              <a:t>NutNet</a:t>
+            </a:r>
+            <a:r>
+              <a:rPr lang="en-US" dirty="0"/>
+              <a:t>)</a:t>
             </a:r>
           </a:p>
         </p:txBody>
@@ -4745,7 +5849,7 @@
           <p:cNvPr id="3" name="Content Placeholder 2">
             <a:extLst>
               <a:ext uri="{FF2B5EF4-FFF2-40B4-BE49-F238E27FC236}">
-                <a16:creationId xmlns:a16="http://schemas.microsoft.com/office/drawing/2014/main" id="{B7AD2C18-251F-7E41-AAA0-631F2901F61B}"/>
+                <a16:creationId xmlns:a16="http://schemas.microsoft.com/office/drawing/2014/main" id="{3BB0E2D5-4110-DE45-9704-66371057784D}"/>
               </a:ext>
             </a:extLst>
           </p:cNvPr>
@@ -4763,93 +5867,34 @@
           <a:p>
             <a:r>
               <a:rPr lang="en-US" dirty="0"/>
-              <a:t>LAI response to soil N</a:t>
+              <a:t>Globally distributed soil nutrient manipulation experiment</a:t>
+            </a:r>
+          </a:p>
+          <a:p>
+            <a:r>
+              <a:rPr lang="en-US" dirty="0"/>
+              <a:t>Fully factorial soil N x P x K addition experiment (10 g m-2 yr-1)</a:t>
             </a:r>
           </a:p>
           <a:p>
             <a:pPr lvl="1"/>
             <a:r>
               <a:rPr lang="en-US" dirty="0"/>
-              <a:t>Dependent variable: plot LAI</a:t>
-            </a:r>
-          </a:p>
-          <a:p>
-            <a:pPr lvl="1"/>
-            <a:r>
-              <a:rPr lang="en-US" dirty="0"/>
-              <a:t>Fixed effects: soil N * soil P * soil K + </a:t>
-            </a:r>
-            <a:r>
-              <a:rPr lang="el-GR" dirty="0"/>
-              <a:t>χ</a:t>
-            </a:r>
-            <a:r>
-              <a:rPr lang="en-US" dirty="0"/>
-              <a:t> + temperature + PAR + LMA +</a:t>
-            </a:r>
-            <a:r>
-              <a:rPr lang="en-US" dirty="0" err="1"/>
-              <a:t>Nfixer</a:t>
-            </a:r>
+              <a:t>At least 3 blocks per site</a:t>
+            </a:r>
+          </a:p>
+          <a:p>
+            <a:pPr marL="0" indent="0">
+              <a:buNone/>
+            </a:pPr>
             <a:endParaRPr lang="en-US" dirty="0"/>
-          </a:p>
-          <a:p>
-            <a:pPr lvl="1"/>
-            <a:r>
-              <a:rPr lang="en-US" dirty="0"/>
-              <a:t>Random terms: site + </a:t>
-            </a:r>
-            <a:r>
-              <a:rPr lang="en-US" dirty="0" err="1"/>
-              <a:t>site:block</a:t>
-            </a:r>
-            <a:r>
-              <a:rPr lang="en-US" dirty="0"/>
-              <a:t> + species</a:t>
-            </a:r>
-          </a:p>
-          <a:p>
-            <a:r>
-              <a:rPr lang="en-US" dirty="0"/>
-              <a:t>Supply/demand effects on leaf </a:t>
-            </a:r>
-            <a:r>
-              <a:rPr lang="en-US" dirty="0" err="1"/>
-              <a:t>Narea</a:t>
-            </a:r>
-            <a:r>
-              <a:rPr lang="en-US" dirty="0"/>
-              <a:t> (linear model)</a:t>
-            </a:r>
-          </a:p>
-          <a:p>
-            <a:pPr lvl="1"/>
-            <a:r>
-              <a:rPr lang="en-US" dirty="0"/>
-              <a:t>Dependent variable: change in plot averaged leaf </a:t>
-            </a:r>
-            <a:r>
-              <a:rPr lang="en-US" dirty="0" err="1"/>
-              <a:t>Narea</a:t>
-            </a:r>
-            <a:r>
-              <a:rPr lang="en-US" dirty="0"/>
-              <a:t> in N addition plots</a:t>
-            </a:r>
-          </a:p>
-          <a:p>
-            <a:pPr lvl="1"/>
-            <a:r>
-              <a:rPr lang="en-US" dirty="0"/>
-              <a:t>Fixed effects: change in plot LAI in N addition plots</a:t>
-            </a:r>
           </a:p>
         </p:txBody>
       </p:sp>
     </p:spTree>
     <p:extLst>
       <p:ext uri="{BB962C8B-B14F-4D97-AF65-F5344CB8AC3E}">
-        <p14:creationId xmlns:p14="http://schemas.microsoft.com/office/powerpoint/2010/main" val="2188283881"/>
+        <p14:creationId xmlns:p14="http://schemas.microsoft.com/office/powerpoint/2010/main" val="2952722968"/>
       </p:ext>
     </p:extLst>
   </p:cSld>

</xml_diff>

<commit_message>
just refining the analyses a bit and prepping the presentation
</commit_message>
<xml_diff>
--- a/presentations/nutnet_narea.pptx
+++ b/presentations/nutnet_narea.pptx
@@ -9,20 +9,24 @@
     <p:sldId id="257" r:id="rId3"/>
     <p:sldId id="272" r:id="rId4"/>
     <p:sldId id="273" r:id="rId5"/>
-    <p:sldId id="258" r:id="rId6"/>
-    <p:sldId id="274" r:id="rId7"/>
-    <p:sldId id="259" r:id="rId8"/>
-    <p:sldId id="260" r:id="rId9"/>
-    <p:sldId id="263" r:id="rId10"/>
-    <p:sldId id="261" r:id="rId11"/>
-    <p:sldId id="262" r:id="rId12"/>
-    <p:sldId id="264" r:id="rId13"/>
-    <p:sldId id="265" r:id="rId14"/>
-    <p:sldId id="266" r:id="rId15"/>
-    <p:sldId id="268" r:id="rId16"/>
-    <p:sldId id="269" r:id="rId17"/>
-    <p:sldId id="270" r:id="rId18"/>
-    <p:sldId id="271" r:id="rId19"/>
+    <p:sldId id="275" r:id="rId6"/>
+    <p:sldId id="258" r:id="rId7"/>
+    <p:sldId id="274" r:id="rId8"/>
+    <p:sldId id="259" r:id="rId9"/>
+    <p:sldId id="260" r:id="rId10"/>
+    <p:sldId id="263" r:id="rId11"/>
+    <p:sldId id="261" r:id="rId12"/>
+    <p:sldId id="262" r:id="rId13"/>
+    <p:sldId id="276" r:id="rId14"/>
+    <p:sldId id="264" r:id="rId15"/>
+    <p:sldId id="265" r:id="rId16"/>
+    <p:sldId id="266" r:id="rId17"/>
+    <p:sldId id="268" r:id="rId18"/>
+    <p:sldId id="277" r:id="rId19"/>
+    <p:sldId id="269" r:id="rId20"/>
+    <p:sldId id="270" r:id="rId21"/>
+    <p:sldId id="278" r:id="rId22"/>
+    <p:sldId id="271" r:id="rId23"/>
   </p:sldIdLst>
   <p:sldSz cx="12192000" cy="6858000"/>
   <p:notesSz cx="6858000" cy="9144000"/>
@@ -276,7 +280,7 @@
           <a:p>
             <a:fld id="{F94908AF-C271-DA4B-A6E0-87D34B71DD19}" type="datetimeFigureOut">
               <a:rPr lang="en-US" smtClean="0"/>
-              <a:t>6/12/20</a:t>
+              <a:t>6/16/20</a:t>
             </a:fld>
             <a:endParaRPr lang="en-US"/>
           </a:p>
@@ -474,7 +478,7 @@
           <a:p>
             <a:fld id="{F94908AF-C271-DA4B-A6E0-87D34B71DD19}" type="datetimeFigureOut">
               <a:rPr lang="en-US" smtClean="0"/>
-              <a:t>6/12/20</a:t>
+              <a:t>6/16/20</a:t>
             </a:fld>
             <a:endParaRPr lang="en-US"/>
           </a:p>
@@ -682,7 +686,7 @@
           <a:p>
             <a:fld id="{F94908AF-C271-DA4B-A6E0-87D34B71DD19}" type="datetimeFigureOut">
               <a:rPr lang="en-US" smtClean="0"/>
-              <a:t>6/12/20</a:t>
+              <a:t>6/16/20</a:t>
             </a:fld>
             <a:endParaRPr lang="en-US"/>
           </a:p>
@@ -880,7 +884,7 @@
           <a:p>
             <a:fld id="{F94908AF-C271-DA4B-A6E0-87D34B71DD19}" type="datetimeFigureOut">
               <a:rPr lang="en-US" smtClean="0"/>
-              <a:t>6/12/20</a:t>
+              <a:t>6/16/20</a:t>
             </a:fld>
             <a:endParaRPr lang="en-US"/>
           </a:p>
@@ -1155,7 +1159,7 @@
           <a:p>
             <a:fld id="{F94908AF-C271-DA4B-A6E0-87D34B71DD19}" type="datetimeFigureOut">
               <a:rPr lang="en-US" smtClean="0"/>
-              <a:t>6/12/20</a:t>
+              <a:t>6/16/20</a:t>
             </a:fld>
             <a:endParaRPr lang="en-US"/>
           </a:p>
@@ -1420,7 +1424,7 @@
           <a:p>
             <a:fld id="{F94908AF-C271-DA4B-A6E0-87D34B71DD19}" type="datetimeFigureOut">
               <a:rPr lang="en-US" smtClean="0"/>
-              <a:t>6/12/20</a:t>
+              <a:t>6/16/20</a:t>
             </a:fld>
             <a:endParaRPr lang="en-US"/>
           </a:p>
@@ -1832,7 +1836,7 @@
           <a:p>
             <a:fld id="{F94908AF-C271-DA4B-A6E0-87D34B71DD19}" type="datetimeFigureOut">
               <a:rPr lang="en-US" smtClean="0"/>
-              <a:t>6/12/20</a:t>
+              <a:t>6/16/20</a:t>
             </a:fld>
             <a:endParaRPr lang="en-US"/>
           </a:p>
@@ -1973,7 +1977,7 @@
           <a:p>
             <a:fld id="{F94908AF-C271-DA4B-A6E0-87D34B71DD19}" type="datetimeFigureOut">
               <a:rPr lang="en-US" smtClean="0"/>
-              <a:t>6/12/20</a:t>
+              <a:t>6/16/20</a:t>
             </a:fld>
             <a:endParaRPr lang="en-US"/>
           </a:p>
@@ -2086,7 +2090,7 @@
           <a:p>
             <a:fld id="{F94908AF-C271-DA4B-A6E0-87D34B71DD19}" type="datetimeFigureOut">
               <a:rPr lang="en-US" smtClean="0"/>
-              <a:t>6/12/20</a:t>
+              <a:t>6/16/20</a:t>
             </a:fld>
             <a:endParaRPr lang="en-US"/>
           </a:p>
@@ -2397,7 +2401,7 @@
           <a:p>
             <a:fld id="{F94908AF-C271-DA4B-A6E0-87D34B71DD19}" type="datetimeFigureOut">
               <a:rPr lang="en-US" smtClean="0"/>
-              <a:t>6/12/20</a:t>
+              <a:t>6/16/20</a:t>
             </a:fld>
             <a:endParaRPr lang="en-US"/>
           </a:p>
@@ -2685,7 +2689,7 @@
           <a:p>
             <a:fld id="{F94908AF-C271-DA4B-A6E0-87D34B71DD19}" type="datetimeFigureOut">
               <a:rPr lang="en-US" smtClean="0"/>
-              <a:t>6/12/20</a:t>
+              <a:t>6/16/20</a:t>
             </a:fld>
             <a:endParaRPr lang="en-US"/>
           </a:p>
@@ -2926,7 +2930,7 @@
           <a:p>
             <a:fld id="{F94908AF-C271-DA4B-A6E0-87D34B71DD19}" type="datetimeFigureOut">
               <a:rPr lang="en-US" smtClean="0"/>
-              <a:t>6/12/20</a:t>
+              <a:t>6/16/20</a:t>
             </a:fld>
             <a:endParaRPr lang="en-US"/>
           </a:p>
@@ -3366,19 +3370,7 @@
           <a:p>
             <a:r>
               <a:rPr lang="en-US" dirty="0"/>
-              <a:t>Mechanisms of leaf </a:t>
-            </a:r>
-            <a:r>
-              <a:rPr lang="en-US" dirty="0" err="1"/>
-              <a:t>N</a:t>
-            </a:r>
-            <a:r>
-              <a:rPr lang="en-US" baseline="-25000" dirty="0" err="1"/>
-              <a:t>area</a:t>
-            </a:r>
-            <a:r>
-              <a:rPr lang="en-US" dirty="0"/>
-              <a:t> responses to soil N</a:t>
+              <a:t>Leaf nitrogen responses to soil nitrogen</a:t>
             </a:r>
           </a:p>
         </p:txBody>
@@ -3399,7 +3391,12 @@
             <p:ph type="subTitle" idx="1"/>
           </p:nvPr>
         </p:nvSpPr>
-        <p:spPr/>
+        <p:spPr>
+          <a:xfrm>
+            <a:off x="1524000" y="3985146"/>
+            <a:ext cx="9144000" cy="1272654"/>
+          </a:xfrm>
+        </p:spPr>
         <p:txBody>
           <a:bodyPr>
             <a:normAutofit/>
@@ -3407,12 +3404,28 @@
           <a:lstStyle/>
           <a:p>
             <a:r>
-              <a:rPr lang="en-US" sz="3200" dirty="0">
+              <a:rPr lang="en-US" sz="4400" dirty="0">
                 <a:solidFill>
                   <a:srgbClr val="7030A0"/>
                 </a:solidFill>
               </a:rPr>
-              <a:t>Nick Smith et multi alia</a:t>
+              <a:t>Nick, </a:t>
+            </a:r>
+            <a:r>
+              <a:rPr lang="en-US" sz="4400" dirty="0" err="1">
+                <a:solidFill>
+                  <a:srgbClr val="7030A0"/>
+                </a:solidFill>
+              </a:rPr>
+              <a:t>Lizz</a:t>
+            </a:r>
+            <a:r>
+              <a:rPr lang="en-US" sz="4400" dirty="0">
+                <a:solidFill>
+                  <a:srgbClr val="7030A0"/>
+                </a:solidFill>
+              </a:rPr>
+              <a:t>, et multi alia</a:t>
             </a:r>
           </a:p>
         </p:txBody>
@@ -3452,7 +3465,7 @@
           <p:cNvPr id="2" name="Title 1">
             <a:extLst>
               <a:ext uri="{FF2B5EF4-FFF2-40B4-BE49-F238E27FC236}">
-                <a16:creationId xmlns:a16="http://schemas.microsoft.com/office/drawing/2014/main" id="{70ADCC1C-B460-9B49-B5E2-FE9B2F8D2437}"/>
+                <a16:creationId xmlns:a16="http://schemas.microsoft.com/office/drawing/2014/main" id="{58F9A0B4-07D0-1040-86BB-F7CF5AF8F579}"/>
               </a:ext>
             </a:extLst>
           </p:cNvPr>
@@ -3470,119 +3483,70 @@
           <a:p>
             <a:r>
               <a:rPr lang="en-US" dirty="0"/>
-              <a:t>Datasets</a:t>
-            </a:r>
-          </a:p>
-        </p:txBody>
-      </p:sp>
-      <p:sp>
-        <p:nvSpPr>
-          <p:cNvPr id="3" name="Content Placeholder 2">
-            <a:extLst>
-              <a:ext uri="{FF2B5EF4-FFF2-40B4-BE49-F238E27FC236}">
-                <a16:creationId xmlns:a16="http://schemas.microsoft.com/office/drawing/2014/main" id="{424F1937-1280-7B46-8871-496841F53251}"/>
-              </a:ext>
-            </a:extLst>
-          </p:cNvPr>
-          <p:cNvSpPr>
-            <a:spLocks noGrp="1"/>
-          </p:cNvSpPr>
-          <p:nvPr>
-            <p:ph idx="1"/>
-          </p:nvPr>
-        </p:nvSpPr>
-        <p:spPr/>
-        <p:txBody>
-          <a:bodyPr/>
-          <a:lstStyle/>
-          <a:p>
+              <a:t>Nutrient Network (</a:t>
+            </a:r>
             <a:r>
               <a:rPr lang="en-US" dirty="0" err="1"/>
               <a:t>NutNet</a:t>
             </a:r>
             <a:r>
               <a:rPr lang="en-US" dirty="0"/>
-              <a:t> leaf trait data</a:t>
+              <a:t>)</a:t>
+            </a:r>
+          </a:p>
+        </p:txBody>
+      </p:sp>
+      <p:sp>
+        <p:nvSpPr>
+          <p:cNvPr id="3" name="Content Placeholder 2">
+            <a:extLst>
+              <a:ext uri="{FF2B5EF4-FFF2-40B4-BE49-F238E27FC236}">
+                <a16:creationId xmlns:a16="http://schemas.microsoft.com/office/drawing/2014/main" id="{3BB0E2D5-4110-DE45-9704-66371057784D}"/>
+              </a:ext>
+            </a:extLst>
+          </p:cNvPr>
+          <p:cNvSpPr>
+            <a:spLocks noGrp="1"/>
+          </p:cNvSpPr>
+          <p:nvPr>
+            <p:ph idx="1"/>
+          </p:nvPr>
+        </p:nvSpPr>
+        <p:spPr/>
+        <p:txBody>
+          <a:bodyPr/>
+          <a:lstStyle/>
+          <a:p>
+            <a:r>
+              <a:rPr lang="en-US" dirty="0"/>
+              <a:t>Globally distributed soil nutrient manipulation experiment</a:t>
+            </a:r>
+          </a:p>
+          <a:p>
+            <a:r>
+              <a:rPr lang="en-US" dirty="0"/>
+              <a:t>Fully factorial soil N x P x K addition experiment (10 g m-2 yr-1)</a:t>
             </a:r>
           </a:p>
           <a:p>
             <a:pPr lvl="1"/>
             <a:r>
               <a:rPr lang="en-US" dirty="0"/>
-              <a:t>n = 2096, 206 species, 26 sites</a:t>
-            </a:r>
-          </a:p>
-          <a:p>
-            <a:pPr lvl="1"/>
-            <a:r>
-              <a:rPr lang="en-US" dirty="0" err="1"/>
-              <a:t>N</a:t>
-            </a:r>
-            <a:r>
-              <a:rPr lang="en-US" baseline="-25000" dirty="0" err="1"/>
-              <a:t>area</a:t>
-            </a:r>
-            <a:endParaRPr lang="en-US" baseline="-25000" dirty="0"/>
-          </a:p>
-          <a:p>
-            <a:pPr lvl="1"/>
-            <a:r>
-              <a:rPr lang="en-US" dirty="0"/>
-              <a:t>LMA</a:t>
-            </a:r>
-          </a:p>
-          <a:p>
-            <a:pPr lvl="1"/>
-            <a:r>
-              <a:rPr lang="en-US" dirty="0"/>
-              <a:t>d13C (converted to </a:t>
-            </a:r>
-            <a:r>
-              <a:rPr lang="el-GR" dirty="0"/>
-              <a:t>χ</a:t>
-            </a:r>
-            <a:r>
-              <a:rPr lang="en-US" dirty="0"/>
-              <a:t>)</a:t>
-            </a:r>
-          </a:p>
-          <a:p>
-            <a:pPr lvl="1"/>
-            <a:r>
-              <a:rPr lang="en-US" dirty="0"/>
-              <a:t>Growing season climate conditions (CRU)</a:t>
-            </a:r>
-          </a:p>
-          <a:p>
-            <a:r>
-              <a:rPr lang="en-US" dirty="0" err="1"/>
-              <a:t>NutNet</a:t>
-            </a:r>
-            <a:r>
-              <a:rPr lang="en-US" dirty="0"/>
-              <a:t> plot data</a:t>
-            </a:r>
-          </a:p>
-          <a:p>
-            <a:pPr lvl="1"/>
-            <a:r>
-              <a:rPr lang="en-US" dirty="0"/>
-              <a:t>n = 673, 26 sites</a:t>
-            </a:r>
-          </a:p>
-          <a:p>
-            <a:pPr lvl="1"/>
-            <a:r>
-              <a:rPr lang="en-US" dirty="0"/>
-              <a:t>LAI</a:t>
-            </a:r>
+              <a:t>At least 3 blocks per site</a:t>
+            </a:r>
+          </a:p>
+          <a:p>
+            <a:pPr marL="0" indent="0">
+              <a:buNone/>
+            </a:pPr>
+            <a:endParaRPr lang="en-US" dirty="0"/>
           </a:p>
         </p:txBody>
       </p:sp>
     </p:spTree>
     <p:extLst>
       <p:ext uri="{BB962C8B-B14F-4D97-AF65-F5344CB8AC3E}">
-        <p14:creationId xmlns:p14="http://schemas.microsoft.com/office/powerpoint/2010/main" val="1351686725"/>
+        <p14:creationId xmlns:p14="http://schemas.microsoft.com/office/powerpoint/2010/main" val="2952722968"/>
       </p:ext>
     </p:extLst>
   </p:cSld>
@@ -3614,7 +3578,7 @@
           <p:cNvPr id="2" name="Title 1">
             <a:extLst>
               <a:ext uri="{FF2B5EF4-FFF2-40B4-BE49-F238E27FC236}">
-                <a16:creationId xmlns:a16="http://schemas.microsoft.com/office/drawing/2014/main" id="{E4387BE1-9310-C44D-869D-F635AC6DC4CD}"/>
+                <a16:creationId xmlns:a16="http://schemas.microsoft.com/office/drawing/2014/main" id="{70ADCC1C-B460-9B49-B5E2-FE9B2F8D2437}"/>
               </a:ext>
             </a:extLst>
           </p:cNvPr>
@@ -3632,7 +3596,7 @@
           <a:p>
             <a:r>
               <a:rPr lang="en-US" dirty="0"/>
-              <a:t>Analyses</a:t>
+              <a:t>Datasets</a:t>
             </a:r>
           </a:p>
         </p:txBody>
@@ -3642,7 +3606,7 @@
           <p:cNvPr id="3" name="Content Placeholder 2">
             <a:extLst>
               <a:ext uri="{FF2B5EF4-FFF2-40B4-BE49-F238E27FC236}">
-                <a16:creationId xmlns:a16="http://schemas.microsoft.com/office/drawing/2014/main" id="{B7AD2C18-251F-7E41-AAA0-631F2901F61B}"/>
+                <a16:creationId xmlns:a16="http://schemas.microsoft.com/office/drawing/2014/main" id="{424F1937-1280-7B46-8871-496841F53251}"/>
               </a:ext>
             </a:extLst>
           </p:cNvPr>
@@ -3658,19 +3622,24 @@
           <a:bodyPr/>
           <a:lstStyle/>
           <a:p>
-            <a:pPr marL="0" indent="0">
-              <a:buNone/>
-            </a:pPr>
-            <a:r>
-              <a:rPr lang="en-US" dirty="0"/>
-              <a:t>**Analyses generally follow Dong et al. (2017)**</a:t>
-            </a:r>
-          </a:p>
-          <a:p>
-            <a:r>
-              <a:rPr lang="en-US" dirty="0"/>
-              <a:t>Predictors of leaf </a:t>
-            </a:r>
+            <a:r>
+              <a:rPr lang="en-US" dirty="0" err="1"/>
+              <a:t>NutNet</a:t>
+            </a:r>
+            <a:r>
+              <a:rPr lang="en-US" dirty="0"/>
+              <a:t> leaf trait data</a:t>
+            </a:r>
+          </a:p>
+          <a:p>
+            <a:pPr lvl="1"/>
+            <a:r>
+              <a:rPr lang="en-US" dirty="0"/>
+              <a:t>n = 2048, 195 species, 22 sites</a:t>
+            </a:r>
+          </a:p>
+          <a:p>
+            <a:pPr lvl="1"/>
             <a:r>
               <a:rPr lang="en-US" dirty="0" err="1"/>
               <a:t>N</a:t>
@@ -3679,28 +3648,20 @@
               <a:rPr lang="en-US" baseline="-25000" dirty="0" err="1"/>
               <a:t>area</a:t>
             </a:r>
-            <a:r>
-              <a:rPr lang="en-US" dirty="0"/>
-              <a:t> (mixed model)</a:t>
-            </a:r>
+            <a:endParaRPr lang="en-US" baseline="-25000" dirty="0"/>
           </a:p>
           <a:p>
             <a:pPr lvl="1"/>
             <a:r>
               <a:rPr lang="en-US" dirty="0"/>
-              <a:t>Dependent variable: leaf </a:t>
-            </a:r>
-            <a:r>
-              <a:rPr lang="en-US" dirty="0" err="1"/>
-              <a:t>Narea</a:t>
-            </a:r>
-            <a:endParaRPr lang="en-US" dirty="0"/>
+              <a:t>LMA</a:t>
+            </a:r>
           </a:p>
           <a:p>
             <a:pPr lvl="1"/>
             <a:r>
               <a:rPr lang="en-US" dirty="0"/>
-              <a:t>Fixed effects: soil N * soil P * soil K + </a:t>
+              <a:t>d13C (converted to </a:t>
             </a:r>
             <a:r>
               <a:rPr lang="el-GR" dirty="0"/>
@@ -3708,107 +3669,38 @@
             </a:r>
             <a:r>
               <a:rPr lang="en-US" dirty="0"/>
-              <a:t> + temperature + PAR + LMA +</a:t>
-            </a:r>
+              <a:t>)</a:t>
+            </a:r>
+          </a:p>
+          <a:p>
+            <a:pPr lvl="1"/>
+            <a:r>
+              <a:rPr lang="en-US" dirty="0"/>
+              <a:t>Growing season climate conditions (CRU)</a:t>
+            </a:r>
+          </a:p>
+          <a:p>
             <a:r>
               <a:rPr lang="en-US" dirty="0" err="1"/>
-              <a:t>Nfixer</a:t>
-            </a:r>
-            <a:endParaRPr lang="en-US" dirty="0"/>
+              <a:t>NutNet</a:t>
+            </a:r>
+            <a:r>
+              <a:rPr lang="en-US" dirty="0"/>
+              <a:t> plot data</a:t>
+            </a:r>
           </a:p>
           <a:p>
             <a:pPr lvl="1"/>
             <a:r>
               <a:rPr lang="en-US" dirty="0"/>
-              <a:t>Random terms: site + </a:t>
-            </a:r>
-            <a:r>
-              <a:rPr lang="en-US" dirty="0" err="1"/>
-              <a:t>site:block</a:t>
-            </a:r>
-            <a:r>
-              <a:rPr lang="en-US" dirty="0"/>
-              <a:t> + species</a:t>
-            </a:r>
-          </a:p>
-          <a:p>
-            <a:r>
-              <a:rPr lang="en-US" dirty="0"/>
-              <a:t>Model predictors of leaf </a:t>
-            </a:r>
-            <a:r>
-              <a:rPr lang="en-US" dirty="0" err="1"/>
-              <a:t>N</a:t>
-            </a:r>
-            <a:r>
-              <a:rPr lang="en-US" baseline="-25000" dirty="0" err="1"/>
-              <a:t>area</a:t>
-            </a:r>
-            <a:r>
-              <a:rPr lang="en-US" dirty="0"/>
-              <a:t> (mixed model)</a:t>
+              <a:t>n = 487, 15 sites</a:t>
             </a:r>
           </a:p>
           <a:p>
             <a:pPr lvl="1"/>
             <a:r>
               <a:rPr lang="en-US" dirty="0"/>
-              <a:t>Dependent variable: leaf </a:t>
-            </a:r>
-            <a:r>
-              <a:rPr lang="en-US" dirty="0" err="1"/>
-              <a:t>N</a:t>
-            </a:r>
-            <a:r>
-              <a:rPr lang="en-US" baseline="-25000" dirty="0" err="1"/>
-              <a:t>area</a:t>
-            </a:r>
-            <a:endParaRPr lang="en-US" baseline="-25000" dirty="0"/>
-          </a:p>
-          <a:p>
-            <a:pPr lvl="1"/>
-            <a:r>
-              <a:rPr lang="en-US" dirty="0"/>
-              <a:t>Fixed effects: soil N * soil P * soil K + predicted </a:t>
-            </a:r>
-            <a:r>
-              <a:rPr lang="en-US" dirty="0" err="1"/>
-              <a:t>Nphoto</a:t>
-            </a:r>
-            <a:r>
-              <a:rPr lang="en-US" dirty="0"/>
-              <a:t> + predicted </a:t>
-            </a:r>
-            <a:r>
-              <a:rPr lang="en-US" dirty="0" err="1"/>
-              <a:t>Nstructure</a:t>
-            </a:r>
-            <a:r>
-              <a:rPr lang="en-US" dirty="0"/>
-              <a:t> + </a:t>
-            </a:r>
-            <a:r>
-              <a:rPr lang="en-US" dirty="0" err="1"/>
-              <a:t>Nfixer</a:t>
-            </a:r>
-            <a:r>
-              <a:rPr lang="en-US" dirty="0"/>
-              <a:t> + photosynthetic pathway</a:t>
-            </a:r>
-          </a:p>
-          <a:p>
-            <a:pPr lvl="1"/>
-            <a:r>
-              <a:rPr lang="en-US" dirty="0"/>
-              <a:t>Random terms: site + </a:t>
-            </a:r>
-            <a:r>
-              <a:rPr lang="en-US" dirty="0" err="1"/>
-              <a:t>site:block</a:t>
-            </a:r>
-            <a:r>
-              <a:rPr lang="en-US" dirty="0"/>
-              <a:t> + species</a:t>
+              <a:t>LAI</a:t>
             </a:r>
           </a:p>
         </p:txBody>
@@ -3816,7 +3708,7 @@
     </p:spTree>
     <p:extLst>
       <p:ext uri="{BB962C8B-B14F-4D97-AF65-F5344CB8AC3E}">
-        <p14:creationId xmlns:p14="http://schemas.microsoft.com/office/powerpoint/2010/main" val="3618313253"/>
+        <p14:creationId xmlns:p14="http://schemas.microsoft.com/office/powerpoint/2010/main" val="1351686725"/>
       </p:ext>
     </p:extLst>
   </p:cSld>
@@ -3866,7 +3758,7 @@
           <a:p>
             <a:r>
               <a:rPr lang="en-US" dirty="0"/>
-              <a:t>Analyses CTD</a:t>
+              <a:t>Analyses</a:t>
             </a:r>
           </a:p>
         </p:txBody>
@@ -3889,20 +3781,52 @@
         </p:nvSpPr>
         <p:spPr/>
         <p:txBody>
-          <a:bodyPr/>
-          <a:lstStyle/>
-          <a:p>
-            <a:r>
-              <a:rPr lang="en-US" dirty="0"/>
-              <a:t>LAI response to soil N</a:t>
+          <a:bodyPr>
+            <a:normAutofit/>
+          </a:bodyPr>
+          <a:lstStyle/>
+          <a:p>
+            <a:pPr marL="0" indent="0">
+              <a:buNone/>
+            </a:pPr>
+            <a:r>
+              <a:rPr lang="en-US" dirty="0"/>
+              <a:t>**Analyses generally follow Dong et al. (2017)**</a:t>
+            </a:r>
+          </a:p>
+          <a:p>
+            <a:r>
+              <a:rPr lang="en-US" dirty="0"/>
+              <a:t>Drivers of leaf </a:t>
+            </a:r>
+            <a:r>
+              <a:rPr lang="en-US" dirty="0" err="1"/>
+              <a:t>N</a:t>
+            </a:r>
+            <a:r>
+              <a:rPr lang="en-US" baseline="-25000" dirty="0" err="1"/>
+              <a:t>area</a:t>
+            </a:r>
+            <a:r>
+              <a:rPr lang="en-US" dirty="0"/>
+              <a:t> (mixed model)</a:t>
             </a:r>
           </a:p>
           <a:p>
             <a:pPr lvl="1"/>
             <a:r>
               <a:rPr lang="en-US" dirty="0"/>
-              <a:t>Dependent variable: plot LAI</a:t>
-            </a:r>
+              <a:t>Dependent variable: leaf </a:t>
+            </a:r>
+            <a:r>
+              <a:rPr lang="en-US" dirty="0" err="1"/>
+              <a:t>N</a:t>
+            </a:r>
+            <a:r>
+              <a:rPr lang="en-US" baseline="-25000" dirty="0" err="1"/>
+              <a:t>area</a:t>
+            </a:r>
+            <a:endParaRPr lang="en-US" baseline="-25000" dirty="0"/>
           </a:p>
           <a:p>
             <a:pPr lvl="1"/>
@@ -3931,67 +3855,28 @@
             <a:pPr lvl="1"/>
             <a:r>
               <a:rPr lang="en-US" dirty="0"/>
-              <a:t>Random terms: site + </a:t>
+              <a:t>Random terms: species + </a:t>
             </a:r>
             <a:r>
               <a:rPr lang="en-US" dirty="0" err="1"/>
-              <a:t>site:block</a:t>
-            </a:r>
-            <a:r>
-              <a:rPr lang="en-US" dirty="0"/>
-              <a:t> + species</a:t>
-            </a:r>
-          </a:p>
-          <a:p>
-            <a:r>
-              <a:rPr lang="en-US" dirty="0"/>
-              <a:t>Supply/demand effects on leaf </a:t>
+              <a:t>species:site</a:t>
+            </a:r>
+            <a:r>
+              <a:rPr lang="en-US" dirty="0"/>
+              <a:t> + </a:t>
             </a:r>
             <a:r>
               <a:rPr lang="en-US" dirty="0" err="1"/>
-              <a:t>N</a:t>
-            </a:r>
-            <a:r>
-              <a:rPr lang="en-US" baseline="-25000" dirty="0" err="1"/>
-              <a:t>area</a:t>
-            </a:r>
-            <a:r>
-              <a:rPr lang="en-US" dirty="0"/>
-              <a:t> (linear model)</a:t>
-            </a:r>
-          </a:p>
-          <a:p>
-            <a:pPr lvl="1"/>
-            <a:r>
-              <a:rPr lang="en-US" dirty="0"/>
-              <a:t>Dependent variable: change in plot averaged leaf </a:t>
-            </a:r>
-            <a:r>
-              <a:rPr lang="en-US" dirty="0" err="1"/>
-              <a:t>N</a:t>
-            </a:r>
-            <a:r>
-              <a:rPr lang="en-US" baseline="-25000" dirty="0" err="1"/>
-              <a:t>area</a:t>
-            </a:r>
-            <a:r>
-              <a:rPr lang="en-US" dirty="0"/>
-              <a:t> in N addition plots</a:t>
-            </a:r>
-          </a:p>
-          <a:p>
-            <a:pPr lvl="1"/>
-            <a:r>
-              <a:rPr lang="en-US" dirty="0"/>
-              <a:t>Fixed effects: change in plot LAI in N addition plots</a:t>
-            </a:r>
+              <a:t>species:site:block</a:t>
+            </a:r>
+            <a:endParaRPr lang="en-US" dirty="0"/>
           </a:p>
         </p:txBody>
       </p:sp>
     </p:spTree>
     <p:extLst>
       <p:ext uri="{BB962C8B-B14F-4D97-AF65-F5344CB8AC3E}">
-        <p14:creationId xmlns:p14="http://schemas.microsoft.com/office/powerpoint/2010/main" val="2188283881"/>
+        <p14:creationId xmlns:p14="http://schemas.microsoft.com/office/powerpoint/2010/main" val="3618313253"/>
       </p:ext>
     </p:extLst>
   </p:cSld>
@@ -4023,7 +3908,7 @@
           <p:cNvPr id="2" name="Title 1">
             <a:extLst>
               <a:ext uri="{FF2B5EF4-FFF2-40B4-BE49-F238E27FC236}">
-                <a16:creationId xmlns:a16="http://schemas.microsoft.com/office/drawing/2014/main" id="{235D3C26-E1ED-D447-AB61-86E2E918D345}"/>
+                <a16:creationId xmlns:a16="http://schemas.microsoft.com/office/drawing/2014/main" id="{E4387BE1-9310-C44D-869D-F635AC6DC4CD}"/>
               </a:ext>
             </a:extLst>
           </p:cNvPr>
@@ -4041,19 +3926,7 @@
           <a:p>
             <a:r>
               <a:rPr lang="en-US" dirty="0"/>
-              <a:t>Results: Does soil N impact leaf </a:t>
-            </a:r>
-            <a:r>
-              <a:rPr lang="en-US" dirty="0" err="1"/>
-              <a:t>N</a:t>
-            </a:r>
-            <a:r>
-              <a:rPr lang="en-US" baseline="-25000" dirty="0" err="1"/>
-              <a:t>area</a:t>
-            </a:r>
-            <a:r>
-              <a:rPr lang="en-US" dirty="0"/>
-              <a:t>?</a:t>
+              <a:t>Analyses</a:t>
             </a:r>
           </a:p>
         </p:txBody>
@@ -4063,7 +3936,7 @@
           <p:cNvPr id="3" name="Content Placeholder 2">
             <a:extLst>
               <a:ext uri="{FF2B5EF4-FFF2-40B4-BE49-F238E27FC236}">
-                <a16:creationId xmlns:a16="http://schemas.microsoft.com/office/drawing/2014/main" id="{A80FC0BD-1D5A-F949-BA4E-8FF9C08883E3}"/>
+                <a16:creationId xmlns:a16="http://schemas.microsoft.com/office/drawing/2014/main" id="{B7AD2C18-251F-7E41-AAA0-631F2901F61B}"/>
               </a:ext>
             </a:extLst>
           </p:cNvPr>
@@ -4074,66 +3947,112 @@
             <p:ph idx="1"/>
           </p:nvPr>
         </p:nvSpPr>
-        <p:spPr>
-          <a:xfrm>
-            <a:off x="838200" y="1825625"/>
-            <a:ext cx="5761383" cy="4351338"/>
-          </a:xfrm>
-        </p:spPr>
+        <p:spPr/>
         <p:txBody>
           <a:bodyPr>
             <a:normAutofit/>
           </a:bodyPr>
           <a:lstStyle/>
           <a:p>
-            <a:r>
-              <a:rPr lang="en-US" sz="4800" dirty="0"/>
-              <a:t>18% increase in leaf </a:t>
-            </a:r>
-            <a:r>
-              <a:rPr lang="en-US" sz="4800" dirty="0" err="1"/>
-              <a:t>Narea</a:t>
-            </a:r>
-            <a:r>
-              <a:rPr lang="en-US" sz="4800" dirty="0"/>
-              <a:t> with soil N (p &lt; 0.01)</a:t>
-            </a:r>
-          </a:p>
-        </p:txBody>
-      </p:sp>
-      <p:pic>
-        <p:nvPicPr>
-          <p:cNvPr id="7" name="Picture 6">
-            <a:extLst>
-              <a:ext uri="{FF2B5EF4-FFF2-40B4-BE49-F238E27FC236}">
-                <a16:creationId xmlns:a16="http://schemas.microsoft.com/office/drawing/2014/main" id="{24B77338-97EE-9342-BA1B-F229B6696001}"/>
-              </a:ext>
-            </a:extLst>
-          </p:cNvPr>
-          <p:cNvPicPr>
-            <a:picLocks noChangeAspect="1"/>
-          </p:cNvPicPr>
-          <p:nvPr/>
-        </p:nvPicPr>
-        <p:blipFill rotWithShape="1">
-          <a:blip r:embed="rId2"/>
-          <a:srcRect r="50000"/>
-          <a:stretch/>
-        </p:blipFill>
-        <p:spPr>
-          <a:xfrm>
-            <a:off x="6851373" y="1516010"/>
-            <a:ext cx="4929809" cy="5219797"/>
-          </a:xfrm>
-          <a:prstGeom prst="rect">
-            <a:avLst/>
-          </a:prstGeom>
-        </p:spPr>
-      </p:pic>
+            <a:pPr marL="0" indent="0">
+              <a:buNone/>
+            </a:pPr>
+            <a:r>
+              <a:rPr lang="en-US" dirty="0"/>
+              <a:t>**Analyses generally follow Dong et al. (2017)**</a:t>
+            </a:r>
+          </a:p>
+          <a:p>
+            <a:r>
+              <a:rPr lang="en-US" dirty="0"/>
+              <a:t>Predictability of leaf </a:t>
+            </a:r>
+            <a:r>
+              <a:rPr lang="en-US" dirty="0" err="1"/>
+              <a:t>N</a:t>
+            </a:r>
+            <a:r>
+              <a:rPr lang="en-US" baseline="-25000" dirty="0" err="1"/>
+              <a:t>area</a:t>
+            </a:r>
+            <a:r>
+              <a:rPr lang="en-US" dirty="0"/>
+              <a:t> (mixed model)</a:t>
+            </a:r>
+          </a:p>
+          <a:p>
+            <a:pPr lvl="1"/>
+            <a:r>
+              <a:rPr lang="en-US" dirty="0"/>
+              <a:t>Dependent variable: leaf </a:t>
+            </a:r>
+            <a:r>
+              <a:rPr lang="en-US" dirty="0" err="1"/>
+              <a:t>N</a:t>
+            </a:r>
+            <a:r>
+              <a:rPr lang="en-US" baseline="-25000" dirty="0" err="1"/>
+              <a:t>area</a:t>
+            </a:r>
+            <a:endParaRPr lang="en-US" baseline="-25000" dirty="0"/>
+          </a:p>
+          <a:p>
+            <a:pPr lvl="1"/>
+            <a:r>
+              <a:rPr lang="en-US" dirty="0"/>
+              <a:t>Fixed effects: soil N * soil P * soil K + predicted </a:t>
+            </a:r>
+            <a:r>
+              <a:rPr lang="en-US" dirty="0" err="1"/>
+              <a:t>Nphoto</a:t>
+            </a:r>
+            <a:r>
+              <a:rPr lang="en-US" dirty="0"/>
+              <a:t> + predicted </a:t>
+            </a:r>
+            <a:r>
+              <a:rPr lang="en-US" dirty="0" err="1"/>
+              <a:t>Nstructure</a:t>
+            </a:r>
+            <a:r>
+              <a:rPr lang="en-US" dirty="0"/>
+              <a:t> + </a:t>
+            </a:r>
+            <a:r>
+              <a:rPr lang="en-US" dirty="0" err="1"/>
+              <a:t>Nfixer</a:t>
+            </a:r>
+            <a:r>
+              <a:rPr lang="en-US" dirty="0"/>
+              <a:t> + photosynthetic pathway</a:t>
+            </a:r>
+          </a:p>
+          <a:p>
+            <a:pPr lvl="1"/>
+            <a:r>
+              <a:rPr lang="en-US" dirty="0"/>
+              <a:t>Random terms: species + </a:t>
+            </a:r>
+            <a:r>
+              <a:rPr lang="en-US" dirty="0" err="1"/>
+              <a:t>species:site</a:t>
+            </a:r>
+            <a:r>
+              <a:rPr lang="en-US" dirty="0"/>
+              <a:t> + </a:t>
+            </a:r>
+            <a:r>
+              <a:rPr lang="en-US" dirty="0" err="1"/>
+              <a:t>species:site:block</a:t>
+            </a:r>
+            <a:endParaRPr lang="en-US" dirty="0"/>
+          </a:p>
+        </p:txBody>
+      </p:sp>
     </p:spTree>
     <p:extLst>
       <p:ext uri="{BB962C8B-B14F-4D97-AF65-F5344CB8AC3E}">
-        <p14:creationId xmlns:p14="http://schemas.microsoft.com/office/powerpoint/2010/main" val="2050478363"/>
+        <p14:creationId xmlns:p14="http://schemas.microsoft.com/office/powerpoint/2010/main" val="3985648139"/>
       </p:ext>
     </p:extLst>
   </p:cSld>
@@ -4165,7 +4084,7 @@
           <p:cNvPr id="2" name="Title 1">
             <a:extLst>
               <a:ext uri="{FF2B5EF4-FFF2-40B4-BE49-F238E27FC236}">
-                <a16:creationId xmlns:a16="http://schemas.microsoft.com/office/drawing/2014/main" id="{235D3C26-E1ED-D447-AB61-86E2E918D345}"/>
+                <a16:creationId xmlns:a16="http://schemas.microsoft.com/office/drawing/2014/main" id="{E4387BE1-9310-C44D-869D-F635AC6DC4CD}"/>
               </a:ext>
             </a:extLst>
           </p:cNvPr>
@@ -4183,80 +4102,116 @@
           <a:p>
             <a:r>
               <a:rPr lang="en-US" dirty="0"/>
-              <a:t>Results: What about other variables?</a:t>
-            </a:r>
-          </a:p>
-        </p:txBody>
-      </p:sp>
-      <p:sp>
-        <p:nvSpPr>
-          <p:cNvPr id="6" name="TextBox 5">
-            <a:extLst>
-              <a:ext uri="{FF2B5EF4-FFF2-40B4-BE49-F238E27FC236}">
-                <a16:creationId xmlns:a16="http://schemas.microsoft.com/office/drawing/2014/main" id="{B58D2A56-92D9-0D44-B58B-0940C39821C9}"/>
-              </a:ext>
-            </a:extLst>
-          </p:cNvPr>
-          <p:cNvSpPr txBox="1"/>
-          <p:nvPr/>
-        </p:nvSpPr>
-        <p:spPr>
-          <a:xfrm>
-            <a:off x="10270435" y="3544407"/>
-            <a:ext cx="1921566" cy="2677656"/>
-          </a:xfrm>
-          <a:prstGeom prst="rect">
-            <a:avLst/>
-          </a:prstGeom>
-          <a:noFill/>
-        </p:spPr>
-        <p:txBody>
-          <a:bodyPr wrap="square" rtlCol="0">
-            <a:spAutoFit/>
-          </a:bodyPr>
-          <a:lstStyle/>
-          <a:p>
-            <a:r>
-              <a:rPr lang="en-US" sz="2800" dirty="0"/>
-              <a:t>Soil (brown) is not that important (&lt;2% combined)</a:t>
-            </a:r>
-          </a:p>
-        </p:txBody>
-      </p:sp>
-      <p:pic>
-        <p:nvPicPr>
-          <p:cNvPr id="4" name="Picture 3">
-            <a:extLst>
-              <a:ext uri="{FF2B5EF4-FFF2-40B4-BE49-F238E27FC236}">
-                <a16:creationId xmlns:a16="http://schemas.microsoft.com/office/drawing/2014/main" id="{D1BB47D3-5A09-5541-B90A-1EA6683D3E7B}"/>
-              </a:ext>
-            </a:extLst>
-          </p:cNvPr>
-          <p:cNvPicPr>
-            <a:picLocks noChangeAspect="1"/>
-          </p:cNvPicPr>
-          <p:nvPr/>
-        </p:nvPicPr>
-        <p:blipFill>
-          <a:blip r:embed="rId2"/>
-          <a:stretch>
-            <a:fillRect/>
-          </a:stretch>
-        </p:blipFill>
-        <p:spPr>
-          <a:xfrm>
-            <a:off x="0" y="1436496"/>
-            <a:ext cx="9859617" cy="5219797"/>
-          </a:xfrm>
-          <a:prstGeom prst="rect">
-            <a:avLst/>
-          </a:prstGeom>
-        </p:spPr>
-      </p:pic>
+              <a:t>Analyses CTD</a:t>
+            </a:r>
+          </a:p>
+        </p:txBody>
+      </p:sp>
+      <p:sp>
+        <p:nvSpPr>
+          <p:cNvPr id="3" name="Content Placeholder 2">
+            <a:extLst>
+              <a:ext uri="{FF2B5EF4-FFF2-40B4-BE49-F238E27FC236}">
+                <a16:creationId xmlns:a16="http://schemas.microsoft.com/office/drawing/2014/main" id="{B7AD2C18-251F-7E41-AAA0-631F2901F61B}"/>
+              </a:ext>
+            </a:extLst>
+          </p:cNvPr>
+          <p:cNvSpPr>
+            <a:spLocks noGrp="1"/>
+          </p:cNvSpPr>
+          <p:nvPr>
+            <p:ph idx="1"/>
+          </p:nvPr>
+        </p:nvSpPr>
+        <p:spPr/>
+        <p:txBody>
+          <a:bodyPr/>
+          <a:lstStyle/>
+          <a:p>
+            <a:r>
+              <a:rPr lang="en-US" dirty="0"/>
+              <a:t>LAI response to soil N</a:t>
+            </a:r>
+          </a:p>
+          <a:p>
+            <a:pPr lvl="1"/>
+            <a:r>
+              <a:rPr lang="en-US" dirty="0"/>
+              <a:t>Dependent variable: plot LAI</a:t>
+            </a:r>
+          </a:p>
+          <a:p>
+            <a:pPr lvl="1"/>
+            <a:r>
+              <a:rPr lang="en-US" dirty="0"/>
+              <a:t>Fixed effects: soil N * soil P * soil K</a:t>
+            </a:r>
+          </a:p>
+          <a:p>
+            <a:pPr lvl="1"/>
+            <a:r>
+              <a:rPr lang="en-US" dirty="0"/>
+              <a:t>Random terms: site + </a:t>
+            </a:r>
+            <a:r>
+              <a:rPr lang="en-US" dirty="0" err="1"/>
+              <a:t>site:block</a:t>
+            </a:r>
+            <a:r>
+              <a:rPr lang="en-US" dirty="0"/>
+              <a:t> </a:t>
+            </a:r>
+          </a:p>
+          <a:p>
+            <a:r>
+              <a:rPr lang="en-US" dirty="0"/>
+              <a:t>Supply/demand effects on leaf </a:t>
+            </a:r>
+            <a:r>
+              <a:rPr lang="en-US" dirty="0" err="1"/>
+              <a:t>N</a:t>
+            </a:r>
+            <a:r>
+              <a:rPr lang="en-US" baseline="-25000" dirty="0" err="1"/>
+              <a:t>area</a:t>
+            </a:r>
+            <a:r>
+              <a:rPr lang="en-US" dirty="0"/>
+              <a:t> (linear model)</a:t>
+            </a:r>
+          </a:p>
+          <a:p>
+            <a:pPr lvl="1"/>
+            <a:r>
+              <a:rPr lang="en-US" dirty="0"/>
+              <a:t>Dependent variable: change in plot averaged leaf </a:t>
+            </a:r>
+            <a:r>
+              <a:rPr lang="en-US" dirty="0" err="1"/>
+              <a:t>N</a:t>
+            </a:r>
+            <a:r>
+              <a:rPr lang="en-US" baseline="-25000" dirty="0" err="1"/>
+              <a:t>area</a:t>
+            </a:r>
+            <a:r>
+              <a:rPr lang="en-US" dirty="0"/>
+              <a:t> in N addition plots</a:t>
+            </a:r>
+          </a:p>
+          <a:p>
+            <a:pPr lvl="1"/>
+            <a:r>
+              <a:rPr lang="en-US" dirty="0"/>
+              <a:t>Fixed effects: change in plot LAI in N addition plots</a:t>
+            </a:r>
+          </a:p>
+        </p:txBody>
+      </p:sp>
     </p:spTree>
     <p:extLst>
       <p:ext uri="{BB962C8B-B14F-4D97-AF65-F5344CB8AC3E}">
-        <p14:creationId xmlns:p14="http://schemas.microsoft.com/office/powerpoint/2010/main" val="4194682511"/>
+        <p14:creationId xmlns:p14="http://schemas.microsoft.com/office/powerpoint/2010/main" val="2188283881"/>
       </p:ext>
     </p:extLst>
   </p:cSld>
@@ -4288,7 +4243,7 @@
           <p:cNvPr id="2" name="Title 1">
             <a:extLst>
               <a:ext uri="{FF2B5EF4-FFF2-40B4-BE49-F238E27FC236}">
-                <a16:creationId xmlns:a16="http://schemas.microsoft.com/office/drawing/2014/main" id="{11237649-0706-2643-B14E-55654013FF2F}"/>
+                <a16:creationId xmlns:a16="http://schemas.microsoft.com/office/drawing/2014/main" id="{235D3C26-E1ED-D447-AB61-86E2E918D345}"/>
               </a:ext>
             </a:extLst>
           </p:cNvPr>
@@ -4306,61 +4261,72 @@
           <a:p>
             <a:r>
               <a:rPr lang="en-US" dirty="0"/>
-              <a:t>Results: What about other variables?</a:t>
-            </a:r>
-          </a:p>
-        </p:txBody>
-      </p:sp>
-      <p:sp>
-        <p:nvSpPr>
-          <p:cNvPr id="5" name="TextBox 4">
-            <a:extLst>
-              <a:ext uri="{FF2B5EF4-FFF2-40B4-BE49-F238E27FC236}">
-                <a16:creationId xmlns:a16="http://schemas.microsoft.com/office/drawing/2014/main" id="{0BCB4DDA-FC8E-8F4E-97DC-D65690E1EF41}"/>
-              </a:ext>
-            </a:extLst>
-          </p:cNvPr>
-          <p:cNvSpPr txBox="1"/>
-          <p:nvPr/>
+              <a:t>Results: Does soil N impact leaf </a:t>
+            </a:r>
+            <a:r>
+              <a:rPr lang="en-US" dirty="0" err="1"/>
+              <a:t>N</a:t>
+            </a:r>
+            <a:r>
+              <a:rPr lang="en-US" baseline="-25000" dirty="0" err="1"/>
+              <a:t>area</a:t>
+            </a:r>
+            <a:r>
+              <a:rPr lang="en-US" dirty="0"/>
+              <a:t>?</a:t>
+            </a:r>
+          </a:p>
+        </p:txBody>
+      </p:sp>
+      <p:sp>
+        <p:nvSpPr>
+          <p:cNvPr id="3" name="Content Placeholder 2">
+            <a:extLst>
+              <a:ext uri="{FF2B5EF4-FFF2-40B4-BE49-F238E27FC236}">
+                <a16:creationId xmlns:a16="http://schemas.microsoft.com/office/drawing/2014/main" id="{A80FC0BD-1D5A-F949-BA4E-8FF9C08883E3}"/>
+              </a:ext>
+            </a:extLst>
+          </p:cNvPr>
+          <p:cNvSpPr>
+            <a:spLocks noGrp="1"/>
+          </p:cNvSpPr>
+          <p:nvPr>
+            <p:ph idx="1"/>
+          </p:nvPr>
         </p:nvSpPr>
         <p:spPr>
           <a:xfrm>
-            <a:off x="9064487" y="2676939"/>
-            <a:ext cx="3127513" cy="1815882"/>
+            <a:off x="838201" y="1825625"/>
+            <a:ext cx="5207758" cy="4351338"/>
           </a:xfrm>
-          <a:prstGeom prst="rect">
-            <a:avLst/>
-          </a:prstGeom>
-          <a:noFill/>
         </p:spPr>
         <p:txBody>
-          <a:bodyPr wrap="square" rtlCol="0">
-            <a:spAutoFit/>
+          <a:bodyPr>
+            <a:normAutofit/>
           </a:bodyPr>
           <a:lstStyle/>
           <a:p>
             <a:r>
-              <a:rPr lang="en-US" sz="2800" dirty="0"/>
-              <a:t>Structural and photosynthetic N combined explain 69% of leaf </a:t>
-            </a:r>
-            <a:r>
-              <a:rPr lang="en-US" sz="2800" dirty="0" err="1"/>
-              <a:t>N</a:t>
-            </a:r>
-            <a:r>
-              <a:rPr lang="en-US" sz="2800" baseline="-25000" dirty="0" err="1"/>
-              <a:t>area</a:t>
-            </a:r>
-            <a:endParaRPr lang="en-US" sz="2800" baseline="-25000" dirty="0"/>
+              <a:rPr lang="en-US" sz="4800" dirty="0"/>
+              <a:t>19% increase in leaf </a:t>
+            </a:r>
+            <a:r>
+              <a:rPr lang="en-US" sz="4800" dirty="0" err="1"/>
+              <a:t>Narea</a:t>
+            </a:r>
+            <a:r>
+              <a:rPr lang="en-US" sz="4800" dirty="0"/>
+              <a:t> with soil N (p &lt; 0.01)</a:t>
+            </a:r>
           </a:p>
         </p:txBody>
       </p:sp>
       <p:pic>
         <p:nvPicPr>
-          <p:cNvPr id="7" name="Picture 6">
-            <a:extLst>
-              <a:ext uri="{FF2B5EF4-FFF2-40B4-BE49-F238E27FC236}">
-                <a16:creationId xmlns:a16="http://schemas.microsoft.com/office/drawing/2014/main" id="{5F332E40-D7F3-E648-A8BA-B6C5A7026EAA}"/>
+          <p:cNvPr id="12" name="Picture 11">
+            <a:extLst>
+              <a:ext uri="{FF2B5EF4-FFF2-40B4-BE49-F238E27FC236}">
+                <a16:creationId xmlns:a16="http://schemas.microsoft.com/office/drawing/2014/main" id="{EA96DE63-9FE2-CA4C-B0D8-F12B19B6CA5F}"/>
               </a:ext>
             </a:extLst>
           </p:cNvPr>
@@ -4369,16 +4335,15 @@
           </p:cNvPicPr>
           <p:nvPr/>
         </p:nvPicPr>
-        <p:blipFill>
+        <p:blipFill rotWithShape="1">
           <a:blip r:embed="rId2"/>
-          <a:stretch>
-            <a:fillRect/>
-          </a:stretch>
+          <a:srcRect r="49962"/>
+          <a:stretch/>
         </p:blipFill>
         <p:spPr>
           <a:xfrm>
-            <a:off x="838200" y="1690688"/>
-            <a:ext cx="7770191" cy="4856369"/>
+            <a:off x="6504537" y="1348711"/>
+            <a:ext cx="5014173" cy="5305165"/>
           </a:xfrm>
           <a:prstGeom prst="rect">
             <a:avLst/>
@@ -4388,7 +4353,7 @@
     </p:spTree>
     <p:extLst>
       <p:ext uri="{BB962C8B-B14F-4D97-AF65-F5344CB8AC3E}">
-        <p14:creationId xmlns:p14="http://schemas.microsoft.com/office/powerpoint/2010/main" val="1998700469"/>
+        <p14:creationId xmlns:p14="http://schemas.microsoft.com/office/powerpoint/2010/main" val="2050478363"/>
       </p:ext>
     </p:extLst>
   </p:cSld>
@@ -4420,7 +4385,7 @@
           <p:cNvPr id="2" name="Title 1">
             <a:extLst>
               <a:ext uri="{FF2B5EF4-FFF2-40B4-BE49-F238E27FC236}">
-                <a16:creationId xmlns:a16="http://schemas.microsoft.com/office/drawing/2014/main" id="{1E4F0A87-20B3-7E47-B010-7A871D578E44}"/>
+                <a16:creationId xmlns:a16="http://schemas.microsoft.com/office/drawing/2014/main" id="{235D3C26-E1ED-D447-AB61-86E2E918D345}"/>
               </a:ext>
             </a:extLst>
           </p:cNvPr>
@@ -4438,17 +4403,17 @@
           <a:p>
             <a:r>
               <a:rPr lang="en-US" dirty="0"/>
-              <a:t>Results: What is the LAI response to soil N?</a:t>
-            </a:r>
-          </a:p>
-        </p:txBody>
-      </p:sp>
-      <p:sp>
-        <p:nvSpPr>
-          <p:cNvPr id="8" name="TextBox 7">
-            <a:extLst>
-              <a:ext uri="{FF2B5EF4-FFF2-40B4-BE49-F238E27FC236}">
-                <a16:creationId xmlns:a16="http://schemas.microsoft.com/office/drawing/2014/main" id="{A96BE0C8-3669-C642-8520-F583FEBC9A72}"/>
+              <a:t>Results: What about other variables?</a:t>
+            </a:r>
+          </a:p>
+        </p:txBody>
+      </p:sp>
+      <p:sp>
+        <p:nvSpPr>
+          <p:cNvPr id="6" name="TextBox 5">
+            <a:extLst>
+              <a:ext uri="{FF2B5EF4-FFF2-40B4-BE49-F238E27FC236}">
+                <a16:creationId xmlns:a16="http://schemas.microsoft.com/office/drawing/2014/main" id="{B58D2A56-92D9-0D44-B58B-0940C39821C9}"/>
               </a:ext>
             </a:extLst>
           </p:cNvPr>
@@ -4457,8 +4422,8 @@
         </p:nvSpPr>
         <p:spPr>
           <a:xfrm>
-            <a:off x="7033328" y="2703444"/>
-            <a:ext cx="5158672" cy="1200329"/>
+            <a:off x="7499939" y="2829088"/>
+            <a:ext cx="3541100" cy="2308324"/>
           </a:xfrm>
           <a:prstGeom prst="rect">
             <a:avLst/>
@@ -4473,56 +4438,17 @@
           <a:p>
             <a:r>
               <a:rPr lang="en-US" sz="3600" dirty="0"/>
-              <a:t>38% increase in LAI (p &lt; 0.001)</a:t>
-            </a:r>
-          </a:p>
-        </p:txBody>
-      </p:sp>
-      <p:sp>
-        <p:nvSpPr>
-          <p:cNvPr id="3" name="TextBox 2">
-            <a:extLst>
-              <a:ext uri="{FF2B5EF4-FFF2-40B4-BE49-F238E27FC236}">
-                <a16:creationId xmlns:a16="http://schemas.microsoft.com/office/drawing/2014/main" id="{FD6884CC-0A81-2748-BEC9-B4A8A76F0A51}"/>
-              </a:ext>
-            </a:extLst>
-          </p:cNvPr>
-          <p:cNvSpPr txBox="1"/>
-          <p:nvPr/>
-        </p:nvSpPr>
-        <p:spPr>
-          <a:xfrm>
-            <a:off x="7315200" y="4141822"/>
-            <a:ext cx="4492488" cy="954107"/>
-          </a:xfrm>
-          <a:prstGeom prst="rect">
-            <a:avLst/>
-          </a:prstGeom>
-          <a:noFill/>
-        </p:spPr>
-        <p:txBody>
-          <a:bodyPr wrap="square" rtlCol="0">
-            <a:spAutoFit/>
-          </a:bodyPr>
-          <a:lstStyle/>
-          <a:p>
-            <a:r>
-              <a:rPr lang="en-US" sz="2800" dirty="0">
-                <a:solidFill>
-                  <a:srgbClr val="FF0000"/>
-                </a:solidFill>
-              </a:rPr>
-              <a:t>More N going to leaf quantity than quality</a:t>
+              <a:t>Soil (brown) is not that important (&lt;2% combined)</a:t>
             </a:r>
           </a:p>
         </p:txBody>
       </p:sp>
       <p:pic>
         <p:nvPicPr>
-          <p:cNvPr id="5" name="Picture 4">
-            <a:extLst>
-              <a:ext uri="{FF2B5EF4-FFF2-40B4-BE49-F238E27FC236}">
-                <a16:creationId xmlns:a16="http://schemas.microsoft.com/office/drawing/2014/main" id="{321D2C9C-DA7C-884A-8255-7DB257EAE9A9}"/>
+          <p:cNvPr id="10" name="Picture 9">
+            <a:extLst>
+              <a:ext uri="{FF2B5EF4-FFF2-40B4-BE49-F238E27FC236}">
+                <a16:creationId xmlns:a16="http://schemas.microsoft.com/office/drawing/2014/main" id="{C9188B12-FC5A-2C44-8F78-5F819BA91F6B}"/>
               </a:ext>
             </a:extLst>
           </p:cNvPr>
@@ -4531,16 +4457,15 @@
           </p:cNvPicPr>
           <p:nvPr/>
         </p:nvPicPr>
-        <p:blipFill>
+        <p:blipFill rotWithShape="1">
           <a:blip r:embed="rId2"/>
-          <a:stretch>
-            <a:fillRect/>
-          </a:stretch>
+          <a:srcRect l="50037"/>
+          <a:stretch/>
         </p:blipFill>
         <p:spPr>
           <a:xfrm>
-            <a:off x="1706255" y="1428625"/>
-            <a:ext cx="4933084" cy="5426393"/>
+            <a:off x="2115403" y="1514105"/>
+            <a:ext cx="4814248" cy="5101246"/>
           </a:xfrm>
           <a:prstGeom prst="rect">
             <a:avLst/>
@@ -4550,7 +4475,7 @@
     </p:spTree>
     <p:extLst>
       <p:ext uri="{BB962C8B-B14F-4D97-AF65-F5344CB8AC3E}">
-        <p14:creationId xmlns:p14="http://schemas.microsoft.com/office/powerpoint/2010/main" val="1796116623"/>
+        <p14:creationId xmlns:p14="http://schemas.microsoft.com/office/powerpoint/2010/main" val="4194682511"/>
       </p:ext>
     </p:extLst>
   </p:cSld>
@@ -4582,7 +4507,7 @@
           <p:cNvPr id="2" name="Title 1">
             <a:extLst>
               <a:ext uri="{FF2B5EF4-FFF2-40B4-BE49-F238E27FC236}">
-                <a16:creationId xmlns:a16="http://schemas.microsoft.com/office/drawing/2014/main" id="{76EFAC51-0A4F-D64F-90F2-DABC34E0269E}"/>
+                <a16:creationId xmlns:a16="http://schemas.microsoft.com/office/drawing/2014/main" id="{11237649-0706-2643-B14E-55654013FF2F}"/>
               </a:ext>
             </a:extLst>
           </p:cNvPr>
@@ -4600,25 +4525,29 @@
           <a:p>
             <a:r>
               <a:rPr lang="en-US" dirty="0"/>
-              <a:t>Results: Does the impact of soil N on leaf </a:t>
+              <a:t>Results: Can we predict </a:t>
             </a:r>
             <a:r>
               <a:rPr lang="en-US" dirty="0" err="1"/>
-              <a:t>Narea</a:t>
-            </a:r>
-            <a:r>
-              <a:rPr lang="en-US" dirty="0"/>
-              <a:t> vary with leaf N demand?</a:t>
+              <a:t>N</a:t>
+            </a:r>
+            <a:r>
+              <a:rPr lang="en-US" baseline="-25000" dirty="0" err="1"/>
+              <a:t>area</a:t>
+            </a:r>
+            <a:r>
+              <a:rPr lang="en-US" dirty="0"/>
+              <a:t>?</a:t>
             </a:r>
           </a:p>
         </p:txBody>
       </p:sp>
       <p:pic>
         <p:nvPicPr>
-          <p:cNvPr id="3" name="Picture 2">
-            <a:extLst>
-              <a:ext uri="{FF2B5EF4-FFF2-40B4-BE49-F238E27FC236}">
-                <a16:creationId xmlns:a16="http://schemas.microsoft.com/office/drawing/2014/main" id="{C1C38879-7208-5D48-82D5-543072CEAA2B}"/>
+          <p:cNvPr id="8" name="Picture 7">
+            <a:extLst>
+              <a:ext uri="{FF2B5EF4-FFF2-40B4-BE49-F238E27FC236}">
+                <a16:creationId xmlns:a16="http://schemas.microsoft.com/office/drawing/2014/main" id="{DBACD98B-E569-F546-9024-D0681CB11F2E}"/>
               </a:ext>
             </a:extLst>
           </p:cNvPr>
@@ -4635,8 +4564,8 @@
         </p:blipFill>
         <p:spPr>
           <a:xfrm>
-            <a:off x="1834481" y="1690688"/>
-            <a:ext cx="4261519" cy="4971772"/>
+            <a:off x="838200" y="1595153"/>
+            <a:ext cx="8179558" cy="5112224"/>
           </a:xfrm>
           <a:prstGeom prst="rect">
             <a:avLst/>
@@ -4645,10 +4574,10 @@
       </p:pic>
       <p:sp>
         <p:nvSpPr>
-          <p:cNvPr id="4" name="TextBox 3">
-            <a:extLst>
-              <a:ext uri="{FF2B5EF4-FFF2-40B4-BE49-F238E27FC236}">
-                <a16:creationId xmlns:a16="http://schemas.microsoft.com/office/drawing/2014/main" id="{BE554A7E-DC9E-EE41-8FE8-E5C35222F645}"/>
+          <p:cNvPr id="11" name="TextBox 10">
+            <a:extLst>
+              <a:ext uri="{FF2B5EF4-FFF2-40B4-BE49-F238E27FC236}">
+                <a16:creationId xmlns:a16="http://schemas.microsoft.com/office/drawing/2014/main" id="{2B2899B8-4D7F-C949-9607-91F57E77EDF3}"/>
               </a:ext>
             </a:extLst>
           </p:cNvPr>
@@ -4657,8 +4586,8 @@
         </p:nvSpPr>
         <p:spPr>
           <a:xfrm>
-            <a:off x="6480313" y="3246783"/>
-            <a:ext cx="5711687" cy="1815882"/>
+            <a:off x="9222254" y="2852861"/>
+            <a:ext cx="2769284" cy="1384995"/>
           </a:xfrm>
           <a:prstGeom prst="rect">
             <a:avLst/>
@@ -4666,22 +4595,42 @@
           <a:noFill/>
         </p:spPr>
         <p:txBody>
-          <a:bodyPr wrap="square" rtlCol="0">
+          <a:bodyPr wrap="none" rtlCol="0">
             <a:spAutoFit/>
           </a:bodyPr>
           <a:lstStyle/>
           <a:p>
             <a:r>
               <a:rPr lang="en-US" sz="2800" dirty="0"/>
-              <a:t>The change in leaf </a:t>
-            </a:r>
+              <a:t>Soil N (P &lt; 0.01)</a:t>
+            </a:r>
+          </a:p>
+          <a:p>
             <a:r>
               <a:rPr lang="en-US" sz="2800" dirty="0" err="1"/>
-              <a:t>Narea</a:t>
+              <a:t>N</a:t>
+            </a:r>
+            <a:r>
+              <a:rPr lang="en-US" sz="2800" baseline="-25000" dirty="0" err="1"/>
+              <a:t>structure</a:t>
             </a:r>
             <a:r>
               <a:rPr lang="en-US" sz="2800" dirty="0"/>
-              <a:t> should be greater in places where the LAI (or plant N demand) doesn’t change much</a:t>
+              <a:t> (P &lt; 0.01)</a:t>
+            </a:r>
+          </a:p>
+          <a:p>
+            <a:r>
+              <a:rPr lang="en-US" sz="2800" dirty="0" err="1"/>
+              <a:t>N</a:t>
+            </a:r>
+            <a:r>
+              <a:rPr lang="en-US" sz="2800" baseline="-25000" dirty="0" err="1"/>
+              <a:t>photo</a:t>
+            </a:r>
+            <a:r>
+              <a:rPr lang="en-US" sz="2800" dirty="0"/>
+              <a:t> (P &lt; 0.01)</a:t>
             </a:r>
           </a:p>
         </p:txBody>
@@ -4689,7 +4638,7 @@
     </p:spTree>
     <p:extLst>
       <p:ext uri="{BB962C8B-B14F-4D97-AF65-F5344CB8AC3E}">
-        <p14:creationId xmlns:p14="http://schemas.microsoft.com/office/powerpoint/2010/main" val="2227413631"/>
+        <p14:creationId xmlns:p14="http://schemas.microsoft.com/office/powerpoint/2010/main" val="1998700469"/>
       </p:ext>
     </p:extLst>
   </p:cSld>
@@ -4721,7 +4670,7 @@
           <p:cNvPr id="2" name="Title 1">
             <a:extLst>
               <a:ext uri="{FF2B5EF4-FFF2-40B4-BE49-F238E27FC236}">
-                <a16:creationId xmlns:a16="http://schemas.microsoft.com/office/drawing/2014/main" id="{76EFAC51-0A4F-D64F-90F2-DABC34E0269E}"/>
+                <a16:creationId xmlns:a16="http://schemas.microsoft.com/office/drawing/2014/main" id="{11237649-0706-2643-B14E-55654013FF2F}"/>
               </a:ext>
             </a:extLst>
           </p:cNvPr>
@@ -4739,7 +4688,7 @@
           <a:p>
             <a:r>
               <a:rPr lang="en-US" dirty="0"/>
-              <a:t>Results: Does the impact of soil N on leaf </a:t>
+              <a:t>Results: Can we predict </a:t>
             </a:r>
             <a:r>
               <a:rPr lang="en-US" dirty="0" err="1"/>
@@ -4751,17 +4700,17 @@
             </a:r>
             <a:r>
               <a:rPr lang="en-US" dirty="0"/>
-              <a:t> vary with leaf N demand?</a:t>
-            </a:r>
-          </a:p>
-        </p:txBody>
-      </p:sp>
-      <p:sp>
-        <p:nvSpPr>
-          <p:cNvPr id="7" name="TextBox 6">
-            <a:extLst>
-              <a:ext uri="{FF2B5EF4-FFF2-40B4-BE49-F238E27FC236}">
-                <a16:creationId xmlns:a16="http://schemas.microsoft.com/office/drawing/2014/main" id="{F26C02DA-77F8-AA48-9E86-7C55E4612A19}"/>
+              <a:t>?</a:t>
+            </a:r>
+          </a:p>
+        </p:txBody>
+      </p:sp>
+      <p:sp>
+        <p:nvSpPr>
+          <p:cNvPr id="5" name="TextBox 4">
+            <a:extLst>
+              <a:ext uri="{FF2B5EF4-FFF2-40B4-BE49-F238E27FC236}">
+                <a16:creationId xmlns:a16="http://schemas.microsoft.com/office/drawing/2014/main" id="{0BCB4DDA-FC8E-8F4E-97DC-D65690E1EF41}"/>
               </a:ext>
             </a:extLst>
           </p:cNvPr>
@@ -4770,8 +4719,8 @@
         </p:nvSpPr>
         <p:spPr>
           <a:xfrm>
-            <a:off x="7487478" y="3180522"/>
-            <a:ext cx="1914307" cy="646331"/>
+            <a:off x="7915701" y="2676939"/>
+            <a:ext cx="4276299" cy="1815882"/>
           </a:xfrm>
           <a:prstGeom prst="rect">
             <a:avLst/>
@@ -4779,28 +4728,33 @@
           <a:noFill/>
         </p:spPr>
         <p:txBody>
-          <a:bodyPr wrap="none" rtlCol="0">
+          <a:bodyPr wrap="square" rtlCol="0">
             <a:spAutoFit/>
           </a:bodyPr>
           <a:lstStyle/>
           <a:p>
             <a:r>
-              <a:rPr lang="en-US" sz="3600" dirty="0">
-                <a:solidFill>
-                  <a:srgbClr val="FF0000"/>
-                </a:solidFill>
-              </a:rPr>
-              <a:t>P = 0.059</a:t>
-            </a:r>
+              <a:rPr lang="en-US" sz="2800" dirty="0"/>
+              <a:t>Structural and photosynthetic N combined explain 69% of the variation in leaf </a:t>
+            </a:r>
+            <a:r>
+              <a:rPr lang="en-US" sz="2800" dirty="0" err="1"/>
+              <a:t>N</a:t>
+            </a:r>
+            <a:r>
+              <a:rPr lang="en-US" sz="2800" baseline="-25000" dirty="0" err="1"/>
+              <a:t>area</a:t>
+            </a:r>
+            <a:endParaRPr lang="en-US" sz="2800" baseline="-25000" dirty="0"/>
           </a:p>
         </p:txBody>
       </p:sp>
       <p:pic>
         <p:nvPicPr>
-          <p:cNvPr id="8" name="Picture 7">
-            <a:extLst>
-              <a:ext uri="{FF2B5EF4-FFF2-40B4-BE49-F238E27FC236}">
-                <a16:creationId xmlns:a16="http://schemas.microsoft.com/office/drawing/2014/main" id="{14CCF82C-93EA-F945-90BF-8537B8598C7B}"/>
+          <p:cNvPr id="10" name="Picture 9">
+            <a:extLst>
+              <a:ext uri="{FF2B5EF4-FFF2-40B4-BE49-F238E27FC236}">
+                <a16:creationId xmlns:a16="http://schemas.microsoft.com/office/drawing/2014/main" id="{9A0E678B-7FA8-6A43-B72F-F14CEA065D28}"/>
               </a:ext>
             </a:extLst>
           </p:cNvPr>
@@ -4817,38 +4771,8 @@
         </p:blipFill>
         <p:spPr>
           <a:xfrm>
-            <a:off x="7487478" y="3869991"/>
-            <a:ext cx="4340087" cy="2893391"/>
-          </a:xfrm>
-          <a:prstGeom prst="rect">
-            <a:avLst/>
-          </a:prstGeom>
-        </p:spPr>
-      </p:pic>
-      <p:pic>
-        <p:nvPicPr>
-          <p:cNvPr id="10" name="Picture 9">
-            <a:extLst>
-              <a:ext uri="{FF2B5EF4-FFF2-40B4-BE49-F238E27FC236}">
-                <a16:creationId xmlns:a16="http://schemas.microsoft.com/office/drawing/2014/main" id="{8A3C2BD8-5066-5D44-937B-C5EEF321EEA4}"/>
-              </a:ext>
-            </a:extLst>
-          </p:cNvPr>
-          <p:cNvPicPr>
-            <a:picLocks noChangeAspect="1"/>
-          </p:cNvPicPr>
-          <p:nvPr/>
-        </p:nvPicPr>
-        <p:blipFill>
-          <a:blip r:embed="rId3"/>
-          <a:stretch>
-            <a:fillRect/>
-          </a:stretch>
-        </p:blipFill>
-        <p:spPr>
-          <a:xfrm>
-            <a:off x="1895767" y="1828800"/>
-            <a:ext cx="4368094" cy="4914106"/>
+            <a:off x="2483892" y="1472926"/>
+            <a:ext cx="5049103" cy="5346109"/>
           </a:xfrm>
           <a:prstGeom prst="rect">
             <a:avLst/>
@@ -4858,7 +4782,169 @@
     </p:spTree>
     <p:extLst>
       <p:ext uri="{BB962C8B-B14F-4D97-AF65-F5344CB8AC3E}">
-        <p14:creationId xmlns:p14="http://schemas.microsoft.com/office/powerpoint/2010/main" val="3335065008"/>
+        <p14:creationId xmlns:p14="http://schemas.microsoft.com/office/powerpoint/2010/main" val="3013706919"/>
+      </p:ext>
+    </p:extLst>
+  </p:cSld>
+  <p:clrMapOvr>
+    <a:masterClrMapping/>
+  </p:clrMapOvr>
+</p:sld>
+</file>
+
+<file path=ppt/slides/slide19.xml><?xml version="1.0" encoding="utf-8"?>
+<p:sld xmlns:a="http://schemas.openxmlformats.org/drawingml/2006/main" xmlns:r="http://schemas.openxmlformats.org/officeDocument/2006/relationships" xmlns:p="http://schemas.openxmlformats.org/presentationml/2006/main">
+  <p:cSld>
+    <p:spTree>
+      <p:nvGrpSpPr>
+        <p:cNvPr id="1" name=""/>
+        <p:cNvGrpSpPr/>
+        <p:nvPr/>
+      </p:nvGrpSpPr>
+      <p:grpSpPr>
+        <a:xfrm>
+          <a:off x="0" y="0"/>
+          <a:ext cx="0" cy="0"/>
+          <a:chOff x="0" y="0"/>
+          <a:chExt cx="0" cy="0"/>
+        </a:xfrm>
+      </p:grpSpPr>
+      <p:sp>
+        <p:nvSpPr>
+          <p:cNvPr id="2" name="Title 1">
+            <a:extLst>
+              <a:ext uri="{FF2B5EF4-FFF2-40B4-BE49-F238E27FC236}">
+                <a16:creationId xmlns:a16="http://schemas.microsoft.com/office/drawing/2014/main" id="{1E4F0A87-20B3-7E47-B010-7A871D578E44}"/>
+              </a:ext>
+            </a:extLst>
+          </p:cNvPr>
+          <p:cNvSpPr>
+            <a:spLocks noGrp="1"/>
+          </p:cNvSpPr>
+          <p:nvPr>
+            <p:ph type="title"/>
+          </p:nvPr>
+        </p:nvSpPr>
+        <p:spPr/>
+        <p:txBody>
+          <a:bodyPr/>
+          <a:lstStyle/>
+          <a:p>
+            <a:r>
+              <a:rPr lang="en-US" dirty="0"/>
+              <a:t>Results: What is the LAI response to soil N?</a:t>
+            </a:r>
+          </a:p>
+        </p:txBody>
+      </p:sp>
+      <p:sp>
+        <p:nvSpPr>
+          <p:cNvPr id="8" name="TextBox 7">
+            <a:extLst>
+              <a:ext uri="{FF2B5EF4-FFF2-40B4-BE49-F238E27FC236}">
+                <a16:creationId xmlns:a16="http://schemas.microsoft.com/office/drawing/2014/main" id="{A96BE0C8-3669-C642-8520-F583FEBC9A72}"/>
+              </a:ext>
+            </a:extLst>
+          </p:cNvPr>
+          <p:cNvSpPr txBox="1"/>
+          <p:nvPr/>
+        </p:nvSpPr>
+        <p:spPr>
+          <a:xfrm>
+            <a:off x="6521459" y="3126524"/>
+            <a:ext cx="5670541" cy="646331"/>
+          </a:xfrm>
+          <a:prstGeom prst="rect">
+            <a:avLst/>
+          </a:prstGeom>
+          <a:noFill/>
+        </p:spPr>
+        <p:txBody>
+          <a:bodyPr wrap="square" rtlCol="0">
+            <a:spAutoFit/>
+          </a:bodyPr>
+          <a:lstStyle/>
+          <a:p>
+            <a:r>
+              <a:rPr lang="en-US" sz="3600" dirty="0"/>
+              <a:t>43% increase in LAI (P &lt; 0.01)</a:t>
+            </a:r>
+          </a:p>
+        </p:txBody>
+      </p:sp>
+      <p:sp>
+        <p:nvSpPr>
+          <p:cNvPr id="3" name="TextBox 2">
+            <a:extLst>
+              <a:ext uri="{FF2B5EF4-FFF2-40B4-BE49-F238E27FC236}">
+                <a16:creationId xmlns:a16="http://schemas.microsoft.com/office/drawing/2014/main" id="{FD6884CC-0A81-2748-BEC9-B4A8A76F0A51}"/>
+              </a:ext>
+            </a:extLst>
+          </p:cNvPr>
+          <p:cNvSpPr txBox="1"/>
+          <p:nvPr/>
+        </p:nvSpPr>
+        <p:spPr>
+          <a:xfrm>
+            <a:off x="7315200" y="4141822"/>
+            <a:ext cx="4492488" cy="954107"/>
+          </a:xfrm>
+          <a:prstGeom prst="rect">
+            <a:avLst/>
+          </a:prstGeom>
+          <a:noFill/>
+        </p:spPr>
+        <p:txBody>
+          <a:bodyPr wrap="square" rtlCol="0">
+            <a:spAutoFit/>
+          </a:bodyPr>
+          <a:lstStyle/>
+          <a:p>
+            <a:r>
+              <a:rPr lang="en-US" sz="2800" dirty="0">
+                <a:solidFill>
+                  <a:srgbClr val="FF0000"/>
+                </a:solidFill>
+              </a:rPr>
+              <a:t>More N going to leaf quantity than quality</a:t>
+            </a:r>
+          </a:p>
+        </p:txBody>
+      </p:sp>
+      <p:pic>
+        <p:nvPicPr>
+          <p:cNvPr id="6" name="Picture 5">
+            <a:extLst>
+              <a:ext uri="{FF2B5EF4-FFF2-40B4-BE49-F238E27FC236}">
+                <a16:creationId xmlns:a16="http://schemas.microsoft.com/office/drawing/2014/main" id="{ADADE2BF-7A39-7941-860F-6F97AC532DD6}"/>
+              </a:ext>
+            </a:extLst>
+          </p:cNvPr>
+          <p:cNvPicPr>
+            <a:picLocks noChangeAspect="1"/>
+          </p:cNvPicPr>
+          <p:nvPr/>
+        </p:nvPicPr>
+        <p:blipFill>
+          <a:blip r:embed="rId2"/>
+          <a:stretch>
+            <a:fillRect/>
+          </a:stretch>
+        </p:blipFill>
+        <p:spPr>
+          <a:xfrm>
+            <a:off x="1263659" y="1484034"/>
+            <a:ext cx="4832341" cy="5315575"/>
+          </a:xfrm>
+          <a:prstGeom prst="rect">
+            <a:avLst/>
+          </a:prstGeom>
+        </p:spPr>
+      </p:pic>
+    </p:spTree>
+    <p:extLst>
+      <p:ext uri="{BB962C8B-B14F-4D97-AF65-F5344CB8AC3E}">
+        <p14:creationId xmlns:p14="http://schemas.microsoft.com/office/powerpoint/2010/main" val="1796116623"/>
       </p:ext>
     </p:extLst>
   </p:cSld>
@@ -4984,6 +5070,448 @@
     <p:extLst>
       <p:ext uri="{BB962C8B-B14F-4D97-AF65-F5344CB8AC3E}">
         <p14:creationId xmlns:p14="http://schemas.microsoft.com/office/powerpoint/2010/main" val="1008993485"/>
+      </p:ext>
+    </p:extLst>
+  </p:cSld>
+  <p:clrMapOvr>
+    <a:masterClrMapping/>
+  </p:clrMapOvr>
+</p:sld>
+</file>
+
+<file path=ppt/slides/slide20.xml><?xml version="1.0" encoding="utf-8"?>
+<p:sld xmlns:a="http://schemas.openxmlformats.org/drawingml/2006/main" xmlns:r="http://schemas.openxmlformats.org/officeDocument/2006/relationships" xmlns:p="http://schemas.openxmlformats.org/presentationml/2006/main">
+  <p:cSld>
+    <p:spTree>
+      <p:nvGrpSpPr>
+        <p:cNvPr id="1" name=""/>
+        <p:cNvGrpSpPr/>
+        <p:nvPr/>
+      </p:nvGrpSpPr>
+      <p:grpSpPr>
+        <a:xfrm>
+          <a:off x="0" y="0"/>
+          <a:ext cx="0" cy="0"/>
+          <a:chOff x="0" y="0"/>
+          <a:chExt cx="0" cy="0"/>
+        </a:xfrm>
+      </p:grpSpPr>
+      <p:sp>
+        <p:nvSpPr>
+          <p:cNvPr id="2" name="Title 1">
+            <a:extLst>
+              <a:ext uri="{FF2B5EF4-FFF2-40B4-BE49-F238E27FC236}">
+                <a16:creationId xmlns:a16="http://schemas.microsoft.com/office/drawing/2014/main" id="{76EFAC51-0A4F-D64F-90F2-DABC34E0269E}"/>
+              </a:ext>
+            </a:extLst>
+          </p:cNvPr>
+          <p:cNvSpPr>
+            <a:spLocks noGrp="1"/>
+          </p:cNvSpPr>
+          <p:nvPr>
+            <p:ph type="title"/>
+          </p:nvPr>
+        </p:nvSpPr>
+        <p:spPr/>
+        <p:txBody>
+          <a:bodyPr/>
+          <a:lstStyle/>
+          <a:p>
+            <a:r>
+              <a:rPr lang="en-US" dirty="0"/>
+              <a:t>Results: Does the impact of soil N on leaf </a:t>
+            </a:r>
+            <a:r>
+              <a:rPr lang="en-US" dirty="0" err="1"/>
+              <a:t>N</a:t>
+            </a:r>
+            <a:r>
+              <a:rPr lang="en-US" baseline="-25000" dirty="0" err="1"/>
+              <a:t>area</a:t>
+            </a:r>
+            <a:r>
+              <a:rPr lang="en-US" dirty="0"/>
+              <a:t> vary with leaf N demand?</a:t>
+            </a:r>
+          </a:p>
+        </p:txBody>
+      </p:sp>
+      <p:pic>
+        <p:nvPicPr>
+          <p:cNvPr id="3" name="Picture 2">
+            <a:extLst>
+              <a:ext uri="{FF2B5EF4-FFF2-40B4-BE49-F238E27FC236}">
+                <a16:creationId xmlns:a16="http://schemas.microsoft.com/office/drawing/2014/main" id="{C1C38879-7208-5D48-82D5-543072CEAA2B}"/>
+              </a:ext>
+            </a:extLst>
+          </p:cNvPr>
+          <p:cNvPicPr>
+            <a:picLocks noChangeAspect="1"/>
+          </p:cNvPicPr>
+          <p:nvPr/>
+        </p:nvPicPr>
+        <p:blipFill>
+          <a:blip r:embed="rId2"/>
+          <a:stretch>
+            <a:fillRect/>
+          </a:stretch>
+        </p:blipFill>
+        <p:spPr>
+          <a:xfrm>
+            <a:off x="1834481" y="1690688"/>
+            <a:ext cx="4261519" cy="4971772"/>
+          </a:xfrm>
+          <a:prstGeom prst="rect">
+            <a:avLst/>
+          </a:prstGeom>
+        </p:spPr>
+      </p:pic>
+      <p:sp>
+        <p:nvSpPr>
+          <p:cNvPr id="4" name="TextBox 3">
+            <a:extLst>
+              <a:ext uri="{FF2B5EF4-FFF2-40B4-BE49-F238E27FC236}">
+                <a16:creationId xmlns:a16="http://schemas.microsoft.com/office/drawing/2014/main" id="{BE554A7E-DC9E-EE41-8FE8-E5C35222F645}"/>
+              </a:ext>
+            </a:extLst>
+          </p:cNvPr>
+          <p:cNvSpPr txBox="1"/>
+          <p:nvPr/>
+        </p:nvSpPr>
+        <p:spPr>
+          <a:xfrm>
+            <a:off x="6480313" y="3246783"/>
+            <a:ext cx="5711687" cy="1815882"/>
+          </a:xfrm>
+          <a:prstGeom prst="rect">
+            <a:avLst/>
+          </a:prstGeom>
+          <a:noFill/>
+        </p:spPr>
+        <p:txBody>
+          <a:bodyPr wrap="square" rtlCol="0">
+            <a:spAutoFit/>
+          </a:bodyPr>
+          <a:lstStyle/>
+          <a:p>
+            <a:r>
+              <a:rPr lang="en-US" sz="2800" dirty="0"/>
+              <a:t>The change in leaf </a:t>
+            </a:r>
+            <a:r>
+              <a:rPr lang="en-US" sz="2800" dirty="0" err="1"/>
+              <a:t>Narea</a:t>
+            </a:r>
+            <a:r>
+              <a:rPr lang="en-US" sz="2800" dirty="0"/>
+              <a:t> should be greater in places where the LAI (or plant N demand) doesn’t change much</a:t>
+            </a:r>
+          </a:p>
+        </p:txBody>
+      </p:sp>
+    </p:spTree>
+    <p:extLst>
+      <p:ext uri="{BB962C8B-B14F-4D97-AF65-F5344CB8AC3E}">
+        <p14:creationId xmlns:p14="http://schemas.microsoft.com/office/powerpoint/2010/main" val="2227413631"/>
+      </p:ext>
+    </p:extLst>
+  </p:cSld>
+  <p:clrMapOvr>
+    <a:masterClrMapping/>
+  </p:clrMapOvr>
+</p:sld>
+</file>
+
+<file path=ppt/slides/slide21.xml><?xml version="1.0" encoding="utf-8"?>
+<p:sld xmlns:a="http://schemas.openxmlformats.org/drawingml/2006/main" xmlns:r="http://schemas.openxmlformats.org/officeDocument/2006/relationships" xmlns:p="http://schemas.openxmlformats.org/presentationml/2006/main">
+  <p:cSld>
+    <p:spTree>
+      <p:nvGrpSpPr>
+        <p:cNvPr id="1" name=""/>
+        <p:cNvGrpSpPr/>
+        <p:nvPr/>
+      </p:nvGrpSpPr>
+      <p:grpSpPr>
+        <a:xfrm>
+          <a:off x="0" y="0"/>
+          <a:ext cx="0" cy="0"/>
+          <a:chOff x="0" y="0"/>
+          <a:chExt cx="0" cy="0"/>
+        </a:xfrm>
+      </p:grpSpPr>
+      <p:sp>
+        <p:nvSpPr>
+          <p:cNvPr id="2" name="Title 1">
+            <a:extLst>
+              <a:ext uri="{FF2B5EF4-FFF2-40B4-BE49-F238E27FC236}">
+                <a16:creationId xmlns:a16="http://schemas.microsoft.com/office/drawing/2014/main" id="{76EFAC51-0A4F-D64F-90F2-DABC34E0269E}"/>
+              </a:ext>
+            </a:extLst>
+          </p:cNvPr>
+          <p:cNvSpPr>
+            <a:spLocks noGrp="1"/>
+          </p:cNvSpPr>
+          <p:nvPr>
+            <p:ph type="title"/>
+          </p:nvPr>
+        </p:nvSpPr>
+        <p:spPr/>
+        <p:txBody>
+          <a:bodyPr/>
+          <a:lstStyle/>
+          <a:p>
+            <a:r>
+              <a:rPr lang="en-US" dirty="0"/>
+              <a:t>Results: Does the impact of soil N on leaf </a:t>
+            </a:r>
+            <a:r>
+              <a:rPr lang="en-US" dirty="0" err="1"/>
+              <a:t>N</a:t>
+            </a:r>
+            <a:r>
+              <a:rPr lang="en-US" baseline="-25000" dirty="0" err="1"/>
+              <a:t>area</a:t>
+            </a:r>
+            <a:r>
+              <a:rPr lang="en-US" dirty="0"/>
+              <a:t> vary with leaf N demand?</a:t>
+            </a:r>
+          </a:p>
+        </p:txBody>
+      </p:sp>
+      <p:sp>
+        <p:nvSpPr>
+          <p:cNvPr id="5" name="TextBox 4">
+            <a:extLst>
+              <a:ext uri="{FF2B5EF4-FFF2-40B4-BE49-F238E27FC236}">
+                <a16:creationId xmlns:a16="http://schemas.microsoft.com/office/drawing/2014/main" id="{8466811F-273C-C148-8A43-338B92995442}"/>
+              </a:ext>
+            </a:extLst>
+          </p:cNvPr>
+          <p:cNvSpPr txBox="1"/>
+          <p:nvPr/>
+        </p:nvSpPr>
+        <p:spPr>
+          <a:xfrm>
+            <a:off x="1514900" y="3166281"/>
+            <a:ext cx="9485195" cy="2123658"/>
+          </a:xfrm>
+          <a:prstGeom prst="rect">
+            <a:avLst/>
+          </a:prstGeom>
+          <a:noFill/>
+        </p:spPr>
+        <p:txBody>
+          <a:bodyPr wrap="square" rtlCol="0">
+            <a:spAutoFit/>
+          </a:bodyPr>
+          <a:lstStyle/>
+          <a:p>
+            <a:r>
+              <a:rPr lang="en-US" sz="4400" dirty="0">
+                <a:solidFill>
+                  <a:srgbClr val="FF0000"/>
+                </a:solidFill>
+              </a:rPr>
+              <a:t>If plants use added N to build new leaves, you would expect less stimulation of leaf </a:t>
+            </a:r>
+            <a:r>
+              <a:rPr lang="en-US" sz="4400" dirty="0" err="1">
+                <a:solidFill>
+                  <a:srgbClr val="FF0000"/>
+                </a:solidFill>
+              </a:rPr>
+              <a:t>N</a:t>
+            </a:r>
+            <a:r>
+              <a:rPr lang="en-US" sz="4400" baseline="-25000" dirty="0" err="1">
+                <a:solidFill>
+                  <a:srgbClr val="FF0000"/>
+                </a:solidFill>
+              </a:rPr>
+              <a:t>area</a:t>
+            </a:r>
+            <a:endParaRPr lang="en-US" sz="4400" baseline="-25000" dirty="0">
+              <a:solidFill>
+                <a:srgbClr val="FF0000"/>
+              </a:solidFill>
+            </a:endParaRPr>
+          </a:p>
+        </p:txBody>
+      </p:sp>
+    </p:spTree>
+    <p:extLst>
+      <p:ext uri="{BB962C8B-B14F-4D97-AF65-F5344CB8AC3E}">
+        <p14:creationId xmlns:p14="http://schemas.microsoft.com/office/powerpoint/2010/main" val="71517057"/>
+      </p:ext>
+    </p:extLst>
+  </p:cSld>
+  <p:clrMapOvr>
+    <a:masterClrMapping/>
+  </p:clrMapOvr>
+</p:sld>
+</file>
+
+<file path=ppt/slides/slide22.xml><?xml version="1.0" encoding="utf-8"?>
+<p:sld xmlns:a="http://schemas.openxmlformats.org/drawingml/2006/main" xmlns:r="http://schemas.openxmlformats.org/officeDocument/2006/relationships" xmlns:p="http://schemas.openxmlformats.org/presentationml/2006/main">
+  <p:cSld>
+    <p:spTree>
+      <p:nvGrpSpPr>
+        <p:cNvPr id="1" name=""/>
+        <p:cNvGrpSpPr/>
+        <p:nvPr/>
+      </p:nvGrpSpPr>
+      <p:grpSpPr>
+        <a:xfrm>
+          <a:off x="0" y="0"/>
+          <a:ext cx="0" cy="0"/>
+          <a:chOff x="0" y="0"/>
+          <a:chExt cx="0" cy="0"/>
+        </a:xfrm>
+      </p:grpSpPr>
+      <p:sp>
+        <p:nvSpPr>
+          <p:cNvPr id="2" name="Title 1">
+            <a:extLst>
+              <a:ext uri="{FF2B5EF4-FFF2-40B4-BE49-F238E27FC236}">
+                <a16:creationId xmlns:a16="http://schemas.microsoft.com/office/drawing/2014/main" id="{76EFAC51-0A4F-D64F-90F2-DABC34E0269E}"/>
+              </a:ext>
+            </a:extLst>
+          </p:cNvPr>
+          <p:cNvSpPr>
+            <a:spLocks noGrp="1"/>
+          </p:cNvSpPr>
+          <p:nvPr>
+            <p:ph type="title"/>
+          </p:nvPr>
+        </p:nvSpPr>
+        <p:spPr/>
+        <p:txBody>
+          <a:bodyPr/>
+          <a:lstStyle/>
+          <a:p>
+            <a:r>
+              <a:rPr lang="en-US" dirty="0"/>
+              <a:t>Results: Does the impact of soil N on leaf </a:t>
+            </a:r>
+            <a:r>
+              <a:rPr lang="en-US" dirty="0" err="1"/>
+              <a:t>N</a:t>
+            </a:r>
+            <a:r>
+              <a:rPr lang="en-US" baseline="-25000" dirty="0" err="1"/>
+              <a:t>area</a:t>
+            </a:r>
+            <a:r>
+              <a:rPr lang="en-US" dirty="0"/>
+              <a:t> vary with leaf N demand?</a:t>
+            </a:r>
+          </a:p>
+        </p:txBody>
+      </p:sp>
+      <p:sp>
+        <p:nvSpPr>
+          <p:cNvPr id="7" name="TextBox 6">
+            <a:extLst>
+              <a:ext uri="{FF2B5EF4-FFF2-40B4-BE49-F238E27FC236}">
+                <a16:creationId xmlns:a16="http://schemas.microsoft.com/office/drawing/2014/main" id="{F26C02DA-77F8-AA48-9E86-7C55E4612A19}"/>
+              </a:ext>
+            </a:extLst>
+          </p:cNvPr>
+          <p:cNvSpPr txBox="1"/>
+          <p:nvPr/>
+        </p:nvSpPr>
+        <p:spPr>
+          <a:xfrm>
+            <a:off x="7487478" y="3180522"/>
+            <a:ext cx="1914307" cy="646331"/>
+          </a:xfrm>
+          <a:prstGeom prst="rect">
+            <a:avLst/>
+          </a:prstGeom>
+          <a:noFill/>
+        </p:spPr>
+        <p:txBody>
+          <a:bodyPr wrap="none" rtlCol="0">
+            <a:spAutoFit/>
+          </a:bodyPr>
+          <a:lstStyle/>
+          <a:p>
+            <a:r>
+              <a:rPr lang="en-US" sz="3600" dirty="0">
+                <a:solidFill>
+                  <a:srgbClr val="FF0000"/>
+                </a:solidFill>
+              </a:rPr>
+              <a:t>P = 0.059</a:t>
+            </a:r>
+          </a:p>
+        </p:txBody>
+      </p:sp>
+      <p:pic>
+        <p:nvPicPr>
+          <p:cNvPr id="8" name="Picture 7">
+            <a:extLst>
+              <a:ext uri="{FF2B5EF4-FFF2-40B4-BE49-F238E27FC236}">
+                <a16:creationId xmlns:a16="http://schemas.microsoft.com/office/drawing/2014/main" id="{14CCF82C-93EA-F945-90BF-8537B8598C7B}"/>
+              </a:ext>
+            </a:extLst>
+          </p:cNvPr>
+          <p:cNvPicPr>
+            <a:picLocks noChangeAspect="1"/>
+          </p:cNvPicPr>
+          <p:nvPr/>
+        </p:nvPicPr>
+        <p:blipFill>
+          <a:blip r:embed="rId2"/>
+          <a:stretch>
+            <a:fillRect/>
+          </a:stretch>
+        </p:blipFill>
+        <p:spPr>
+          <a:xfrm>
+            <a:off x="7487478" y="3869991"/>
+            <a:ext cx="4340087" cy="2893391"/>
+          </a:xfrm>
+          <a:prstGeom prst="rect">
+            <a:avLst/>
+          </a:prstGeom>
+        </p:spPr>
+      </p:pic>
+      <p:pic>
+        <p:nvPicPr>
+          <p:cNvPr id="10" name="Picture 9">
+            <a:extLst>
+              <a:ext uri="{FF2B5EF4-FFF2-40B4-BE49-F238E27FC236}">
+                <a16:creationId xmlns:a16="http://schemas.microsoft.com/office/drawing/2014/main" id="{8A3C2BD8-5066-5D44-937B-C5EEF321EEA4}"/>
+              </a:ext>
+            </a:extLst>
+          </p:cNvPr>
+          <p:cNvPicPr>
+            <a:picLocks noChangeAspect="1"/>
+          </p:cNvPicPr>
+          <p:nvPr/>
+        </p:nvPicPr>
+        <p:blipFill>
+          <a:blip r:embed="rId3"/>
+          <a:stretch>
+            <a:fillRect/>
+          </a:stretch>
+        </p:blipFill>
+        <p:spPr>
+          <a:xfrm>
+            <a:off x="1895767" y="1828800"/>
+            <a:ext cx="4368094" cy="4914106"/>
+          </a:xfrm>
+          <a:prstGeom prst="rect">
+            <a:avLst/>
+          </a:prstGeom>
+        </p:spPr>
+      </p:pic>
+    </p:spTree>
+    <p:extLst>
+      <p:ext uri="{BB962C8B-B14F-4D97-AF65-F5344CB8AC3E}">
+        <p14:creationId xmlns:p14="http://schemas.microsoft.com/office/powerpoint/2010/main" val="3335065008"/>
       </p:ext>
     </p:extLst>
   </p:cSld>
@@ -5195,7 +5723,7 @@
           <a:p>
             <a:r>
               <a:rPr lang="en-US" sz="3600" dirty="0"/>
-              <a:t>Dong et al. (2017): it’s mainly climate and evolution (LMA, </a:t>
+              <a:t>Dong et al. (2017): it’s mainly climate and adaptation (LMA, </a:t>
             </a:r>
             <a:r>
               <a:rPr lang="en-US" sz="3600" dirty="0" err="1"/>
@@ -5273,6 +5801,141 @@
           <p:cNvPr id="2" name="Title 1">
             <a:extLst>
               <a:ext uri="{FF2B5EF4-FFF2-40B4-BE49-F238E27FC236}">
+                <a16:creationId xmlns:a16="http://schemas.microsoft.com/office/drawing/2014/main" id="{69BBCF26-AB7E-7E4A-9555-3A6B54058A1F}"/>
+              </a:ext>
+            </a:extLst>
+          </p:cNvPr>
+          <p:cNvSpPr>
+            <a:spLocks noGrp="1"/>
+          </p:cNvSpPr>
+          <p:nvPr>
+            <p:ph type="title"/>
+          </p:nvPr>
+        </p:nvSpPr>
+        <p:spPr/>
+        <p:txBody>
+          <a:bodyPr/>
+          <a:lstStyle/>
+          <a:p>
+            <a:r>
+              <a:rPr lang="en-US" dirty="0"/>
+              <a:t>Rationale CTD</a:t>
+            </a:r>
+          </a:p>
+        </p:txBody>
+      </p:sp>
+      <p:sp>
+        <p:nvSpPr>
+          <p:cNvPr id="3" name="Content Placeholder 2">
+            <a:extLst>
+              <a:ext uri="{FF2B5EF4-FFF2-40B4-BE49-F238E27FC236}">
+                <a16:creationId xmlns:a16="http://schemas.microsoft.com/office/drawing/2014/main" id="{F4772B5A-E177-9F45-BF12-FD3085F921B0}"/>
+              </a:ext>
+            </a:extLst>
+          </p:cNvPr>
+          <p:cNvSpPr>
+            <a:spLocks noGrp="1"/>
+          </p:cNvSpPr>
+          <p:nvPr>
+            <p:ph idx="1"/>
+          </p:nvPr>
+        </p:nvSpPr>
+        <p:spPr>
+          <a:xfrm>
+            <a:off x="838200" y="1825625"/>
+            <a:ext cx="4065273" cy="4351338"/>
+          </a:xfrm>
+        </p:spPr>
+        <p:txBody>
+          <a:bodyPr>
+            <a:normAutofit/>
+          </a:bodyPr>
+          <a:lstStyle/>
+          <a:p>
+            <a:r>
+              <a:rPr lang="en-US" sz="3600" dirty="0" err="1"/>
+              <a:t>Firn</a:t>
+            </a:r>
+            <a:r>
+              <a:rPr lang="en-US" sz="3600" dirty="0"/>
+              <a:t> et al. (2019) </a:t>
+            </a:r>
+            <a:r>
+              <a:rPr lang="en-US" sz="3600" dirty="0" err="1"/>
+              <a:t>kinda</a:t>
+            </a:r>
+            <a:r>
+              <a:rPr lang="en-US" sz="3600" dirty="0"/>
+              <a:t> showed that too!</a:t>
+            </a:r>
+          </a:p>
+        </p:txBody>
+      </p:sp>
+      <p:pic>
+        <p:nvPicPr>
+          <p:cNvPr id="5" name="Picture 4">
+            <a:extLst>
+              <a:ext uri="{FF2B5EF4-FFF2-40B4-BE49-F238E27FC236}">
+                <a16:creationId xmlns:a16="http://schemas.microsoft.com/office/drawing/2014/main" id="{71AB880A-4E5E-1A4E-89E2-621B5B963BC3}"/>
+              </a:ext>
+            </a:extLst>
+          </p:cNvPr>
+          <p:cNvPicPr>
+            <a:picLocks noChangeAspect="1"/>
+          </p:cNvPicPr>
+          <p:nvPr/>
+        </p:nvPicPr>
+        <p:blipFill>
+          <a:blip r:embed="rId2"/>
+          <a:stretch>
+            <a:fillRect/>
+          </a:stretch>
+        </p:blipFill>
+        <p:spPr>
+          <a:xfrm>
+            <a:off x="4903473" y="1027906"/>
+            <a:ext cx="7288527" cy="4971150"/>
+          </a:xfrm>
+          <a:prstGeom prst="rect">
+            <a:avLst/>
+          </a:prstGeom>
+        </p:spPr>
+      </p:pic>
+    </p:spTree>
+    <p:extLst>
+      <p:ext uri="{BB962C8B-B14F-4D97-AF65-F5344CB8AC3E}">
+        <p14:creationId xmlns:p14="http://schemas.microsoft.com/office/powerpoint/2010/main" val="3763093913"/>
+      </p:ext>
+    </p:extLst>
+  </p:cSld>
+  <p:clrMapOvr>
+    <a:masterClrMapping/>
+  </p:clrMapOvr>
+</p:sld>
+</file>
+
+<file path=ppt/slides/slide6.xml><?xml version="1.0" encoding="utf-8"?>
+<p:sld xmlns:a="http://schemas.openxmlformats.org/drawingml/2006/main" xmlns:r="http://schemas.openxmlformats.org/officeDocument/2006/relationships" xmlns:p="http://schemas.openxmlformats.org/presentationml/2006/main">
+  <p:cSld>
+    <p:spTree>
+      <p:nvGrpSpPr>
+        <p:cNvPr id="1" name=""/>
+        <p:cNvGrpSpPr/>
+        <p:nvPr/>
+      </p:nvGrpSpPr>
+      <p:grpSpPr>
+        <a:xfrm>
+          <a:off x="0" y="0"/>
+          <a:ext cx="0" cy="0"/>
+          <a:chOff x="0" y="0"/>
+          <a:chExt cx="0" cy="0"/>
+        </a:xfrm>
+      </p:grpSpPr>
+      <p:sp>
+        <p:nvSpPr>
+          <p:cNvPr id="2" name="Title 1">
+            <a:extLst>
+              <a:ext uri="{FF2B5EF4-FFF2-40B4-BE49-F238E27FC236}">
                 <a16:creationId xmlns:a16="http://schemas.microsoft.com/office/drawing/2014/main" id="{893E47EA-1331-F34C-A5E8-7674289862CA}"/>
               </a:ext>
             </a:extLst>
@@ -5319,31 +5982,33 @@
           </a:xfrm>
         </p:spPr>
         <p:txBody>
-          <a:bodyPr/>
-          <a:lstStyle/>
-          <a:p>
-            <a:r>
-              <a:rPr lang="en-US" dirty="0"/>
-              <a:t>Recent analyses suggest that soil N may modify the nutrient economy of leaves following predicts from photosynthetic least cost theory (</a:t>
-            </a:r>
-            <a:r>
-              <a:rPr lang="en-US" dirty="0" err="1"/>
+          <a:bodyPr>
+            <a:normAutofit/>
+          </a:bodyPr>
+          <a:lstStyle/>
+          <a:p>
+            <a:r>
+              <a:rPr lang="en-US" sz="3600" dirty="0"/>
+              <a:t>Recent analyses suggest that soil N may modify the nutrient economy of leaves (</a:t>
+            </a:r>
+            <a:r>
+              <a:rPr lang="en-US" sz="3600" dirty="0" err="1"/>
               <a:t>Paillassa</a:t>
             </a:r>
             <a:r>
-              <a:rPr lang="en-US" dirty="0"/>
+              <a:rPr lang="en-US" sz="3600" dirty="0"/>
               <a:t> et al., 2020)</a:t>
             </a:r>
           </a:p>
           <a:p>
             <a:pPr lvl="1"/>
             <a:r>
-              <a:rPr lang="en-US" dirty="0"/>
+              <a:rPr lang="en-US" sz="3200" dirty="0"/>
               <a:t>This depends on the ratio of soil N demand and soil N availability</a:t>
             </a:r>
           </a:p>
           <a:p>
-            <a:endParaRPr lang="en-US" dirty="0"/>
+            <a:endParaRPr lang="en-US" sz="3600" dirty="0"/>
           </a:p>
         </p:txBody>
       </p:sp>
@@ -5390,7 +6055,7 @@
 </p:sld>
 </file>
 
-<file path=ppt/slides/slide6.xml><?xml version="1.0" encoding="utf-8"?>
+<file path=ppt/slides/slide7.xml><?xml version="1.0" encoding="utf-8"?>
 <p:sld xmlns:a="http://schemas.openxmlformats.org/drawingml/2006/main" xmlns:r="http://schemas.openxmlformats.org/officeDocument/2006/relationships" xmlns:p="http://schemas.openxmlformats.org/presentationml/2006/main">
   <p:cSld>
     <p:spTree>
@@ -5462,26 +6127,29 @@
           <a:lstStyle/>
           <a:p>
             <a:r>
-              <a:rPr lang="en-US" dirty="0"/>
-              <a:t>Recent analyses suggest that soil N may modify the nutrient economy of leaves following predicts from photosynthetic least cost theory (</a:t>
-            </a:r>
-            <a:r>
-              <a:rPr lang="en-US" dirty="0" err="1"/>
+              <a:rPr lang="en-US" sz="3600" dirty="0"/>
+              <a:t>Recent analyses suggest that soil N may modify the nutrient economy of leaves (</a:t>
+            </a:r>
+            <a:r>
+              <a:rPr lang="en-US" sz="3600" dirty="0" err="1"/>
               <a:t>Paillassa</a:t>
             </a:r>
             <a:r>
-              <a:rPr lang="en-US" dirty="0"/>
+              <a:rPr lang="en-US" sz="3600" dirty="0"/>
               <a:t> et al., 2020)</a:t>
             </a:r>
           </a:p>
           <a:p>
             <a:pPr lvl="1"/>
             <a:r>
-              <a:rPr lang="en-US" dirty="0"/>
+              <a:rPr lang="en-US" sz="3200" dirty="0"/>
               <a:t>This depends on the ratio of soil N demand and soil N availability</a:t>
             </a:r>
           </a:p>
           <a:p>
+            <a:pPr marL="0" indent="0">
+              <a:buNone/>
+            </a:pPr>
             <a:endParaRPr lang="en-US" dirty="0"/>
           </a:p>
         </p:txBody>
@@ -5529,132 +6197,6 @@
 </p:sld>
 </file>
 
-<file path=ppt/slides/slide7.xml><?xml version="1.0" encoding="utf-8"?>
-<p:sld xmlns:a="http://schemas.openxmlformats.org/drawingml/2006/main" xmlns:r="http://schemas.openxmlformats.org/officeDocument/2006/relationships" xmlns:p="http://schemas.openxmlformats.org/presentationml/2006/main">
-  <p:cSld>
-    <p:spTree>
-      <p:nvGrpSpPr>
-        <p:cNvPr id="1" name=""/>
-        <p:cNvGrpSpPr/>
-        <p:nvPr/>
-      </p:nvGrpSpPr>
-      <p:grpSpPr>
-        <a:xfrm>
-          <a:off x="0" y="0"/>
-          <a:ext cx="0" cy="0"/>
-          <a:chOff x="0" y="0"/>
-          <a:chExt cx="0" cy="0"/>
-        </a:xfrm>
-      </p:grpSpPr>
-      <p:sp>
-        <p:nvSpPr>
-          <p:cNvPr id="2" name="Title 1">
-            <a:extLst>
-              <a:ext uri="{FF2B5EF4-FFF2-40B4-BE49-F238E27FC236}">
-                <a16:creationId xmlns:a16="http://schemas.microsoft.com/office/drawing/2014/main" id="{3EB5E329-C0E7-6747-BEC2-F01042090E12}"/>
-              </a:ext>
-            </a:extLst>
-          </p:cNvPr>
-          <p:cNvSpPr>
-            <a:spLocks noGrp="1"/>
-          </p:cNvSpPr>
-          <p:nvPr>
-            <p:ph type="title"/>
-          </p:nvPr>
-        </p:nvSpPr>
-        <p:spPr/>
-        <p:txBody>
-          <a:bodyPr/>
-          <a:lstStyle/>
-          <a:p>
-            <a:r>
-              <a:rPr lang="en-US" dirty="0"/>
-              <a:t>Specific aims</a:t>
-            </a:r>
-          </a:p>
-        </p:txBody>
-      </p:sp>
-      <p:sp>
-        <p:nvSpPr>
-          <p:cNvPr id="3" name="Content Placeholder 2">
-            <a:extLst>
-              <a:ext uri="{FF2B5EF4-FFF2-40B4-BE49-F238E27FC236}">
-                <a16:creationId xmlns:a16="http://schemas.microsoft.com/office/drawing/2014/main" id="{3A5EC47D-4600-724A-B34F-FFB1252EEEF3}"/>
-              </a:ext>
-            </a:extLst>
-          </p:cNvPr>
-          <p:cNvSpPr>
-            <a:spLocks noGrp="1"/>
-          </p:cNvSpPr>
-          <p:nvPr>
-            <p:ph idx="1"/>
-          </p:nvPr>
-        </p:nvSpPr>
-        <p:spPr/>
-        <p:txBody>
-          <a:bodyPr>
-            <a:normAutofit/>
-          </a:bodyPr>
-          <a:lstStyle/>
-          <a:p>
-            <a:pPr marL="514350" indent="-514350">
-              <a:buFont typeface="+mj-lt"/>
-              <a:buAutoNum type="arabicPeriod"/>
-            </a:pPr>
-            <a:r>
-              <a:rPr lang="en-US" sz="4000" dirty="0"/>
-              <a:t>Quantify the impact of soil N on leaf </a:t>
-            </a:r>
-            <a:r>
-              <a:rPr lang="en-US" sz="4000" dirty="0" err="1"/>
-              <a:t>N</a:t>
-            </a:r>
-            <a:r>
-              <a:rPr lang="en-US" sz="4000" baseline="-25000" dirty="0" err="1"/>
-              <a:t>area</a:t>
-            </a:r>
-            <a:endParaRPr lang="en-US" sz="4000" baseline="-25000" dirty="0"/>
-          </a:p>
-          <a:p>
-            <a:pPr marL="514350" indent="-514350">
-              <a:buFont typeface="+mj-lt"/>
-              <a:buAutoNum type="arabicPeriod"/>
-            </a:pPr>
-            <a:r>
-              <a:rPr lang="en-US" sz="4000" dirty="0"/>
-              <a:t>Separate soil N drivers from climate drivers</a:t>
-            </a:r>
-          </a:p>
-          <a:p>
-            <a:pPr marL="514350" indent="-514350">
-              <a:buFont typeface="+mj-lt"/>
-              <a:buAutoNum type="arabicPeriod"/>
-            </a:pPr>
-            <a:r>
-              <a:rPr lang="en-US" sz="4000" dirty="0"/>
-              <a:t>Separate the impacts of N demand and N availability on leaf </a:t>
-            </a:r>
-            <a:r>
-              <a:rPr lang="en-US" sz="4000" dirty="0" err="1"/>
-              <a:t>Narea</a:t>
-            </a:r>
-            <a:endParaRPr lang="en-US" sz="4000" dirty="0"/>
-          </a:p>
-        </p:txBody>
-      </p:sp>
-    </p:spTree>
-    <p:extLst>
-      <p:ext uri="{BB962C8B-B14F-4D97-AF65-F5344CB8AC3E}">
-        <p14:creationId xmlns:p14="http://schemas.microsoft.com/office/powerpoint/2010/main" val="3849155709"/>
-      </p:ext>
-    </p:extLst>
-  </p:cSld>
-  <p:clrMapOvr>
-    <a:masterClrMapping/>
-  </p:clrMapOvr>
-</p:sld>
-</file>
-
 <file path=ppt/slides/slide8.xml><?xml version="1.0" encoding="utf-8"?>
 <p:sld xmlns:a="http://schemas.openxmlformats.org/drawingml/2006/main" xmlns:r="http://schemas.openxmlformats.org/officeDocument/2006/relationships" xmlns:p="http://schemas.openxmlformats.org/presentationml/2006/main">
   <p:cSld>
@@ -5677,7 +6219,7 @@
           <p:cNvPr id="2" name="Title 1">
             <a:extLst>
               <a:ext uri="{FF2B5EF4-FFF2-40B4-BE49-F238E27FC236}">
-                <a16:creationId xmlns:a16="http://schemas.microsoft.com/office/drawing/2014/main" id="{A8490E94-815F-4145-A6D0-23D88597D1DD}"/>
+                <a16:creationId xmlns:a16="http://schemas.microsoft.com/office/drawing/2014/main" id="{3EB5E329-C0E7-6747-BEC2-F01042090E12}"/>
               </a:ext>
             </a:extLst>
           </p:cNvPr>
@@ -5695,7 +6237,7 @@
           <a:p>
             <a:r>
               <a:rPr lang="en-US" dirty="0"/>
-              <a:t>Primary questions</a:t>
+              <a:t>Specific aims</a:t>
             </a:r>
           </a:p>
         </p:txBody>
@@ -5705,7 +6247,7 @@
           <p:cNvPr id="3" name="Content Placeholder 2">
             <a:extLst>
               <a:ext uri="{FF2B5EF4-FFF2-40B4-BE49-F238E27FC236}">
-                <a16:creationId xmlns:a16="http://schemas.microsoft.com/office/drawing/2014/main" id="{0CCEA704-D202-0A4B-AFB3-EC87600E32BA}"/>
+                <a16:creationId xmlns:a16="http://schemas.microsoft.com/office/drawing/2014/main" id="{3A5EC47D-4600-724A-B34F-FFB1252EEEF3}"/>
               </a:ext>
             </a:extLst>
           </p:cNvPr>
@@ -5718,70 +6260,60 @@
         </p:nvSpPr>
         <p:spPr/>
         <p:txBody>
-          <a:bodyPr/>
-          <a:lstStyle/>
-          <a:p>
-            <a:r>
-              <a:rPr lang="en-US" dirty="0"/>
-              <a:t>Does soil N impact leaf </a:t>
-            </a:r>
-            <a:r>
-              <a:rPr lang="en-US" dirty="0" err="1"/>
+          <a:bodyPr>
+            <a:normAutofit/>
+          </a:bodyPr>
+          <a:lstStyle/>
+          <a:p>
+            <a:pPr marL="514350" indent="-514350">
+              <a:buFont typeface="+mj-lt"/>
+              <a:buAutoNum type="arabicPeriod"/>
+            </a:pPr>
+            <a:r>
+              <a:rPr lang="en-US" sz="4000" dirty="0"/>
+              <a:t>Quantify the impact of soil N on leaf </a:t>
+            </a:r>
+            <a:r>
+              <a:rPr lang="en-US" sz="4000" dirty="0" err="1"/>
+              <a:t>N</a:t>
+            </a:r>
+            <a:r>
+              <a:rPr lang="en-US" sz="4000" baseline="-25000" dirty="0" err="1"/>
+              <a:t>area</a:t>
+            </a:r>
+            <a:endParaRPr lang="en-US" sz="4000" baseline="-25000" dirty="0"/>
+          </a:p>
+          <a:p>
+            <a:pPr marL="514350" indent="-514350">
+              <a:buFont typeface="+mj-lt"/>
+              <a:buAutoNum type="arabicPeriod"/>
+            </a:pPr>
+            <a:r>
+              <a:rPr lang="en-US" sz="4000" dirty="0"/>
+              <a:t>Separate soil N drivers from climate drivers</a:t>
+            </a:r>
+          </a:p>
+          <a:p>
+            <a:pPr marL="514350" indent="-514350">
+              <a:buFont typeface="+mj-lt"/>
+              <a:buAutoNum type="arabicPeriod"/>
+            </a:pPr>
+            <a:r>
+              <a:rPr lang="en-US" sz="4000" dirty="0"/>
+              <a:t>Separate the impacts of N demand and N availability on leaf </a:t>
+            </a:r>
+            <a:r>
+              <a:rPr lang="en-US" sz="4000" dirty="0" err="1"/>
               <a:t>Narea</a:t>
             </a:r>
-            <a:r>
-              <a:rPr lang="en-US" dirty="0"/>
-              <a:t>?</a:t>
-            </a:r>
-          </a:p>
-          <a:p>
-            <a:r>
-              <a:rPr lang="en-US" dirty="0"/>
-              <a:t>How does the impact of soil N on leaf </a:t>
-            </a:r>
-            <a:r>
-              <a:rPr lang="en-US" dirty="0" err="1"/>
-              <a:t>Narea</a:t>
-            </a:r>
-            <a:r>
-              <a:rPr lang="en-US" dirty="0"/>
-              <a:t> compare to other drivers, such as climate and LMA?</a:t>
-            </a:r>
-          </a:p>
-          <a:p>
-            <a:r>
-              <a:rPr lang="en-US" dirty="0"/>
-              <a:t>How does the leaf </a:t>
-            </a:r>
-            <a:r>
-              <a:rPr lang="en-US" dirty="0" err="1"/>
-              <a:t>Narea</a:t>
-            </a:r>
-            <a:r>
-              <a:rPr lang="en-US" dirty="0"/>
-              <a:t> response to soil N compare to the LAI response to soil N?</a:t>
-            </a:r>
-          </a:p>
-          <a:p>
-            <a:r>
-              <a:rPr lang="en-US" dirty="0"/>
-              <a:t>Does the impact of soil N on leaf </a:t>
-            </a:r>
-            <a:r>
-              <a:rPr lang="en-US" dirty="0" err="1"/>
-              <a:t>Narea</a:t>
-            </a:r>
-            <a:r>
-              <a:rPr lang="en-US" dirty="0"/>
-              <a:t> vary with leaf N demand, as indexed through the LAI response?</a:t>
-            </a:r>
+            <a:endParaRPr lang="en-US" sz="4000" dirty="0"/>
           </a:p>
         </p:txBody>
       </p:sp>
     </p:spTree>
     <p:extLst>
       <p:ext uri="{BB962C8B-B14F-4D97-AF65-F5344CB8AC3E}">
-        <p14:creationId xmlns:p14="http://schemas.microsoft.com/office/powerpoint/2010/main" val="3612388396"/>
+        <p14:creationId xmlns:p14="http://schemas.microsoft.com/office/powerpoint/2010/main" val="3849155709"/>
       </p:ext>
     </p:extLst>
   </p:cSld>
@@ -5813,7 +6345,7 @@
           <p:cNvPr id="2" name="Title 1">
             <a:extLst>
               <a:ext uri="{FF2B5EF4-FFF2-40B4-BE49-F238E27FC236}">
-                <a16:creationId xmlns:a16="http://schemas.microsoft.com/office/drawing/2014/main" id="{58F9A0B4-07D0-1040-86BB-F7CF5AF8F579}"/>
+                <a16:creationId xmlns:a16="http://schemas.microsoft.com/office/drawing/2014/main" id="{A8490E94-815F-4145-A6D0-23D88597D1DD}"/>
               </a:ext>
             </a:extLst>
           </p:cNvPr>
@@ -5831,70 +6363,93 @@
           <a:p>
             <a:r>
               <a:rPr lang="en-US" dirty="0"/>
-              <a:t>Nutrient Network (</a:t>
+              <a:t>Primary questions</a:t>
+            </a:r>
+          </a:p>
+        </p:txBody>
+      </p:sp>
+      <p:sp>
+        <p:nvSpPr>
+          <p:cNvPr id="3" name="Content Placeholder 2">
+            <a:extLst>
+              <a:ext uri="{FF2B5EF4-FFF2-40B4-BE49-F238E27FC236}">
+                <a16:creationId xmlns:a16="http://schemas.microsoft.com/office/drawing/2014/main" id="{0CCEA704-D202-0A4B-AFB3-EC87600E32BA}"/>
+              </a:ext>
+            </a:extLst>
+          </p:cNvPr>
+          <p:cNvSpPr>
+            <a:spLocks noGrp="1"/>
+          </p:cNvSpPr>
+          <p:nvPr>
+            <p:ph idx="1"/>
+          </p:nvPr>
+        </p:nvSpPr>
+        <p:spPr/>
+        <p:txBody>
+          <a:bodyPr/>
+          <a:lstStyle/>
+          <a:p>
+            <a:r>
+              <a:rPr lang="en-US" dirty="0"/>
+              <a:t>Does soil N impact leaf </a:t>
             </a:r>
             <a:r>
               <a:rPr lang="en-US" dirty="0" err="1"/>
-              <a:t>NutNet</a:t>
-            </a:r>
-            <a:r>
-              <a:rPr lang="en-US" dirty="0"/>
-              <a:t>)</a:t>
-            </a:r>
-          </a:p>
-        </p:txBody>
-      </p:sp>
-      <p:sp>
-        <p:nvSpPr>
-          <p:cNvPr id="3" name="Content Placeholder 2">
-            <a:extLst>
-              <a:ext uri="{FF2B5EF4-FFF2-40B4-BE49-F238E27FC236}">
-                <a16:creationId xmlns:a16="http://schemas.microsoft.com/office/drawing/2014/main" id="{3BB0E2D5-4110-DE45-9704-66371057784D}"/>
-              </a:ext>
-            </a:extLst>
-          </p:cNvPr>
-          <p:cNvSpPr>
-            <a:spLocks noGrp="1"/>
-          </p:cNvSpPr>
-          <p:nvPr>
-            <p:ph idx="1"/>
-          </p:nvPr>
-        </p:nvSpPr>
-        <p:spPr/>
-        <p:txBody>
-          <a:bodyPr/>
-          <a:lstStyle/>
-          <a:p>
-            <a:r>
-              <a:rPr lang="en-US" dirty="0"/>
-              <a:t>Globally distributed soil nutrient manipulation experiment</a:t>
-            </a:r>
-          </a:p>
-          <a:p>
-            <a:r>
-              <a:rPr lang="en-US" dirty="0"/>
-              <a:t>Fully factorial soil N x P x K addition experiment (10 g m-2 yr-1)</a:t>
-            </a:r>
-          </a:p>
-          <a:p>
-            <a:pPr lvl="1"/>
-            <a:r>
-              <a:rPr lang="en-US" dirty="0"/>
-              <a:t>At least 3 blocks per site</a:t>
-            </a:r>
-          </a:p>
-          <a:p>
-            <a:pPr marL="0" indent="0">
-              <a:buNone/>
-            </a:pPr>
-            <a:endParaRPr lang="en-US" dirty="0"/>
+              <a:t>Narea</a:t>
+            </a:r>
+            <a:r>
+              <a:rPr lang="en-US" dirty="0"/>
+              <a:t>?</a:t>
+            </a:r>
+          </a:p>
+          <a:p>
+            <a:r>
+              <a:rPr lang="en-US" dirty="0"/>
+              <a:t>How does the impact of soil N on leaf </a:t>
+            </a:r>
+            <a:r>
+              <a:rPr lang="en-US" dirty="0" err="1"/>
+              <a:t>Narea</a:t>
+            </a:r>
+            <a:r>
+              <a:rPr lang="en-US" dirty="0"/>
+              <a:t> compare to other drivers, such as climate and LMA?</a:t>
+            </a:r>
+          </a:p>
+          <a:p>
+            <a:r>
+              <a:rPr lang="en-US" dirty="0"/>
+              <a:t>How does the leaf </a:t>
+            </a:r>
+            <a:r>
+              <a:rPr lang="en-US" dirty="0" err="1"/>
+              <a:t>Narea</a:t>
+            </a:r>
+            <a:r>
+              <a:rPr lang="en-US" dirty="0"/>
+              <a:t> response to soil N compare to the LAI response to soil N?</a:t>
+            </a:r>
+          </a:p>
+          <a:p>
+            <a:r>
+              <a:rPr lang="en-US" dirty="0"/>
+              <a:t>Does the impact of soil N on leaf </a:t>
+            </a:r>
+            <a:r>
+              <a:rPr lang="en-US" dirty="0" err="1"/>
+              <a:t>Narea</a:t>
+            </a:r>
+            <a:r>
+              <a:rPr lang="en-US" dirty="0"/>
+              <a:t> vary with leaf N demand, as indexed through the LAI response?</a:t>
+            </a:r>
           </a:p>
         </p:txBody>
       </p:sp>
     </p:spTree>
     <p:extLst>
       <p:ext uri="{BB962C8B-B14F-4D97-AF65-F5344CB8AC3E}">
-        <p14:creationId xmlns:p14="http://schemas.microsoft.com/office/powerpoint/2010/main" val="2952722968"/>
+        <p14:creationId xmlns:p14="http://schemas.microsoft.com/office/powerpoint/2010/main" val="3612388396"/>
       </p:ext>
     </p:extLst>
   </p:cSld>

</xml_diff>

<commit_message>
revised presentation with new fig
</commit_message>
<xml_diff>
--- a/presentations/nutnet_narea.pptx
+++ b/presentations/nutnet_narea.pptx
@@ -280,7 +280,7 @@
           <a:p>
             <a:fld id="{F94908AF-C271-DA4B-A6E0-87D34B71DD19}" type="datetimeFigureOut">
               <a:rPr lang="en-US" smtClean="0"/>
-              <a:t>6/16/20</a:t>
+              <a:t>10/2/20</a:t>
             </a:fld>
             <a:endParaRPr lang="en-US"/>
           </a:p>
@@ -478,7 +478,7 @@
           <a:p>
             <a:fld id="{F94908AF-C271-DA4B-A6E0-87D34B71DD19}" type="datetimeFigureOut">
               <a:rPr lang="en-US" smtClean="0"/>
-              <a:t>6/16/20</a:t>
+              <a:t>10/2/20</a:t>
             </a:fld>
             <a:endParaRPr lang="en-US"/>
           </a:p>
@@ -686,7 +686,7 @@
           <a:p>
             <a:fld id="{F94908AF-C271-DA4B-A6E0-87D34B71DD19}" type="datetimeFigureOut">
               <a:rPr lang="en-US" smtClean="0"/>
-              <a:t>6/16/20</a:t>
+              <a:t>10/2/20</a:t>
             </a:fld>
             <a:endParaRPr lang="en-US"/>
           </a:p>
@@ -884,7 +884,7 @@
           <a:p>
             <a:fld id="{F94908AF-C271-DA4B-A6E0-87D34B71DD19}" type="datetimeFigureOut">
               <a:rPr lang="en-US" smtClean="0"/>
-              <a:t>6/16/20</a:t>
+              <a:t>10/2/20</a:t>
             </a:fld>
             <a:endParaRPr lang="en-US"/>
           </a:p>
@@ -1159,7 +1159,7 @@
           <a:p>
             <a:fld id="{F94908AF-C271-DA4B-A6E0-87D34B71DD19}" type="datetimeFigureOut">
               <a:rPr lang="en-US" smtClean="0"/>
-              <a:t>6/16/20</a:t>
+              <a:t>10/2/20</a:t>
             </a:fld>
             <a:endParaRPr lang="en-US"/>
           </a:p>
@@ -1424,7 +1424,7 @@
           <a:p>
             <a:fld id="{F94908AF-C271-DA4B-A6E0-87D34B71DD19}" type="datetimeFigureOut">
               <a:rPr lang="en-US" smtClean="0"/>
-              <a:t>6/16/20</a:t>
+              <a:t>10/2/20</a:t>
             </a:fld>
             <a:endParaRPr lang="en-US"/>
           </a:p>
@@ -1836,7 +1836,7 @@
           <a:p>
             <a:fld id="{F94908AF-C271-DA4B-A6E0-87D34B71DD19}" type="datetimeFigureOut">
               <a:rPr lang="en-US" smtClean="0"/>
-              <a:t>6/16/20</a:t>
+              <a:t>10/2/20</a:t>
             </a:fld>
             <a:endParaRPr lang="en-US"/>
           </a:p>
@@ -1977,7 +1977,7 @@
           <a:p>
             <a:fld id="{F94908AF-C271-DA4B-A6E0-87D34B71DD19}" type="datetimeFigureOut">
               <a:rPr lang="en-US" smtClean="0"/>
-              <a:t>6/16/20</a:t>
+              <a:t>10/2/20</a:t>
             </a:fld>
             <a:endParaRPr lang="en-US"/>
           </a:p>
@@ -2090,7 +2090,7 @@
           <a:p>
             <a:fld id="{F94908AF-C271-DA4B-A6E0-87D34B71DD19}" type="datetimeFigureOut">
               <a:rPr lang="en-US" smtClean="0"/>
-              <a:t>6/16/20</a:t>
+              <a:t>10/2/20</a:t>
             </a:fld>
             <a:endParaRPr lang="en-US"/>
           </a:p>
@@ -2401,7 +2401,7 @@
           <a:p>
             <a:fld id="{F94908AF-C271-DA4B-A6E0-87D34B71DD19}" type="datetimeFigureOut">
               <a:rPr lang="en-US" smtClean="0"/>
-              <a:t>6/16/20</a:t>
+              <a:t>10/2/20</a:t>
             </a:fld>
             <a:endParaRPr lang="en-US"/>
           </a:p>
@@ -2689,7 +2689,7 @@
           <a:p>
             <a:fld id="{F94908AF-C271-DA4B-A6E0-87D34B71DD19}" type="datetimeFigureOut">
               <a:rPr lang="en-US" smtClean="0"/>
-              <a:t>6/16/20</a:t>
+              <a:t>10/2/20</a:t>
             </a:fld>
             <a:endParaRPr lang="en-US"/>
           </a:p>
@@ -2930,7 +2930,7 @@
           <a:p>
             <a:fld id="{F94908AF-C271-DA4B-A6E0-87D34B71DD19}" type="datetimeFigureOut">
               <a:rPr lang="en-US" smtClean="0"/>
-              <a:t>6/16/20</a:t>
+              <a:t>10/2/20</a:t>
             </a:fld>
             <a:endParaRPr lang="en-US"/>
           </a:p>
@@ -5409,51 +5409,12 @@
           </a:p>
         </p:txBody>
       </p:sp>
-      <p:sp>
-        <p:nvSpPr>
-          <p:cNvPr id="7" name="TextBox 6">
-            <a:extLst>
-              <a:ext uri="{FF2B5EF4-FFF2-40B4-BE49-F238E27FC236}">
-                <a16:creationId xmlns:a16="http://schemas.microsoft.com/office/drawing/2014/main" id="{F26C02DA-77F8-AA48-9E86-7C55E4612A19}"/>
-              </a:ext>
-            </a:extLst>
-          </p:cNvPr>
-          <p:cNvSpPr txBox="1"/>
-          <p:nvPr/>
-        </p:nvSpPr>
-        <p:spPr>
-          <a:xfrm>
-            <a:off x="7487478" y="3180522"/>
-            <a:ext cx="1914307" cy="646331"/>
-          </a:xfrm>
-          <a:prstGeom prst="rect">
-            <a:avLst/>
-          </a:prstGeom>
-          <a:noFill/>
-        </p:spPr>
-        <p:txBody>
-          <a:bodyPr wrap="none" rtlCol="0">
-            <a:spAutoFit/>
-          </a:bodyPr>
-          <a:lstStyle/>
-          <a:p>
-            <a:r>
-              <a:rPr lang="en-US" sz="3600" dirty="0">
-                <a:solidFill>
-                  <a:srgbClr val="FF0000"/>
-                </a:solidFill>
-              </a:rPr>
-              <a:t>P = 0.059</a:t>
-            </a:r>
-          </a:p>
-        </p:txBody>
-      </p:sp>
       <p:pic>
         <p:nvPicPr>
-          <p:cNvPr id="8" name="Picture 7">
-            <a:extLst>
-              <a:ext uri="{FF2B5EF4-FFF2-40B4-BE49-F238E27FC236}">
-                <a16:creationId xmlns:a16="http://schemas.microsoft.com/office/drawing/2014/main" id="{14CCF82C-93EA-F945-90BF-8537B8598C7B}"/>
+          <p:cNvPr id="4" name="Picture 3">
+            <a:extLst>
+              <a:ext uri="{FF2B5EF4-FFF2-40B4-BE49-F238E27FC236}">
+                <a16:creationId xmlns:a16="http://schemas.microsoft.com/office/drawing/2014/main" id="{8EB2CB3F-D8C9-4146-AE3F-CEE8123D810F}"/>
               </a:ext>
             </a:extLst>
           </p:cNvPr>
@@ -5470,44 +5431,123 @@
         </p:blipFill>
         <p:spPr>
           <a:xfrm>
-            <a:off x="7487478" y="3869991"/>
-            <a:ext cx="4340087" cy="2893391"/>
+            <a:off x="1039939" y="2057954"/>
+            <a:ext cx="4182603" cy="4705428"/>
           </a:xfrm>
           <a:prstGeom prst="rect">
             <a:avLst/>
           </a:prstGeom>
         </p:spPr>
       </p:pic>
-      <p:pic>
-        <p:nvPicPr>
-          <p:cNvPr id="10" name="Picture 9">
-            <a:extLst>
-              <a:ext uri="{FF2B5EF4-FFF2-40B4-BE49-F238E27FC236}">
-                <a16:creationId xmlns:a16="http://schemas.microsoft.com/office/drawing/2014/main" id="{8A3C2BD8-5066-5D44-937B-C5EEF321EEA4}"/>
-              </a:ext>
-            </a:extLst>
-          </p:cNvPr>
-          <p:cNvPicPr>
-            <a:picLocks noChangeAspect="1"/>
-          </p:cNvPicPr>
+      <p:sp>
+        <p:nvSpPr>
+          <p:cNvPr id="5" name="TextBox 4">
+            <a:extLst>
+              <a:ext uri="{FF2B5EF4-FFF2-40B4-BE49-F238E27FC236}">
+                <a16:creationId xmlns:a16="http://schemas.microsoft.com/office/drawing/2014/main" id="{22A23B79-DBB3-B840-A386-2A2BDFB577D1}"/>
+              </a:ext>
+            </a:extLst>
+          </p:cNvPr>
+          <p:cNvSpPr txBox="1"/>
           <p:nvPr/>
-        </p:nvPicPr>
-        <p:blipFill>
-          <a:blip r:embed="rId3"/>
-          <a:stretch>
-            <a:fillRect/>
-          </a:stretch>
-        </p:blipFill>
+        </p:nvSpPr>
         <p:spPr>
           <a:xfrm>
-            <a:off x="1895767" y="1828800"/>
-            <a:ext cx="4368094" cy="4914106"/>
+            <a:off x="6100549" y="2702257"/>
+            <a:ext cx="5253251" cy="2308324"/>
           </a:xfrm>
           <a:prstGeom prst="rect">
             <a:avLst/>
           </a:prstGeom>
+          <a:noFill/>
         </p:spPr>
-      </p:pic>
+        <p:txBody>
+          <a:bodyPr wrap="square" rtlCol="0">
+            <a:spAutoFit/>
+          </a:bodyPr>
+          <a:lstStyle/>
+          <a:p>
+            <a:r>
+              <a:rPr lang="en-US" sz="3600" dirty="0">
+                <a:solidFill>
+                  <a:srgbClr val="FF0000"/>
+                </a:solidFill>
+              </a:rPr>
+              <a:t>When LMA increases with soil N and biomass shows a limited response to soil N, </a:t>
+            </a:r>
+            <a:r>
+              <a:rPr lang="en-US" sz="3600" dirty="0" err="1">
+                <a:solidFill>
+                  <a:srgbClr val="FF0000"/>
+                </a:solidFill>
+              </a:rPr>
+              <a:t>N</a:t>
+            </a:r>
+            <a:r>
+              <a:rPr lang="en-US" sz="3600" baseline="-25000" dirty="0" err="1">
+                <a:solidFill>
+                  <a:srgbClr val="FF0000"/>
+                </a:solidFill>
+              </a:rPr>
+              <a:t>area</a:t>
+            </a:r>
+            <a:r>
+              <a:rPr lang="en-US" sz="3600" dirty="0">
+                <a:solidFill>
+                  <a:srgbClr val="FF0000"/>
+                </a:solidFill>
+              </a:rPr>
+              <a:t> increases with soil N</a:t>
+            </a:r>
+          </a:p>
+        </p:txBody>
+      </p:sp>
+      <p:sp>
+        <p:nvSpPr>
+          <p:cNvPr id="6" name="TextBox 5">
+            <a:extLst>
+              <a:ext uri="{FF2B5EF4-FFF2-40B4-BE49-F238E27FC236}">
+                <a16:creationId xmlns:a16="http://schemas.microsoft.com/office/drawing/2014/main" id="{7F3EA6DB-BC7A-9A42-B4EA-C56CF8438654}"/>
+              </a:ext>
+            </a:extLst>
+          </p:cNvPr>
+          <p:cNvSpPr txBox="1"/>
+          <p:nvPr/>
+        </p:nvSpPr>
+        <p:spPr>
+          <a:xfrm>
+            <a:off x="5372668" y="6061566"/>
+            <a:ext cx="4164602" cy="646331"/>
+          </a:xfrm>
+          <a:prstGeom prst="rect">
+            <a:avLst/>
+          </a:prstGeom>
+          <a:noFill/>
+          <a:ln>
+            <a:solidFill>
+              <a:schemeClr val="tx1"/>
+            </a:solidFill>
+          </a:ln>
+        </p:spPr>
+        <p:txBody>
+          <a:bodyPr wrap="none" rtlCol="0">
+            <a:spAutoFit/>
+          </a:bodyPr>
+          <a:lstStyle/>
+          <a:p>
+            <a:r>
+              <a:rPr lang="en-US" dirty="0"/>
+              <a:t>Red = high positive LMA response to soil N</a:t>
+            </a:r>
+          </a:p>
+          <a:p>
+            <a:r>
+              <a:rPr lang="en-US" dirty="0"/>
+              <a:t>Blue/purple = limited to no LMA to soil N</a:t>
+            </a:r>
+          </a:p>
+        </p:txBody>
+      </p:sp>
     </p:spTree>
     <p:extLst>
       <p:ext uri="{BB962C8B-B14F-4D97-AF65-F5344CB8AC3E}">

</xml_diff>